<commit_message>
Author           : Prateek Kapoor File Modified    : Product Backlog.xlsx , Updated Designs.pptx Description      : Updated product backlog for Training partner module and updated the designs
</commit_message>
<xml_diff>
--- a/Requirements/Product Backlog/Screen Designs/Screen Design Deck/Updated Designs.pptx
+++ b/Requirements/Product Backlog/Screen Designs/Screen Design Deck/Updated Designs.pptx
@@ -2001,7 +2001,7 @@
           <a:p>
             <a:fld id="{736940B7-5369-499F-A655-F2C040499C10}" type="datetimeFigureOut">
               <a:rPr lang="en-IN" smtClean="0"/>
-              <a:t>18-06-2018</a:t>
+              <a:t>19-06-2018</a:t>
             </a:fld>
             <a:endParaRPr lang="en-IN"/>
           </a:p>
@@ -2652,7 +2652,7 @@
           <a:p>
             <a:fld id="{0344983A-0EFF-4FA5-823C-58DD31D92387}" type="datetimeFigureOut">
               <a:rPr lang="en-IN" smtClean="0"/>
-              <a:t>18-06-2018</a:t>
+              <a:t>19-06-2018</a:t>
             </a:fld>
             <a:endParaRPr lang="en-IN"/>
           </a:p>
@@ -2822,7 +2822,7 @@
           <a:p>
             <a:fld id="{0344983A-0EFF-4FA5-823C-58DD31D92387}" type="datetimeFigureOut">
               <a:rPr lang="en-IN" smtClean="0"/>
-              <a:t>18-06-2018</a:t>
+              <a:t>19-06-2018</a:t>
             </a:fld>
             <a:endParaRPr lang="en-IN"/>
           </a:p>
@@ -3002,7 +3002,7 @@
           <a:p>
             <a:fld id="{0344983A-0EFF-4FA5-823C-58DD31D92387}" type="datetimeFigureOut">
               <a:rPr lang="en-IN" smtClean="0"/>
-              <a:t>18-06-2018</a:t>
+              <a:t>19-06-2018</a:t>
             </a:fld>
             <a:endParaRPr lang="en-IN"/>
           </a:p>
@@ -3172,7 +3172,7 @@
           <a:p>
             <a:fld id="{0344983A-0EFF-4FA5-823C-58DD31D92387}" type="datetimeFigureOut">
               <a:rPr lang="en-IN" smtClean="0"/>
-              <a:t>18-06-2018</a:t>
+              <a:t>19-06-2018</a:t>
             </a:fld>
             <a:endParaRPr lang="en-IN"/>
           </a:p>
@@ -3418,7 +3418,7 @@
           <a:p>
             <a:fld id="{0344983A-0EFF-4FA5-823C-58DD31D92387}" type="datetimeFigureOut">
               <a:rPr lang="en-IN" smtClean="0"/>
-              <a:t>18-06-2018</a:t>
+              <a:t>19-06-2018</a:t>
             </a:fld>
             <a:endParaRPr lang="en-IN"/>
           </a:p>
@@ -3650,7 +3650,7 @@
           <a:p>
             <a:fld id="{0344983A-0EFF-4FA5-823C-58DD31D92387}" type="datetimeFigureOut">
               <a:rPr lang="en-IN" smtClean="0"/>
-              <a:t>18-06-2018</a:t>
+              <a:t>19-06-2018</a:t>
             </a:fld>
             <a:endParaRPr lang="en-IN"/>
           </a:p>
@@ -4017,7 +4017,7 @@
           <a:p>
             <a:fld id="{0344983A-0EFF-4FA5-823C-58DD31D92387}" type="datetimeFigureOut">
               <a:rPr lang="en-IN" smtClean="0"/>
-              <a:t>18-06-2018</a:t>
+              <a:t>19-06-2018</a:t>
             </a:fld>
             <a:endParaRPr lang="en-IN"/>
           </a:p>
@@ -4135,7 +4135,7 @@
           <a:p>
             <a:fld id="{0344983A-0EFF-4FA5-823C-58DD31D92387}" type="datetimeFigureOut">
               <a:rPr lang="en-IN" smtClean="0"/>
-              <a:t>18-06-2018</a:t>
+              <a:t>19-06-2018</a:t>
             </a:fld>
             <a:endParaRPr lang="en-IN"/>
           </a:p>
@@ -4230,7 +4230,7 @@
           <a:p>
             <a:fld id="{0344983A-0EFF-4FA5-823C-58DD31D92387}" type="datetimeFigureOut">
               <a:rPr lang="en-IN" smtClean="0"/>
-              <a:t>18-06-2018</a:t>
+              <a:t>19-06-2018</a:t>
             </a:fld>
             <a:endParaRPr lang="en-IN"/>
           </a:p>
@@ -4507,7 +4507,7 @@
           <a:p>
             <a:fld id="{0344983A-0EFF-4FA5-823C-58DD31D92387}" type="datetimeFigureOut">
               <a:rPr lang="en-IN" smtClean="0"/>
-              <a:t>18-06-2018</a:t>
+              <a:t>19-06-2018</a:t>
             </a:fld>
             <a:endParaRPr lang="en-IN"/>
           </a:p>
@@ -4764,7 +4764,7 @@
           <a:p>
             <a:fld id="{0344983A-0EFF-4FA5-823C-58DD31D92387}" type="datetimeFigureOut">
               <a:rPr lang="en-IN" smtClean="0"/>
-              <a:t>18-06-2018</a:t>
+              <a:t>19-06-2018</a:t>
             </a:fld>
             <a:endParaRPr lang="en-IN"/>
           </a:p>
@@ -4977,7 +4977,7 @@
           <a:p>
             <a:fld id="{0344983A-0EFF-4FA5-823C-58DD31D92387}" type="datetimeFigureOut">
               <a:rPr lang="en-IN" smtClean="0"/>
-              <a:t>18-06-2018</a:t>
+              <a:t>19-06-2018</a:t>
             </a:fld>
             <a:endParaRPr lang="en-IN"/>
           </a:p>
@@ -21723,7 +21723,7 @@
         </p:nvSpPr>
         <p:spPr>
           <a:xfrm>
-            <a:off x="5982460" y="2666970"/>
+            <a:off x="5982460" y="2724033"/>
             <a:ext cx="2426903" cy="422168"/>
           </a:xfrm>
           <a:prstGeom prst="roundRect">

</xml_diff>

<commit_message>
Author        : Prateek Kapoor File Modifies : Updated Designs.pptx Description   : Updated Designs of Generate Reports
</commit_message>
<xml_diff>
--- a/Requirements/Product Backlog/Screen Designs/Screen Design Deck/Updated Designs.pptx
+++ b/Requirements/Product Backlog/Screen Designs/Screen Design Deck/Updated Designs.pptx
@@ -177,6 +177,7 @@
           </a:p>
         </c:rich>
       </c:tx>
+      <c:layout/>
       <c:overlay val="0"/>
       <c:spPr>
         <a:noFill/>
@@ -414,6 +415,7 @@
     </c:plotArea>
     <c:legend>
       <c:legendPos val="b"/>
+      <c:layout/>
       <c:overlay val="0"/>
       <c:spPr>
         <a:noFill/>
@@ -445,6 +447,7 @@
     </c:legend>
     <c:plotVisOnly val="1"/>
     <c:dispBlanksAs val="gap"/>
+    <c:showDLblsOverMax val="0"/>
     <c:extLst>
       <c:ext xmlns:c16r3="http://schemas.microsoft.com/office/drawing/2017/03/chart" uri="{56B9EC1D-385E-4148-901F-78D8002777C0}">
         <c16r3:dataDisplayOptions16>
@@ -452,7 +455,6 @@
         </c16r3:dataDisplayOptions16>
       </c:ext>
     </c:extLst>
-    <c:showDLblsOverMax val="0"/>
   </c:chart>
   <c:spPr>
     <a:noFill/>
@@ -522,6 +524,7 @@
           </a:p>
         </c:rich>
       </c:tx>
+      <c:layout/>
       <c:overlay val="0"/>
       <c:spPr>
         <a:noFill/>
@@ -771,6 +774,7 @@
     </c:plotArea>
     <c:legend>
       <c:legendPos val="b"/>
+      <c:layout/>
       <c:overlay val="0"/>
       <c:spPr>
         <a:noFill/>
@@ -802,6 +806,7 @@
     </c:legend>
     <c:plotVisOnly val="1"/>
     <c:dispBlanksAs val="gap"/>
+    <c:showDLblsOverMax val="0"/>
     <c:extLst>
       <c:ext xmlns:c16r3="http://schemas.microsoft.com/office/drawing/2017/03/chart" uri="{56B9EC1D-385E-4148-901F-78D8002777C0}">
         <c16r3:dataDisplayOptions16>
@@ -809,7 +814,6 @@
         </c16r3:dataDisplayOptions16>
       </c:ext>
     </c:extLst>
-    <c:showDLblsOverMax val="0"/>
   </c:chart>
   <c:spPr>
     <a:noFill/>
@@ -2002,7 +2006,7 @@
           <a:p>
             <a:fld id="{736940B7-5369-499F-A655-F2C040499C10}" type="datetimeFigureOut">
               <a:rPr lang="en-IN" smtClean="0"/>
-              <a:t>03-07-2018</a:t>
+              <a:t>11-07-2018</a:t>
             </a:fld>
             <a:endParaRPr lang="en-IN"/>
           </a:p>
@@ -2653,7 +2657,7 @@
           <a:p>
             <a:fld id="{0344983A-0EFF-4FA5-823C-58DD31D92387}" type="datetimeFigureOut">
               <a:rPr lang="en-IN" smtClean="0"/>
-              <a:t>03-07-2018</a:t>
+              <a:t>11-07-2018</a:t>
             </a:fld>
             <a:endParaRPr lang="en-IN"/>
           </a:p>
@@ -2823,7 +2827,7 @@
           <a:p>
             <a:fld id="{0344983A-0EFF-4FA5-823C-58DD31D92387}" type="datetimeFigureOut">
               <a:rPr lang="en-IN" smtClean="0"/>
-              <a:t>03-07-2018</a:t>
+              <a:t>11-07-2018</a:t>
             </a:fld>
             <a:endParaRPr lang="en-IN"/>
           </a:p>
@@ -3003,7 +3007,7 @@
           <a:p>
             <a:fld id="{0344983A-0EFF-4FA5-823C-58DD31D92387}" type="datetimeFigureOut">
               <a:rPr lang="en-IN" smtClean="0"/>
-              <a:t>03-07-2018</a:t>
+              <a:t>11-07-2018</a:t>
             </a:fld>
             <a:endParaRPr lang="en-IN"/>
           </a:p>
@@ -3173,7 +3177,7 @@
           <a:p>
             <a:fld id="{0344983A-0EFF-4FA5-823C-58DD31D92387}" type="datetimeFigureOut">
               <a:rPr lang="en-IN" smtClean="0"/>
-              <a:t>03-07-2018</a:t>
+              <a:t>11-07-2018</a:t>
             </a:fld>
             <a:endParaRPr lang="en-IN"/>
           </a:p>
@@ -3419,7 +3423,7 @@
           <a:p>
             <a:fld id="{0344983A-0EFF-4FA5-823C-58DD31D92387}" type="datetimeFigureOut">
               <a:rPr lang="en-IN" smtClean="0"/>
-              <a:t>03-07-2018</a:t>
+              <a:t>11-07-2018</a:t>
             </a:fld>
             <a:endParaRPr lang="en-IN"/>
           </a:p>
@@ -3651,7 +3655,7 @@
           <a:p>
             <a:fld id="{0344983A-0EFF-4FA5-823C-58DD31D92387}" type="datetimeFigureOut">
               <a:rPr lang="en-IN" smtClean="0"/>
-              <a:t>03-07-2018</a:t>
+              <a:t>11-07-2018</a:t>
             </a:fld>
             <a:endParaRPr lang="en-IN"/>
           </a:p>
@@ -4018,7 +4022,7 @@
           <a:p>
             <a:fld id="{0344983A-0EFF-4FA5-823C-58DD31D92387}" type="datetimeFigureOut">
               <a:rPr lang="en-IN" smtClean="0"/>
-              <a:t>03-07-2018</a:t>
+              <a:t>11-07-2018</a:t>
             </a:fld>
             <a:endParaRPr lang="en-IN"/>
           </a:p>
@@ -4136,7 +4140,7 @@
           <a:p>
             <a:fld id="{0344983A-0EFF-4FA5-823C-58DD31D92387}" type="datetimeFigureOut">
               <a:rPr lang="en-IN" smtClean="0"/>
-              <a:t>03-07-2018</a:t>
+              <a:t>11-07-2018</a:t>
             </a:fld>
             <a:endParaRPr lang="en-IN"/>
           </a:p>
@@ -4231,7 +4235,7 @@
           <a:p>
             <a:fld id="{0344983A-0EFF-4FA5-823C-58DD31D92387}" type="datetimeFigureOut">
               <a:rPr lang="en-IN" smtClean="0"/>
-              <a:t>03-07-2018</a:t>
+              <a:t>11-07-2018</a:t>
             </a:fld>
             <a:endParaRPr lang="en-IN"/>
           </a:p>
@@ -4508,7 +4512,7 @@
           <a:p>
             <a:fld id="{0344983A-0EFF-4FA5-823C-58DD31D92387}" type="datetimeFigureOut">
               <a:rPr lang="en-IN" smtClean="0"/>
-              <a:t>03-07-2018</a:t>
+              <a:t>11-07-2018</a:t>
             </a:fld>
             <a:endParaRPr lang="en-IN"/>
           </a:p>
@@ -4765,7 +4769,7 @@
           <a:p>
             <a:fld id="{0344983A-0EFF-4FA5-823C-58DD31D92387}" type="datetimeFigureOut">
               <a:rPr lang="en-IN" smtClean="0"/>
-              <a:t>03-07-2018</a:t>
+              <a:t>11-07-2018</a:t>
             </a:fld>
             <a:endParaRPr lang="en-IN"/>
           </a:p>
@@ -4978,7 +4982,7 @@
           <a:p>
             <a:fld id="{0344983A-0EFF-4FA5-823C-58DD31D92387}" type="datetimeFigureOut">
               <a:rPr lang="en-IN" smtClean="0"/>
-              <a:t>03-07-2018</a:t>
+              <a:t>11-07-2018</a:t>
             </a:fld>
             <a:endParaRPr lang="en-IN"/>
           </a:p>
@@ -6525,7 +6529,7 @@
           <p:nvPr/>
         </p:nvPicPr>
         <p:blipFill>
-          <a:blip r:embed="rId3">
+          <a:blip r:embed="rId3" cstate="hqprint">
             <a:extLst>
               <a:ext uri="{28A0092B-C50C-407E-A947-70E740481C1C}">
                 <a14:useLocalDpi xmlns:a14="http://schemas.microsoft.com/office/drawing/2010/main" val="0"/>
@@ -7406,7 +7410,7 @@
           <p:nvPr/>
         </p:nvPicPr>
         <p:blipFill>
-          <a:blip r:embed="rId4">
+          <a:blip r:embed="rId4" cstate="hqprint">
             <a:extLst>
               <a:ext uri="{28A0092B-C50C-407E-A947-70E740481C1C}">
                 <a14:useLocalDpi xmlns:a14="http://schemas.microsoft.com/office/drawing/2010/main" val="0"/>
@@ -7862,7 +7866,7 @@
               <p:nvPr/>
             </p:nvPicPr>
             <p:blipFill>
-              <a:blip r:embed="rId5">
+              <a:blip r:embed="rId5" cstate="hqprint">
                 <a:biLevel thresh="25000"/>
                 <a:extLst>
                   <a:ext uri="{28A0092B-C50C-407E-A947-70E740481C1C}">
@@ -7956,7 +7960,7 @@
             <p:nvPr/>
           </p:nvPicPr>
           <p:blipFill>
-            <a:blip r:embed="rId6">
+            <a:blip r:embed="rId6" cstate="hqprint">
               <a:extLst>
                 <a:ext uri="{28A0092B-C50C-407E-A947-70E740481C1C}">
                   <a14:useLocalDpi xmlns:a14="http://schemas.microsoft.com/office/drawing/2010/main" val="0"/>
@@ -8112,7 +8116,7 @@
             <p:nvPr/>
           </p:nvPicPr>
           <p:blipFill>
-            <a:blip r:embed="rId7">
+            <a:blip r:embed="rId7" cstate="hqprint">
               <a:lum bright="70000" contrast="-70000"/>
               <a:extLst>
                 <a:ext uri="{28A0092B-C50C-407E-A947-70E740481C1C}">
@@ -8233,7 +8237,7 @@
           <p:nvPr/>
         </p:nvPicPr>
         <p:blipFill>
-          <a:blip r:embed="rId8">
+          <a:blip r:embed="rId8" cstate="hqprint">
             <a:extLst>
               <a:ext uri="{28A0092B-C50C-407E-A947-70E740481C1C}">
                 <a14:useLocalDpi xmlns:a14="http://schemas.microsoft.com/office/drawing/2010/main" val="0"/>
@@ -8328,7 +8332,7 @@
             <p:nvPr/>
           </p:nvPicPr>
           <p:blipFill>
-            <a:blip r:embed="rId9">
+            <a:blip r:embed="rId9" cstate="hqprint">
               <a:lum bright="70000" contrast="-70000"/>
               <a:extLst>
                 <a:ext uri="{28A0092B-C50C-407E-A947-70E740481C1C}">
@@ -8507,7 +8511,7 @@
           <p:nvPr/>
         </p:nvPicPr>
         <p:blipFill>
-          <a:blip r:embed="rId4">
+          <a:blip r:embed="rId4" cstate="hqprint">
             <a:extLst>
               <a:ext uri="{28A0092B-C50C-407E-A947-70E740481C1C}">
                 <a14:useLocalDpi xmlns:a14="http://schemas.microsoft.com/office/drawing/2010/main" val="0"/>
@@ -8543,7 +8547,7 @@
           <p:nvPr/>
         </p:nvPicPr>
         <p:blipFill>
-          <a:blip r:embed="rId4">
+          <a:blip r:embed="rId4" cstate="hqprint">
             <a:extLst>
               <a:ext uri="{28A0092B-C50C-407E-A947-70E740481C1C}">
                 <a14:useLocalDpi xmlns:a14="http://schemas.microsoft.com/office/drawing/2010/main" val="0"/>
@@ -8910,7 +8914,7 @@
           <p:nvPr/>
         </p:nvPicPr>
         <p:blipFill>
-          <a:blip r:embed="rId2">
+          <a:blip r:embed="rId2" cstate="hqprint">
             <a:extLst>
               <a:ext uri="{28A0092B-C50C-407E-A947-70E740481C1C}">
                 <a14:useLocalDpi xmlns:a14="http://schemas.microsoft.com/office/drawing/2010/main" val="0"/>
@@ -9116,7 +9120,7 @@
               <p:nvPr/>
             </p:nvPicPr>
             <p:blipFill>
-              <a:blip r:embed="rId3">
+              <a:blip r:embed="rId3" cstate="hqprint">
                 <a:biLevel thresh="25000"/>
                 <a:extLst>
                   <a:ext uri="{28A0092B-C50C-407E-A947-70E740481C1C}">
@@ -9210,7 +9214,7 @@
             <p:nvPr/>
           </p:nvPicPr>
           <p:blipFill>
-            <a:blip r:embed="rId4">
+            <a:blip r:embed="rId4" cstate="hqprint">
               <a:extLst>
                 <a:ext uri="{28A0092B-C50C-407E-A947-70E740481C1C}">
                   <a14:useLocalDpi xmlns:a14="http://schemas.microsoft.com/office/drawing/2010/main" val="0"/>
@@ -9366,7 +9370,7 @@
             <p:nvPr/>
           </p:nvPicPr>
           <p:blipFill>
-            <a:blip r:embed="rId5">
+            <a:blip r:embed="rId5" cstate="hqprint">
               <a:lum bright="70000" contrast="-70000"/>
               <a:extLst>
                 <a:ext uri="{28A0092B-C50C-407E-A947-70E740481C1C}">
@@ -9487,7 +9491,7 @@
           <p:nvPr/>
         </p:nvPicPr>
         <p:blipFill>
-          <a:blip r:embed="rId6">
+          <a:blip r:embed="rId6" cstate="hqprint">
             <a:extLst>
               <a:ext uri="{28A0092B-C50C-407E-A947-70E740481C1C}">
                 <a14:useLocalDpi xmlns:a14="http://schemas.microsoft.com/office/drawing/2010/main" val="0"/>
@@ -9582,7 +9586,7 @@
             <p:nvPr/>
           </p:nvPicPr>
           <p:blipFill>
-            <a:blip r:embed="rId7">
+            <a:blip r:embed="rId7" cstate="hqprint">
               <a:lum bright="70000" contrast="-70000"/>
               <a:extLst>
                 <a:ext uri="{28A0092B-C50C-407E-A947-70E740481C1C}">
@@ -9659,7 +9663,7 @@
           <p:nvPr/>
         </p:nvPicPr>
         <p:blipFill>
-          <a:blip r:embed="rId8">
+          <a:blip r:embed="rId8" cstate="hqprint">
             <a:extLst>
               <a:ext uri="{28A0092B-C50C-407E-A947-70E740481C1C}">
                 <a14:useLocalDpi xmlns:a14="http://schemas.microsoft.com/office/drawing/2010/main" val="0"/>
@@ -10693,7 +10697,7 @@
           <p:nvPr/>
         </p:nvPicPr>
         <p:blipFill>
-          <a:blip r:embed="rId2">
+          <a:blip r:embed="rId2" cstate="hqprint">
             <a:extLst>
               <a:ext uri="{28A0092B-C50C-407E-A947-70E740481C1C}">
                 <a14:useLocalDpi xmlns:a14="http://schemas.microsoft.com/office/drawing/2010/main" val="0"/>
@@ -10945,7 +10949,7 @@
           <p:nvPr/>
         </p:nvPicPr>
         <p:blipFill>
-          <a:blip r:embed="rId3">
+          <a:blip r:embed="rId3" cstate="hqprint">
             <a:lum bright="70000" contrast="-70000"/>
             <a:extLst>
               <a:ext uri="{28A0092B-C50C-407E-A947-70E740481C1C}">
@@ -11046,7 +11050,7 @@
             <p:nvPr/>
           </p:nvPicPr>
           <p:blipFill>
-            <a:blip r:embed="rId4">
+            <a:blip r:embed="rId4" cstate="hqprint">
               <a:extLst>
                 <a:ext uri="{28A0092B-C50C-407E-A947-70E740481C1C}">
                   <a14:useLocalDpi xmlns:a14="http://schemas.microsoft.com/office/drawing/2010/main" val="0"/>
@@ -11122,7 +11126,7 @@
           <p:nvPr/>
         </p:nvPicPr>
         <p:blipFill>
-          <a:blip r:embed="rId5">
+          <a:blip r:embed="rId5" cstate="hqprint">
             <a:extLst>
               <a:ext uri="{28A0092B-C50C-407E-A947-70E740481C1C}">
                 <a14:useLocalDpi xmlns:a14="http://schemas.microsoft.com/office/drawing/2010/main" val="0"/>
@@ -12062,7 +12066,7 @@
           <p:nvPr/>
         </p:nvPicPr>
         <p:blipFill>
-          <a:blip r:embed="rId9">
+          <a:blip r:embed="rId9" cstate="hqprint">
             <a:extLst>
               <a:ext uri="{28A0092B-C50C-407E-A947-70E740481C1C}">
                 <a14:useLocalDpi xmlns:a14="http://schemas.microsoft.com/office/drawing/2010/main" val="0"/>
@@ -12268,7 +12272,7 @@
               <p:nvPr/>
             </p:nvPicPr>
             <p:blipFill>
-              <a:blip r:embed="rId10">
+              <a:blip r:embed="rId10" cstate="hqprint">
                 <a:biLevel thresh="25000"/>
                 <a:extLst>
                   <a:ext uri="{28A0092B-C50C-407E-A947-70E740481C1C}">
@@ -12307,7 +12311,7 @@
           <p:nvPr/>
         </p:nvPicPr>
         <p:blipFill rotWithShape="1">
-          <a:blip r:embed="rId11">
+          <a:blip r:embed="rId11" cstate="hqprint">
             <a:lum bright="70000" contrast="-70000"/>
             <a:extLst>
               <a:ext uri="{28A0092B-C50C-407E-A947-70E740481C1C}">
@@ -12402,7 +12406,7 @@
             <p:nvPr/>
           </p:nvPicPr>
           <p:blipFill rotWithShape="1">
-            <a:blip r:embed="rId11">
+            <a:blip r:embed="rId11" cstate="hqprint">
               <a:lum bright="70000" contrast="-70000"/>
               <a:extLst>
                 <a:ext uri="{28A0092B-C50C-407E-A947-70E740481C1C}">
@@ -12504,7 +12508,7 @@
           <p:nvPr/>
         </p:nvPicPr>
         <p:blipFill>
-          <a:blip r:embed="rId2">
+          <a:blip r:embed="rId2" cstate="hqprint">
             <a:extLst>
               <a:ext uri="{28A0092B-C50C-407E-A947-70E740481C1C}">
                 <a14:useLocalDpi xmlns:a14="http://schemas.microsoft.com/office/drawing/2010/main" val="0"/>
@@ -12961,7 +12965,7 @@
             <p:nvPr/>
           </p:nvPicPr>
           <p:blipFill>
-            <a:blip r:embed="rId3">
+            <a:blip r:embed="rId3" cstate="hqprint">
               <a:extLst>
                 <a:ext uri="{28A0092B-C50C-407E-A947-70E740481C1C}">
                   <a14:useLocalDpi xmlns:a14="http://schemas.microsoft.com/office/drawing/2010/main" val="0"/>
@@ -13255,7 +13259,7 @@
             <p:nvPr/>
           </p:nvPicPr>
           <p:blipFill>
-            <a:blip r:embed="rId3">
+            <a:blip r:embed="rId3" cstate="hqprint">
               <a:extLst>
                 <a:ext uri="{28A0092B-C50C-407E-A947-70E740481C1C}">
                   <a14:useLocalDpi xmlns:a14="http://schemas.microsoft.com/office/drawing/2010/main" val="0"/>
@@ -13549,7 +13553,7 @@
             <p:nvPr/>
           </p:nvPicPr>
           <p:blipFill>
-            <a:blip r:embed="rId3">
+            <a:blip r:embed="rId3" cstate="hqprint">
               <a:extLst>
                 <a:ext uri="{28A0092B-C50C-407E-A947-70E740481C1C}">
                   <a14:useLocalDpi xmlns:a14="http://schemas.microsoft.com/office/drawing/2010/main" val="0"/>
@@ -13597,7 +13601,7 @@
           <p:nvPr/>
         </p:nvPicPr>
         <p:blipFill>
-          <a:blip r:embed="rId4">
+          <a:blip r:embed="rId4" cstate="hqprint">
             <a:extLst>
               <a:ext uri="{28A0092B-C50C-407E-A947-70E740481C1C}">
                 <a14:useLocalDpi xmlns:a14="http://schemas.microsoft.com/office/drawing/2010/main" val="0"/>
@@ -13803,7 +13807,7 @@
               <p:nvPr/>
             </p:nvPicPr>
             <p:blipFill>
-              <a:blip r:embed="rId5">
+              <a:blip r:embed="rId5" cstate="hqprint">
                 <a:biLevel thresh="25000"/>
                 <a:extLst>
                   <a:ext uri="{28A0092B-C50C-407E-A947-70E740481C1C}">
@@ -14023,7 +14027,7 @@
           <p:nvPr/>
         </p:nvPicPr>
         <p:blipFill>
-          <a:blip r:embed="rId6">
+          <a:blip r:embed="rId6" cstate="hqprint">
             <a:lum bright="70000" contrast="-70000"/>
             <a:extLst>
               <a:ext uri="{28A0092B-C50C-407E-A947-70E740481C1C}">
@@ -14124,7 +14128,7 @@
             <p:nvPr/>
           </p:nvPicPr>
           <p:blipFill>
-            <a:blip r:embed="rId7">
+            <a:blip r:embed="rId7" cstate="hqprint">
               <a:extLst>
                 <a:ext uri="{28A0092B-C50C-407E-A947-70E740481C1C}">
                   <a14:useLocalDpi xmlns:a14="http://schemas.microsoft.com/office/drawing/2010/main" val="0"/>
@@ -14200,7 +14204,7 @@
           <p:nvPr/>
         </p:nvPicPr>
         <p:blipFill>
-          <a:blip r:embed="rId8">
+          <a:blip r:embed="rId8" cstate="hqprint">
             <a:extLst>
               <a:ext uri="{28A0092B-C50C-407E-A947-70E740481C1C}">
                 <a14:useLocalDpi xmlns:a14="http://schemas.microsoft.com/office/drawing/2010/main" val="0"/>
@@ -14236,7 +14240,7 @@
           <p:nvPr/>
         </p:nvPicPr>
         <p:blipFill rotWithShape="1">
-          <a:blip r:embed="rId9">
+          <a:blip r:embed="rId9" cstate="hqprint">
             <a:lum bright="70000" contrast="-70000"/>
             <a:extLst>
               <a:ext uri="{28A0092B-C50C-407E-A947-70E740481C1C}">
@@ -14331,7 +14335,7 @@
             <p:nvPr/>
           </p:nvPicPr>
           <p:blipFill rotWithShape="1">
-            <a:blip r:embed="rId9">
+            <a:blip r:embed="rId9" cstate="hqprint">
               <a:lum bright="70000" contrast="-70000"/>
               <a:extLst>
                 <a:ext uri="{28A0092B-C50C-407E-A947-70E740481C1C}">
@@ -14433,7 +14437,7 @@
           <p:nvPr/>
         </p:nvPicPr>
         <p:blipFill>
-          <a:blip r:embed="rId2">
+          <a:blip r:embed="rId2" cstate="hqprint">
             <a:extLst>
               <a:ext uri="{28A0092B-C50C-407E-A947-70E740481C1C}">
                 <a14:useLocalDpi xmlns:a14="http://schemas.microsoft.com/office/drawing/2010/main" val="0"/>
@@ -15137,7 +15141,7 @@
             <p:nvPr/>
           </p:nvPicPr>
           <p:blipFill>
-            <a:blip r:embed="rId3">
+            <a:blip r:embed="rId3" cstate="hqprint">
               <a:extLst>
                 <a:ext uri="{28A0092B-C50C-407E-A947-70E740481C1C}">
                   <a14:useLocalDpi xmlns:a14="http://schemas.microsoft.com/office/drawing/2010/main" val="0"/>
@@ -15185,7 +15189,7 @@
           <p:nvPr/>
         </p:nvPicPr>
         <p:blipFill>
-          <a:blip r:embed="rId4">
+          <a:blip r:embed="rId4" cstate="hqprint">
             <a:extLst>
               <a:ext uri="{28A0092B-C50C-407E-A947-70E740481C1C}">
                 <a14:useLocalDpi xmlns:a14="http://schemas.microsoft.com/office/drawing/2010/main" val="0"/>
@@ -15392,7 +15396,7 @@
           <p:nvPr/>
         </p:nvPicPr>
         <p:blipFill>
-          <a:blip r:embed="rId5">
+          <a:blip r:embed="rId5" cstate="hqprint">
             <a:extLst>
               <a:ext uri="{28A0092B-C50C-407E-A947-70E740481C1C}">
                 <a14:useLocalDpi xmlns:a14="http://schemas.microsoft.com/office/drawing/2010/main" val="0"/>
@@ -15598,7 +15602,7 @@
               <p:nvPr/>
             </p:nvPicPr>
             <p:blipFill>
-              <a:blip r:embed="rId6">
+              <a:blip r:embed="rId6" cstate="hqprint">
                 <a:biLevel thresh="25000"/>
                 <a:extLst>
                   <a:ext uri="{28A0092B-C50C-407E-A947-70E740481C1C}">
@@ -15818,7 +15822,7 @@
           <p:nvPr/>
         </p:nvPicPr>
         <p:blipFill>
-          <a:blip r:embed="rId7">
+          <a:blip r:embed="rId7" cstate="hqprint">
             <a:lum bright="70000" contrast="-70000"/>
             <a:extLst>
               <a:ext uri="{28A0092B-C50C-407E-A947-70E740481C1C}">
@@ -15919,7 +15923,7 @@
             <p:nvPr/>
           </p:nvPicPr>
           <p:blipFill>
-            <a:blip r:embed="rId8">
+            <a:blip r:embed="rId8" cstate="hqprint">
               <a:extLst>
                 <a:ext uri="{28A0092B-C50C-407E-A947-70E740481C1C}">
                   <a14:useLocalDpi xmlns:a14="http://schemas.microsoft.com/office/drawing/2010/main" val="0"/>
@@ -15995,7 +15999,7 @@
           <p:nvPr/>
         </p:nvPicPr>
         <p:blipFill>
-          <a:blip r:embed="rId9">
+          <a:blip r:embed="rId9" cstate="hqprint">
             <a:extLst>
               <a:ext uri="{28A0092B-C50C-407E-A947-70E740481C1C}">
                 <a14:useLocalDpi xmlns:a14="http://schemas.microsoft.com/office/drawing/2010/main" val="0"/>
@@ -16031,7 +16035,7 @@
           <p:nvPr/>
         </p:nvPicPr>
         <p:blipFill rotWithShape="1">
-          <a:blip r:embed="rId10">
+          <a:blip r:embed="rId10" cstate="hqprint">
             <a:lum bright="70000" contrast="-70000"/>
             <a:extLst>
               <a:ext uri="{28A0092B-C50C-407E-A947-70E740481C1C}">
@@ -16126,7 +16130,7 @@
             <p:nvPr/>
           </p:nvPicPr>
           <p:blipFill rotWithShape="1">
-            <a:blip r:embed="rId10">
+            <a:blip r:embed="rId10" cstate="hqprint">
               <a:lum bright="70000" contrast="-70000"/>
               <a:extLst>
                 <a:ext uri="{28A0092B-C50C-407E-A947-70E740481C1C}">
@@ -16585,7 +16589,7 @@
           <p:nvPr/>
         </p:nvPicPr>
         <p:blipFill>
-          <a:blip r:embed="rId2">
+          <a:blip r:embed="rId2" cstate="hqprint">
             <a:extLst>
               <a:ext uri="{28A0092B-C50C-407E-A947-70E740481C1C}">
                 <a14:useLocalDpi xmlns:a14="http://schemas.microsoft.com/office/drawing/2010/main" val="0"/>
@@ -16880,7 +16884,7 @@
           <p:nvPr/>
         </p:nvPicPr>
         <p:blipFill>
-          <a:blip r:embed="rId3">
+          <a:blip r:embed="rId3" cstate="hqprint">
             <a:extLst>
               <a:ext uri="{28A0092B-C50C-407E-A947-70E740481C1C}">
                 <a14:useLocalDpi xmlns:a14="http://schemas.microsoft.com/office/drawing/2010/main" val="0"/>
@@ -17086,7 +17090,7 @@
               <p:nvPr/>
             </p:nvPicPr>
             <p:blipFill>
-              <a:blip r:embed="rId4">
+              <a:blip r:embed="rId4" cstate="hqprint">
                 <a:biLevel thresh="25000"/>
                 <a:extLst>
                   <a:ext uri="{28A0092B-C50C-407E-A947-70E740481C1C}">
@@ -17306,7 +17310,7 @@
           <p:nvPr/>
         </p:nvPicPr>
         <p:blipFill>
-          <a:blip r:embed="rId5">
+          <a:blip r:embed="rId5" cstate="hqprint">
             <a:lum bright="70000" contrast="-70000"/>
             <a:extLst>
               <a:ext uri="{28A0092B-C50C-407E-A947-70E740481C1C}">
@@ -17407,7 +17411,7 @@
             <p:nvPr/>
           </p:nvPicPr>
           <p:blipFill>
-            <a:blip r:embed="rId6">
+            <a:blip r:embed="rId6" cstate="hqprint">
               <a:extLst>
                 <a:ext uri="{28A0092B-C50C-407E-A947-70E740481C1C}">
                   <a14:useLocalDpi xmlns:a14="http://schemas.microsoft.com/office/drawing/2010/main" val="0"/>
@@ -17483,7 +17487,7 @@
           <p:nvPr/>
         </p:nvPicPr>
         <p:blipFill>
-          <a:blip r:embed="rId7">
+          <a:blip r:embed="rId7" cstate="hqprint">
             <a:extLst>
               <a:ext uri="{28A0092B-C50C-407E-A947-70E740481C1C}">
                 <a14:useLocalDpi xmlns:a14="http://schemas.microsoft.com/office/drawing/2010/main" val="0"/>
@@ -17519,7 +17523,7 @@
           <p:nvPr/>
         </p:nvPicPr>
         <p:blipFill rotWithShape="1">
-          <a:blip r:embed="rId8">
+          <a:blip r:embed="rId8" cstate="hqprint">
             <a:lum bright="70000" contrast="-70000"/>
             <a:extLst>
               <a:ext uri="{28A0092B-C50C-407E-A947-70E740481C1C}">
@@ -17614,7 +17618,7 @@
             <p:nvPr/>
           </p:nvPicPr>
           <p:blipFill rotWithShape="1">
-            <a:blip r:embed="rId8">
+            <a:blip r:embed="rId8" cstate="hqprint">
               <a:lum bright="70000" contrast="-70000"/>
               <a:extLst>
                 <a:ext uri="{28A0092B-C50C-407E-A947-70E740481C1C}">
@@ -18293,7 +18297,7 @@
           <p:nvPr/>
         </p:nvPicPr>
         <p:blipFill>
-          <a:blip r:embed="rId2">
+          <a:blip r:embed="rId2" cstate="hqprint">
             <a:extLst>
               <a:ext uri="{28A0092B-C50C-407E-A947-70E740481C1C}">
                 <a14:useLocalDpi xmlns:a14="http://schemas.microsoft.com/office/drawing/2010/main" val="0"/>
@@ -18405,7 +18409,7 @@
           <p:nvPr/>
         </p:nvPicPr>
         <p:blipFill>
-          <a:blip r:embed="rId3">
+          <a:blip r:embed="rId3" cstate="hqprint">
             <a:extLst>
               <a:ext uri="{28A0092B-C50C-407E-A947-70E740481C1C}">
                 <a14:useLocalDpi xmlns:a14="http://schemas.microsoft.com/office/drawing/2010/main" val="0"/>
@@ -18611,7 +18615,7 @@
               <p:nvPr/>
             </p:nvPicPr>
             <p:blipFill>
-              <a:blip r:embed="rId4">
+              <a:blip r:embed="rId4" cstate="hqprint">
                 <a:biLevel thresh="25000"/>
                 <a:extLst>
                   <a:ext uri="{28A0092B-C50C-407E-A947-70E740481C1C}">
@@ -18831,7 +18835,7 @@
           <p:nvPr/>
         </p:nvPicPr>
         <p:blipFill>
-          <a:blip r:embed="rId5">
+          <a:blip r:embed="rId5" cstate="hqprint">
             <a:lum bright="70000" contrast="-70000"/>
             <a:extLst>
               <a:ext uri="{28A0092B-C50C-407E-A947-70E740481C1C}">
@@ -18932,7 +18936,7 @@
             <p:nvPr/>
           </p:nvPicPr>
           <p:blipFill>
-            <a:blip r:embed="rId6">
+            <a:blip r:embed="rId6" cstate="hqprint">
               <a:extLst>
                 <a:ext uri="{28A0092B-C50C-407E-A947-70E740481C1C}">
                   <a14:useLocalDpi xmlns:a14="http://schemas.microsoft.com/office/drawing/2010/main" val="0"/>
@@ -19008,7 +19012,7 @@
           <p:nvPr/>
         </p:nvPicPr>
         <p:blipFill>
-          <a:blip r:embed="rId7">
+          <a:blip r:embed="rId7" cstate="hqprint">
             <a:extLst>
               <a:ext uri="{28A0092B-C50C-407E-A947-70E740481C1C}">
                 <a14:useLocalDpi xmlns:a14="http://schemas.microsoft.com/office/drawing/2010/main" val="0"/>
@@ -19044,7 +19048,7 @@
           <p:nvPr/>
         </p:nvPicPr>
         <p:blipFill rotWithShape="1">
-          <a:blip r:embed="rId8">
+          <a:blip r:embed="rId8" cstate="hqprint">
             <a:lum bright="70000" contrast="-70000"/>
             <a:extLst>
               <a:ext uri="{28A0092B-C50C-407E-A947-70E740481C1C}">
@@ -19139,7 +19143,7 @@
             <p:nvPr/>
           </p:nvPicPr>
           <p:blipFill rotWithShape="1">
-            <a:blip r:embed="rId8">
+            <a:blip r:embed="rId8" cstate="hqprint">
               <a:lum bright="70000" contrast="-70000"/>
               <a:extLst>
                 <a:ext uri="{28A0092B-C50C-407E-A947-70E740481C1C}">
@@ -19895,7 +19899,7 @@
           <p:nvPr/>
         </p:nvPicPr>
         <p:blipFill>
-          <a:blip r:embed="rId3">
+          <a:blip r:embed="rId3" cstate="hqprint">
             <a:extLst>
               <a:ext uri="{28A0092B-C50C-407E-A947-70E740481C1C}">
                 <a14:useLocalDpi xmlns:a14="http://schemas.microsoft.com/office/drawing/2010/main" val="0"/>
@@ -20135,7 +20139,7 @@
           <p:nvPr/>
         </p:nvPicPr>
         <p:blipFill rotWithShape="1">
-          <a:blip r:embed="rId4">
+          <a:blip r:embed="rId4" cstate="hqprint">
             <a:extLst>
               <a:ext uri="{28A0092B-C50C-407E-A947-70E740481C1C}">
                 <a14:useLocalDpi xmlns:a14="http://schemas.microsoft.com/office/drawing/2010/main" val="0"/>
@@ -20170,7 +20174,7 @@
           <p:nvPr/>
         </p:nvPicPr>
         <p:blipFill>
-          <a:blip r:embed="rId5">
+          <a:blip r:embed="rId5" cstate="hqprint">
             <a:extLst>
               <a:ext uri="{28A0092B-C50C-407E-A947-70E740481C1C}">
                 <a14:useLocalDpi xmlns:a14="http://schemas.microsoft.com/office/drawing/2010/main" val="0"/>
@@ -20376,7 +20380,7 @@
               <p:nvPr/>
             </p:nvPicPr>
             <p:blipFill>
-              <a:blip r:embed="rId6">
+              <a:blip r:embed="rId6" cstate="hqprint">
                 <a:biLevel thresh="25000"/>
                 <a:extLst>
                   <a:ext uri="{28A0092B-C50C-407E-A947-70E740481C1C}">
@@ -20596,7 +20600,7 @@
           <p:nvPr/>
         </p:nvPicPr>
         <p:blipFill>
-          <a:blip r:embed="rId7">
+          <a:blip r:embed="rId7" cstate="hqprint">
             <a:lum bright="70000" contrast="-70000"/>
             <a:extLst>
               <a:ext uri="{28A0092B-C50C-407E-A947-70E740481C1C}">
@@ -20697,7 +20701,7 @@
             <p:nvPr/>
           </p:nvPicPr>
           <p:blipFill>
-            <a:blip r:embed="rId8">
+            <a:blip r:embed="rId8" cstate="hqprint">
               <a:extLst>
                 <a:ext uri="{28A0092B-C50C-407E-A947-70E740481C1C}">
                   <a14:useLocalDpi xmlns:a14="http://schemas.microsoft.com/office/drawing/2010/main" val="0"/>
@@ -20773,7 +20777,7 @@
           <p:nvPr/>
         </p:nvPicPr>
         <p:blipFill>
-          <a:blip r:embed="rId9">
+          <a:blip r:embed="rId9" cstate="hqprint">
             <a:extLst>
               <a:ext uri="{28A0092B-C50C-407E-A947-70E740481C1C}">
                 <a14:useLocalDpi xmlns:a14="http://schemas.microsoft.com/office/drawing/2010/main" val="0"/>
@@ -20809,7 +20813,7 @@
           <p:nvPr/>
         </p:nvPicPr>
         <p:blipFill rotWithShape="1">
-          <a:blip r:embed="rId10">
+          <a:blip r:embed="rId10" cstate="hqprint">
             <a:lum bright="70000" contrast="-70000"/>
             <a:extLst>
               <a:ext uri="{28A0092B-C50C-407E-A947-70E740481C1C}">
@@ -20904,7 +20908,7 @@
             <p:nvPr/>
           </p:nvPicPr>
           <p:blipFill rotWithShape="1">
-            <a:blip r:embed="rId10">
+            <a:blip r:embed="rId10" cstate="hqprint">
               <a:lum bright="70000" contrast="-70000"/>
               <a:extLst>
                 <a:ext uri="{28A0092B-C50C-407E-A947-70E740481C1C}">
@@ -21226,7 +21230,7 @@
           <p:nvPr>
             <p:extLst>
               <p:ext uri="{D42A27DB-BD31-4B8C-83A1-F6EECF244321}">
-                <p14:modId xmlns:p14="http://schemas.microsoft.com/office/powerpoint/2010/main" val="3144204317"/>
+                <p14:modId xmlns:p14="http://schemas.microsoft.com/office/powerpoint/2010/main" val="2575115638"/>
               </p:ext>
             </p:extLst>
           </p:nvPr>
@@ -21287,8 +21291,21 @@
                       <a:pPr algn="ctr"/>
                       <a:r>
                         <a:rPr lang="en-IN" sz="1300" b="0" dirty="0"/>
-                        <a:t>NSKFDC Registration Number</a:t>
+                        <a:t>NSKFDC </a:t>
                       </a:r>
+                      <a:r>
+                        <a:rPr lang="en-IN" sz="1300" b="0" dirty="0" smtClean="0"/>
+                        <a:t>Reg.</a:t>
+                      </a:r>
+                      <a:r>
+                        <a:rPr lang="en-IN" sz="1300" b="0" baseline="0" dirty="0" smtClean="0"/>
+                        <a:t> </a:t>
+                      </a:r>
+                      <a:r>
+                        <a:rPr lang="en-IN" sz="1300" b="0" dirty="0" smtClean="0"/>
+                        <a:t>Number</a:t>
+                      </a:r>
+                      <a:endParaRPr lang="en-IN" sz="1300" b="0" dirty="0"/>
                     </a:p>
                   </a:txBody>
                   <a:tcPr marL="83617" marR="83617" marT="41809" marB="41809">
@@ -21583,7 +21600,7 @@
           <p:nvPr/>
         </p:nvPicPr>
         <p:blipFill>
-          <a:blip r:embed="rId3">
+          <a:blip r:embed="rId3" cstate="hqprint">
             <a:extLst>
               <a:ext uri="{28A0092B-C50C-407E-A947-70E740481C1C}">
                 <a14:useLocalDpi xmlns:a14="http://schemas.microsoft.com/office/drawing/2010/main" val="0"/>
@@ -21942,7 +21959,7 @@
           <p:nvPr/>
         </p:nvPicPr>
         <p:blipFill>
-          <a:blip r:embed="rId4">
+          <a:blip r:embed="rId4" cstate="hqprint">
             <a:extLst>
               <a:ext uri="{28A0092B-C50C-407E-A947-70E740481C1C}">
                 <a14:useLocalDpi xmlns:a14="http://schemas.microsoft.com/office/drawing/2010/main" val="0"/>
@@ -22353,7 +22370,7 @@
           <p:nvPr/>
         </p:nvPicPr>
         <p:blipFill>
-          <a:blip r:embed="rId5">
+          <a:blip r:embed="rId5" cstate="hqprint">
             <a:extLst>
               <a:ext uri="{28A0092B-C50C-407E-A947-70E740481C1C}">
                 <a14:useLocalDpi xmlns:a14="http://schemas.microsoft.com/office/drawing/2010/main" val="0"/>
@@ -22559,7 +22576,7 @@
               <p:nvPr/>
             </p:nvPicPr>
             <p:blipFill>
-              <a:blip r:embed="rId6">
+              <a:blip r:embed="rId6" cstate="hqprint">
                 <a:biLevel thresh="25000"/>
                 <a:extLst>
                   <a:ext uri="{28A0092B-C50C-407E-A947-70E740481C1C}">
@@ -22779,7 +22796,7 @@
           <p:nvPr/>
         </p:nvPicPr>
         <p:blipFill>
-          <a:blip r:embed="rId7">
+          <a:blip r:embed="rId7" cstate="hqprint">
             <a:lum bright="70000" contrast="-70000"/>
             <a:extLst>
               <a:ext uri="{28A0092B-C50C-407E-A947-70E740481C1C}">
@@ -22880,7 +22897,7 @@
             <p:nvPr/>
           </p:nvPicPr>
           <p:blipFill>
-            <a:blip r:embed="rId8">
+            <a:blip r:embed="rId8" cstate="hqprint">
               <a:extLst>
                 <a:ext uri="{28A0092B-C50C-407E-A947-70E740481C1C}">
                   <a14:useLocalDpi xmlns:a14="http://schemas.microsoft.com/office/drawing/2010/main" val="0"/>
@@ -22956,7 +22973,7 @@
           <p:nvPr/>
         </p:nvPicPr>
         <p:blipFill>
-          <a:blip r:embed="rId9">
+          <a:blip r:embed="rId9" cstate="hqprint">
             <a:extLst>
               <a:ext uri="{28A0092B-C50C-407E-A947-70E740481C1C}">
                 <a14:useLocalDpi xmlns:a14="http://schemas.microsoft.com/office/drawing/2010/main" val="0"/>
@@ -22992,7 +23009,7 @@
           <p:nvPr/>
         </p:nvPicPr>
         <p:blipFill rotWithShape="1">
-          <a:blip r:embed="rId10">
+          <a:blip r:embed="rId10" cstate="hqprint">
             <a:lum bright="70000" contrast="-70000"/>
             <a:extLst>
               <a:ext uri="{28A0092B-C50C-407E-A947-70E740481C1C}">
@@ -23087,7 +23104,7 @@
             <p:nvPr/>
           </p:nvPicPr>
           <p:blipFill rotWithShape="1">
-            <a:blip r:embed="rId10">
+            <a:blip r:embed="rId10" cstate="hqprint">
               <a:lum bright="70000" contrast="-70000"/>
               <a:extLst>
                 <a:ext uri="{28A0092B-C50C-407E-A947-70E740481C1C}">
@@ -23119,6 +23136,13 @@
   <p:clrMapOvr>
     <a:masterClrMapping/>
   </p:clrMapOvr>
+  <p:timing>
+    <p:tnLst>
+      <p:par>
+        <p:cTn id="1" dur="indefinite" restart="never" nodeType="tmRoot"/>
+      </p:par>
+    </p:tnLst>
+  </p:timing>
 </p:sld>
 </file>
 
@@ -23628,7 +23652,7 @@
           <p:nvPr/>
         </p:nvPicPr>
         <p:blipFill>
-          <a:blip r:embed="rId4">
+          <a:blip r:embed="rId4" cstate="hqprint">
             <a:extLst>
               <a:ext uri="{28A0092B-C50C-407E-A947-70E740481C1C}">
                 <a14:useLocalDpi xmlns:a14="http://schemas.microsoft.com/office/drawing/2010/main" val="0"/>
@@ -23987,7 +24011,7 @@
           <p:nvPr/>
         </p:nvPicPr>
         <p:blipFill>
-          <a:blip r:embed="rId5">
+          <a:blip r:embed="rId5" cstate="hqprint">
             <a:extLst>
               <a:ext uri="{28A0092B-C50C-407E-A947-70E740481C1C}">
                 <a14:useLocalDpi xmlns:a14="http://schemas.microsoft.com/office/drawing/2010/main" val="0"/>
@@ -24333,7 +24357,7 @@
           <p:nvPr/>
         </p:nvPicPr>
         <p:blipFill>
-          <a:blip r:embed="rId6">
+          <a:blip r:embed="rId6" cstate="hqprint">
             <a:extLst>
               <a:ext uri="{28A0092B-C50C-407E-A947-70E740481C1C}">
                 <a14:useLocalDpi xmlns:a14="http://schemas.microsoft.com/office/drawing/2010/main" val="0"/>
@@ -24539,7 +24563,7 @@
               <p:nvPr/>
             </p:nvPicPr>
             <p:blipFill>
-              <a:blip r:embed="rId7">
+              <a:blip r:embed="rId7" cstate="hqprint">
                 <a:biLevel thresh="25000"/>
                 <a:extLst>
                   <a:ext uri="{28A0092B-C50C-407E-A947-70E740481C1C}">
@@ -24759,7 +24783,7 @@
           <p:nvPr/>
         </p:nvPicPr>
         <p:blipFill>
-          <a:blip r:embed="rId8">
+          <a:blip r:embed="rId8" cstate="hqprint">
             <a:lum bright="70000" contrast="-70000"/>
             <a:extLst>
               <a:ext uri="{28A0092B-C50C-407E-A947-70E740481C1C}">
@@ -24860,7 +24884,7 @@
             <p:nvPr/>
           </p:nvPicPr>
           <p:blipFill>
-            <a:blip r:embed="rId9">
+            <a:blip r:embed="rId9" cstate="hqprint">
               <a:extLst>
                 <a:ext uri="{28A0092B-C50C-407E-A947-70E740481C1C}">
                   <a14:useLocalDpi xmlns:a14="http://schemas.microsoft.com/office/drawing/2010/main" val="0"/>
@@ -24936,7 +24960,7 @@
           <p:nvPr/>
         </p:nvPicPr>
         <p:blipFill>
-          <a:blip r:embed="rId10">
+          <a:blip r:embed="rId10" cstate="hqprint">
             <a:extLst>
               <a:ext uri="{28A0092B-C50C-407E-A947-70E740481C1C}">
                 <a14:useLocalDpi xmlns:a14="http://schemas.microsoft.com/office/drawing/2010/main" val="0"/>
@@ -24972,7 +24996,7 @@
           <p:nvPr/>
         </p:nvPicPr>
         <p:blipFill rotWithShape="1">
-          <a:blip r:embed="rId11">
+          <a:blip r:embed="rId11" cstate="hqprint">
             <a:lum bright="70000" contrast="-70000"/>
             <a:extLst>
               <a:ext uri="{28A0092B-C50C-407E-A947-70E740481C1C}">
@@ -25067,7 +25091,7 @@
             <p:nvPr/>
           </p:nvPicPr>
           <p:blipFill rotWithShape="1">
-            <a:blip r:embed="rId11">
+            <a:blip r:embed="rId11" cstate="hqprint">
               <a:lum bright="70000" contrast="-70000"/>
               <a:extLst>
                 <a:ext uri="{28A0092B-C50C-407E-A947-70E740481C1C}">
@@ -25163,6 +25187,13 @@
   <p:clrMapOvr>
     <a:masterClrMapping/>
   </p:clrMapOvr>
+  <p:timing>
+    <p:tnLst>
+      <p:par>
+        <p:cTn id="1" dur="indefinite" restart="never" nodeType="tmRoot"/>
+      </p:par>
+    </p:tnLst>
+  </p:timing>
 </p:sld>
 </file>
 
@@ -26366,7 +26397,7 @@
           <p:nvPr/>
         </p:nvPicPr>
         <p:blipFill>
-          <a:blip r:embed="rId3">
+          <a:blip r:embed="rId3" cstate="hqprint">
             <a:extLst>
               <a:ext uri="{28A0092B-C50C-407E-A947-70E740481C1C}">
                 <a14:useLocalDpi xmlns:a14="http://schemas.microsoft.com/office/drawing/2010/main" val="0"/>
@@ -27199,7 +27230,7 @@
           <p:nvPr/>
         </p:nvPicPr>
         <p:blipFill>
-          <a:blip r:embed="rId4">
+          <a:blip r:embed="rId4" cstate="hqprint">
             <a:extLst>
               <a:ext uri="{28A0092B-C50C-407E-A947-70E740481C1C}">
                 <a14:useLocalDpi xmlns:a14="http://schemas.microsoft.com/office/drawing/2010/main" val="0"/>
@@ -27651,7 +27682,7 @@
               <p:nvPr/>
             </p:nvPicPr>
             <p:blipFill>
-              <a:blip r:embed="rId5">
+              <a:blip r:embed="rId5" cstate="hqprint">
                 <a:biLevel thresh="25000"/>
                 <a:extLst>
                   <a:ext uri="{28A0092B-C50C-407E-A947-70E740481C1C}">
@@ -27745,7 +27776,7 @@
             <p:nvPr/>
           </p:nvPicPr>
           <p:blipFill>
-            <a:blip r:embed="rId6">
+            <a:blip r:embed="rId6" cstate="hqprint">
               <a:extLst>
                 <a:ext uri="{28A0092B-C50C-407E-A947-70E740481C1C}">
                   <a14:useLocalDpi xmlns:a14="http://schemas.microsoft.com/office/drawing/2010/main" val="0"/>
@@ -27901,7 +27932,7 @@
             <p:nvPr/>
           </p:nvPicPr>
           <p:blipFill>
-            <a:blip r:embed="rId7">
+            <a:blip r:embed="rId7" cstate="hqprint">
               <a:lum bright="70000" contrast="-70000"/>
               <a:extLst>
                 <a:ext uri="{28A0092B-C50C-407E-A947-70E740481C1C}">
@@ -28022,7 +28053,7 @@
           <p:nvPr/>
         </p:nvPicPr>
         <p:blipFill>
-          <a:blip r:embed="rId8">
+          <a:blip r:embed="rId8" cstate="hqprint">
             <a:extLst>
               <a:ext uri="{28A0092B-C50C-407E-A947-70E740481C1C}">
                 <a14:useLocalDpi xmlns:a14="http://schemas.microsoft.com/office/drawing/2010/main" val="0"/>
@@ -28117,7 +28148,7 @@
             <p:nvPr/>
           </p:nvPicPr>
           <p:blipFill>
-            <a:blip r:embed="rId9">
+            <a:blip r:embed="rId9" cstate="hqprint">
               <a:lum bright="70000" contrast="-70000"/>
               <a:extLst>
                 <a:ext uri="{28A0092B-C50C-407E-A947-70E740481C1C}">
@@ -28294,7 +28325,7 @@
           <p:nvPr/>
         </p:nvPicPr>
         <p:blipFill>
-          <a:blip r:embed="rId4">
+          <a:blip r:embed="rId4" cstate="hqprint">
             <a:extLst>
               <a:ext uri="{28A0092B-C50C-407E-A947-70E740481C1C}">
                 <a14:useLocalDpi xmlns:a14="http://schemas.microsoft.com/office/drawing/2010/main" val="0"/>
@@ -29660,7 +29691,7 @@
           <p:nvPr/>
         </p:nvPicPr>
         <p:blipFill>
-          <a:blip r:embed="rId3">
+          <a:blip r:embed="rId3" cstate="hqprint">
             <a:extLst>
               <a:ext uri="{28A0092B-C50C-407E-A947-70E740481C1C}">
                 <a14:useLocalDpi xmlns:a14="http://schemas.microsoft.com/office/drawing/2010/main" val="0"/>
@@ -30493,7 +30524,7 @@
           <p:nvPr/>
         </p:nvPicPr>
         <p:blipFill>
-          <a:blip r:embed="rId4">
+          <a:blip r:embed="rId4" cstate="hqprint">
             <a:extLst>
               <a:ext uri="{28A0092B-C50C-407E-A947-70E740481C1C}">
                 <a14:useLocalDpi xmlns:a14="http://schemas.microsoft.com/office/drawing/2010/main" val="0"/>
@@ -30945,7 +30976,7 @@
               <p:nvPr/>
             </p:nvPicPr>
             <p:blipFill>
-              <a:blip r:embed="rId5">
+              <a:blip r:embed="rId5" cstate="hqprint">
                 <a:biLevel thresh="25000"/>
                 <a:extLst>
                   <a:ext uri="{28A0092B-C50C-407E-A947-70E740481C1C}">
@@ -31039,7 +31070,7 @@
             <p:nvPr/>
           </p:nvPicPr>
           <p:blipFill>
-            <a:blip r:embed="rId6">
+            <a:blip r:embed="rId6" cstate="hqprint">
               <a:extLst>
                 <a:ext uri="{28A0092B-C50C-407E-A947-70E740481C1C}">
                   <a14:useLocalDpi xmlns:a14="http://schemas.microsoft.com/office/drawing/2010/main" val="0"/>
@@ -31155,7 +31186,7 @@
             <p:nvPr/>
           </p:nvPicPr>
           <p:blipFill>
-            <a:blip r:embed="rId7">
+            <a:blip r:embed="rId7" cstate="hqprint">
               <a:lum bright="70000" contrast="-70000"/>
               <a:extLst>
                 <a:ext uri="{28A0092B-C50C-407E-A947-70E740481C1C}">
@@ -31276,7 +31307,7 @@
           <p:nvPr/>
         </p:nvPicPr>
         <p:blipFill>
-          <a:blip r:embed="rId8">
+          <a:blip r:embed="rId8" cstate="hqprint">
             <a:extLst>
               <a:ext uri="{28A0092B-C50C-407E-A947-70E740481C1C}">
                 <a14:useLocalDpi xmlns:a14="http://schemas.microsoft.com/office/drawing/2010/main" val="0"/>
@@ -31371,7 +31402,7 @@
             <p:nvPr/>
           </p:nvPicPr>
           <p:blipFill>
-            <a:blip r:embed="rId9">
+            <a:blip r:embed="rId9" cstate="hqprint">
               <a:lum bright="70000" contrast="-70000"/>
               <a:extLst>
                 <a:ext uri="{28A0092B-C50C-407E-A947-70E740481C1C}">
@@ -31548,7 +31579,7 @@
           <p:nvPr/>
         </p:nvPicPr>
         <p:blipFill>
-          <a:blip r:embed="rId4">
+          <a:blip r:embed="rId4" cstate="hqprint">
             <a:extLst>
               <a:ext uri="{28A0092B-C50C-407E-A947-70E740481C1C}">
                 <a14:useLocalDpi xmlns:a14="http://schemas.microsoft.com/office/drawing/2010/main" val="0"/>
@@ -31998,269 +32029,6 @@
       </p:sp>
       <p:sp>
         <p:nvSpPr>
-          <p:cNvPr id="34" name="TextBox 33">
-            <a:extLst>
-              <a:ext uri="{FF2B5EF4-FFF2-40B4-BE49-F238E27FC236}">
-                <a16:creationId xmlns:a16="http://schemas.microsoft.com/office/drawing/2014/main" id="{58B54600-3910-4D30-A565-3F345745D6B3}"/>
-              </a:ext>
-            </a:extLst>
-          </p:cNvPr>
-          <p:cNvSpPr txBox="1"/>
-          <p:nvPr/>
-        </p:nvSpPr>
-        <p:spPr>
-          <a:xfrm>
-            <a:off x="2714623" y="3065848"/>
-            <a:ext cx="3000375" cy="430887"/>
-          </a:xfrm>
-          <a:prstGeom prst="rect">
-            <a:avLst/>
-          </a:prstGeom>
-          <a:noFill/>
-        </p:spPr>
-        <p:txBody>
-          <a:bodyPr wrap="square" rtlCol="0">
-            <a:spAutoFit/>
-          </a:bodyPr>
-          <a:lstStyle/>
-          <a:p>
-            <a:r>
-              <a:rPr lang="en-IN" sz="2200" dirty="0">
-                <a:solidFill>
-                  <a:schemeClr val="bg2">
-                    <a:lumMod val="50000"/>
-                  </a:schemeClr>
-                </a:solidFill>
-              </a:rPr>
-              <a:t>Report History</a:t>
-            </a:r>
-          </a:p>
-        </p:txBody>
-      </p:sp>
-      <p:graphicFrame>
-        <p:nvGraphicFramePr>
-          <p:cNvPr id="35" name="Table 34">
-            <a:extLst>
-              <a:ext uri="{FF2B5EF4-FFF2-40B4-BE49-F238E27FC236}">
-                <a16:creationId xmlns:a16="http://schemas.microsoft.com/office/drawing/2014/main" id="{CE18AB73-01A7-49E4-AA8B-040F0B8A0A14}"/>
-              </a:ext>
-            </a:extLst>
-          </p:cNvPr>
-          <p:cNvGraphicFramePr>
-            <a:graphicFrameLocks noGrp="1"/>
-          </p:cNvGraphicFramePr>
-          <p:nvPr>
-            <p:extLst>
-              <p:ext uri="{D42A27DB-BD31-4B8C-83A1-F6EECF244321}">
-                <p14:modId xmlns:p14="http://schemas.microsoft.com/office/powerpoint/2010/main" val="636497424"/>
-              </p:ext>
-            </p:extLst>
-          </p:nvPr>
-        </p:nvGraphicFramePr>
-        <p:xfrm>
-          <a:off x="2941069" y="4157692"/>
-          <a:ext cx="6551723" cy="718746"/>
-        </p:xfrm>
-        <a:graphic>
-          <a:graphicData uri="http://schemas.openxmlformats.org/drawingml/2006/table">
-            <a:tbl>
-              <a:tblPr firstRow="1" bandRow="1">
-                <a:tableStyleId>{5C22544A-7EE6-4342-B048-85BDC9FD1C3A}</a:tableStyleId>
-              </a:tblPr>
-              <a:tblGrid>
-                <a:gridCol w="1277169">
-                  <a:extLst>
-                    <a:ext uri="{9D8B030D-6E8A-4147-A177-3AD203B41FA5}">
-                      <a16:colId xmlns:a16="http://schemas.microsoft.com/office/drawing/2014/main" val="1597196308"/>
-                    </a:ext>
-                  </a:extLst>
-                </a:gridCol>
-                <a:gridCol w="1729363">
-                  <a:extLst>
-                    <a:ext uri="{9D8B030D-6E8A-4147-A177-3AD203B41FA5}">
-                      <a16:colId xmlns:a16="http://schemas.microsoft.com/office/drawing/2014/main" val="3584522483"/>
-                    </a:ext>
-                  </a:extLst>
-                </a:gridCol>
-                <a:gridCol w="1712068">
-                  <a:extLst>
-                    <a:ext uri="{9D8B030D-6E8A-4147-A177-3AD203B41FA5}">
-                      <a16:colId xmlns:a16="http://schemas.microsoft.com/office/drawing/2014/main" val="3409575032"/>
-                    </a:ext>
-                  </a:extLst>
-                </a:gridCol>
-                <a:gridCol w="1833123">
-                  <a:extLst>
-                    <a:ext uri="{9D8B030D-6E8A-4147-A177-3AD203B41FA5}">
-                      <a16:colId xmlns:a16="http://schemas.microsoft.com/office/drawing/2014/main" val="213668288"/>
-                    </a:ext>
-                  </a:extLst>
-                </a:gridCol>
-              </a:tblGrid>
-              <a:tr h="0">
-                <a:tc>
-                  <a:txBody>
-                    <a:bodyPr/>
-                    <a:lstStyle/>
-                    <a:p>
-                      <a:pPr algn="ctr"/>
-                      <a:r>
-                        <a:rPr lang="en-IN" sz="1300" b="0" dirty="0"/>
-                        <a:t>Batch Id</a:t>
-                      </a:r>
-                    </a:p>
-                  </a:txBody>
-                  <a:tcPr marL="83617" marR="83617" marT="41809" marB="41809">
-                    <a:solidFill>
-                      <a:srgbClr val="008BAC"/>
-                    </a:solidFill>
-                  </a:tcPr>
-                </a:tc>
-                <a:tc>
-                  <a:txBody>
-                    <a:bodyPr/>
-                    <a:lstStyle/>
-                    <a:p>
-                      <a:pPr algn="ctr"/>
-                      <a:r>
-                        <a:rPr lang="en-IN" sz="1300" b="0" dirty="0"/>
-                        <a:t>Type</a:t>
-                      </a:r>
-                    </a:p>
-                  </a:txBody>
-                  <a:tcPr marL="83617" marR="83617" marT="41809" marB="41809">
-                    <a:solidFill>
-                      <a:srgbClr val="008BAC"/>
-                    </a:solidFill>
-                  </a:tcPr>
-                </a:tc>
-                <a:tc>
-                  <a:txBody>
-                    <a:bodyPr/>
-                    <a:lstStyle/>
-                    <a:p>
-                      <a:pPr algn="ctr"/>
-                      <a:r>
-                        <a:rPr lang="en-IN" sz="1300" b="0" dirty="0"/>
-                        <a:t>Generated On</a:t>
-                      </a:r>
-                    </a:p>
-                  </a:txBody>
-                  <a:tcPr marL="83617" marR="83617" marT="41809" marB="41809">
-                    <a:solidFill>
-                      <a:srgbClr val="008BAC"/>
-                    </a:solidFill>
-                  </a:tcPr>
-                </a:tc>
-                <a:tc>
-                  <a:txBody>
-                    <a:bodyPr/>
-                    <a:lstStyle/>
-                    <a:p>
-                      <a:pPr algn="ctr"/>
-                      <a:r>
-                        <a:rPr lang="en-IN" sz="1300" b="0" dirty="0"/>
-                        <a:t>Generated By</a:t>
-                      </a:r>
-                    </a:p>
-                  </a:txBody>
-                  <a:tcPr marL="83617" marR="83617" marT="41809" marB="41809">
-                    <a:solidFill>
-                      <a:srgbClr val="008BAC"/>
-                    </a:solidFill>
-                  </a:tcPr>
-                </a:tc>
-                <a:extLst>
-                  <a:ext uri="{0D108BD9-81ED-4DB2-BD59-A6C34878D82A}">
-                    <a16:rowId xmlns:a16="http://schemas.microsoft.com/office/drawing/2014/main" val="4274047974"/>
-                  </a:ext>
-                </a:extLst>
-              </a:tr>
-              <a:tr h="437008">
-                <a:tc>
-                  <a:txBody>
-                    <a:bodyPr/>
-                    <a:lstStyle/>
-                    <a:p>
-                      <a:pPr algn="ctr"/>
-                      <a:r>
-                        <a:rPr lang="en-IN" sz="1300" b="0" dirty="0"/>
-                        <a:t>BS-1232</a:t>
-                      </a:r>
-                    </a:p>
-                  </a:txBody>
-                  <a:tcPr marL="83617" marR="83617" marT="41809" marB="41809">
-                    <a:solidFill>
-                      <a:schemeClr val="bg2"/>
-                    </a:solidFill>
-                  </a:tcPr>
-                </a:tc>
-                <a:tc>
-                  <a:txBody>
-                    <a:bodyPr/>
-                    <a:lstStyle/>
-                    <a:p>
-                      <a:pPr algn="ctr"/>
-                      <a:r>
-                        <a:rPr lang="en-IN" sz="1300" b="0" dirty="0"/>
-                        <a:t>Occupation Certificate</a:t>
-                      </a:r>
-                    </a:p>
-                  </a:txBody>
-                  <a:tcPr marL="83617" marR="83617" marT="41809" marB="41809">
-                    <a:solidFill>
-                      <a:schemeClr val="bg2"/>
-                    </a:solidFill>
-                  </a:tcPr>
-                </a:tc>
-                <a:tc>
-                  <a:txBody>
-                    <a:bodyPr/>
-                    <a:lstStyle/>
-                    <a:p>
-                      <a:pPr algn="ctr"/>
-                      <a:r>
-                        <a:rPr lang="en-IN" sz="1300" b="0" dirty="0"/>
-                        <a:t>26-03-2018</a:t>
-                      </a:r>
-                    </a:p>
-                  </a:txBody>
-                  <a:tcPr marL="83617" marR="83617" marT="41809" marB="41809">
-                    <a:solidFill>
-                      <a:schemeClr val="bg2"/>
-                    </a:solidFill>
-                  </a:tcPr>
-                </a:tc>
-                <a:tc>
-                  <a:txBody>
-                    <a:bodyPr/>
-                    <a:lstStyle/>
-                    <a:p>
-                      <a:pPr algn="ctr"/>
-                      <a:r>
-                        <a:rPr lang="en-IN" sz="1300" b="0" dirty="0"/>
-                        <a:t>Ram Kumar</a:t>
-                      </a:r>
-                    </a:p>
-                  </a:txBody>
-                  <a:tcPr marL="83617" marR="83617" marT="41809" marB="41809">
-                    <a:solidFill>
-                      <a:schemeClr val="bg2"/>
-                    </a:solidFill>
-                  </a:tcPr>
-                </a:tc>
-                <a:extLst>
-                  <a:ext uri="{0D108BD9-81ED-4DB2-BD59-A6C34878D82A}">
-                    <a16:rowId xmlns:a16="http://schemas.microsoft.com/office/drawing/2014/main" val="4180875282"/>
-                  </a:ext>
-                </a:extLst>
-              </a:tr>
-            </a:tbl>
-          </a:graphicData>
-        </a:graphic>
-      </p:graphicFrame>
-      <p:sp>
-        <p:nvSpPr>
           <p:cNvPr id="41" name="Rectangle 40">
             <a:extLst>
               <a:ext uri="{FF2B5EF4-FFF2-40B4-BE49-F238E27FC236}">
@@ -32313,10 +32081,10 @@
       </p:sp>
       <p:sp>
         <p:nvSpPr>
-          <p:cNvPr id="45" name="Rectangle: Rounded Corners 44">
-            <a:extLst>
-              <a:ext uri="{FF2B5EF4-FFF2-40B4-BE49-F238E27FC236}">
-                <a16:creationId xmlns:a16="http://schemas.microsoft.com/office/drawing/2014/main" id="{80C72A5E-F2D7-43AE-8BD8-F389B6CCCE64}"/>
+          <p:cNvPr id="56" name="Rectangle: Rounded Corners 55">
+            <a:extLst>
+              <a:ext uri="{FF2B5EF4-FFF2-40B4-BE49-F238E27FC236}">
+                <a16:creationId xmlns:a16="http://schemas.microsoft.com/office/drawing/2014/main" id="{3C6C0E24-F455-4EC1-B1D0-F5402FA45414}"/>
               </a:ext>
             </a:extLst>
           </p:cNvPr>
@@ -32325,8 +32093,8 @@
         </p:nvSpPr>
         <p:spPr>
           <a:xfrm>
-            <a:off x="2994259" y="3525950"/>
-            <a:ext cx="2782939" cy="305612"/>
+            <a:off x="3044855" y="2105097"/>
+            <a:ext cx="3068078" cy="422168"/>
           </a:xfrm>
           <a:prstGeom prst="roundRect">
             <a:avLst/>
@@ -32362,7 +32130,6 @@
           <a:bodyPr rtlCol="0" anchor="ctr"/>
           <a:lstStyle/>
           <a:p>
-            <a:pPr algn="ctr"/>
             <a:r>
               <a:rPr lang="en-IN" sz="1646" dirty="0">
                 <a:solidFill>
@@ -32371,17 +32138,53 @@
                   </a:schemeClr>
                 </a:solidFill>
               </a:rPr>
-              <a:t>Enter Batch Id</a:t>
+              <a:t> Select Report to be Generated</a:t>
             </a:r>
           </a:p>
         </p:txBody>
       </p:sp>
+      <p:pic>
+        <p:nvPicPr>
+          <p:cNvPr id="59" name="Picture 58">
+            <a:extLst>
+              <a:ext uri="{FF2B5EF4-FFF2-40B4-BE49-F238E27FC236}">
+                <a16:creationId xmlns:a16="http://schemas.microsoft.com/office/drawing/2014/main" id="{01CFCF11-C2EB-40B4-97B6-DF5B3BBA3F43}"/>
+              </a:ext>
+            </a:extLst>
+          </p:cNvPr>
+          <p:cNvPicPr>
+            <a:picLocks noChangeAspect="1"/>
+          </p:cNvPicPr>
+          <p:nvPr/>
+        </p:nvPicPr>
+        <p:blipFill>
+          <a:blip r:embed="rId2" cstate="hqprint">
+            <a:extLst>
+              <a:ext uri="{28A0092B-C50C-407E-A947-70E740481C1C}">
+                <a14:useLocalDpi xmlns:a14="http://schemas.microsoft.com/office/drawing/2010/main" val="0"/>
+              </a:ext>
+            </a:extLst>
+          </a:blip>
+          <a:stretch>
+            <a:fillRect/>
+          </a:stretch>
+        </p:blipFill>
+        <p:spPr>
+          <a:xfrm rot="10800000" flipH="1" flipV="1">
+            <a:off x="5880403" y="2259646"/>
+            <a:ext cx="163269" cy="163269"/>
+          </a:xfrm>
+          <a:prstGeom prst="rect">
+            <a:avLst/>
+          </a:prstGeom>
+        </p:spPr>
+      </p:pic>
       <p:sp>
         <p:nvSpPr>
-          <p:cNvPr id="46" name="Rectangle: Rounded Corners 45">
-            <a:extLst>
-              <a:ext uri="{FF2B5EF4-FFF2-40B4-BE49-F238E27FC236}">
-                <a16:creationId xmlns:a16="http://schemas.microsoft.com/office/drawing/2014/main" id="{09AE6569-0AC4-4EA0-BBC4-67A04F669A26}"/>
+          <p:cNvPr id="66" name="Rectangle: Rounded Corners 65">
+            <a:extLst>
+              <a:ext uri="{FF2B5EF4-FFF2-40B4-BE49-F238E27FC236}">
+                <a16:creationId xmlns:a16="http://schemas.microsoft.com/office/drawing/2014/main" id="{D16E2C95-2500-4287-8CDD-97854E6CD4FD}"/>
               </a:ext>
             </a:extLst>
           </p:cNvPr>
@@ -32390,8 +32193,8 @@
         </p:nvSpPr>
         <p:spPr>
           <a:xfrm>
-            <a:off x="6013248" y="3534371"/>
-            <a:ext cx="973247" cy="297191"/>
+            <a:off x="8806502" y="2107480"/>
+            <a:ext cx="1813374" cy="443272"/>
           </a:xfrm>
           <a:prstGeom prst="roundRect">
             <a:avLst/>
@@ -32431,166 +32234,6 @@
             <a:pPr algn="ctr"/>
             <a:r>
               <a:rPr lang="en-IN" sz="1646" dirty="0"/>
-              <a:t>Search</a:t>
-            </a:r>
-          </a:p>
-        </p:txBody>
-      </p:sp>
-      <p:sp>
-        <p:nvSpPr>
-          <p:cNvPr id="56" name="Rectangle: Rounded Corners 55">
-            <a:extLst>
-              <a:ext uri="{FF2B5EF4-FFF2-40B4-BE49-F238E27FC236}">
-                <a16:creationId xmlns:a16="http://schemas.microsoft.com/office/drawing/2014/main" id="{3C6C0E24-F455-4EC1-B1D0-F5402FA45414}"/>
-              </a:ext>
-            </a:extLst>
-          </p:cNvPr>
-          <p:cNvSpPr/>
-          <p:nvPr/>
-        </p:nvSpPr>
-        <p:spPr>
-          <a:xfrm>
-            <a:off x="3044855" y="2105097"/>
-            <a:ext cx="3068078" cy="422168"/>
-          </a:xfrm>
-          <a:prstGeom prst="roundRect">
-            <a:avLst/>
-          </a:prstGeom>
-          <a:solidFill>
-            <a:schemeClr val="bg1"/>
-          </a:solidFill>
-          <a:ln>
-            <a:solidFill>
-              <a:schemeClr val="bg2">
-                <a:lumMod val="50000"/>
-              </a:schemeClr>
-            </a:solidFill>
-          </a:ln>
-        </p:spPr>
-        <p:style>
-          <a:lnRef idx="2">
-            <a:schemeClr val="accent1">
-              <a:shade val="50000"/>
-            </a:schemeClr>
-          </a:lnRef>
-          <a:fillRef idx="1">
-            <a:schemeClr val="accent1"/>
-          </a:fillRef>
-          <a:effectRef idx="0">
-            <a:schemeClr val="accent1"/>
-          </a:effectRef>
-          <a:fontRef idx="minor">
-            <a:schemeClr val="lt1"/>
-          </a:fontRef>
-        </p:style>
-        <p:txBody>
-          <a:bodyPr rtlCol="0" anchor="ctr"/>
-          <a:lstStyle/>
-          <a:p>
-            <a:r>
-              <a:rPr lang="en-IN" sz="1646" dirty="0">
-                <a:solidFill>
-                  <a:schemeClr val="bg2">
-                    <a:lumMod val="50000"/>
-                  </a:schemeClr>
-                </a:solidFill>
-              </a:rPr>
-              <a:t> Select Report to be Generated</a:t>
-            </a:r>
-          </a:p>
-        </p:txBody>
-      </p:sp>
-      <p:pic>
-        <p:nvPicPr>
-          <p:cNvPr id="59" name="Picture 58">
-            <a:extLst>
-              <a:ext uri="{FF2B5EF4-FFF2-40B4-BE49-F238E27FC236}">
-                <a16:creationId xmlns:a16="http://schemas.microsoft.com/office/drawing/2014/main" id="{01CFCF11-C2EB-40B4-97B6-DF5B3BBA3F43}"/>
-              </a:ext>
-            </a:extLst>
-          </p:cNvPr>
-          <p:cNvPicPr>
-            <a:picLocks noChangeAspect="1"/>
-          </p:cNvPicPr>
-          <p:nvPr/>
-        </p:nvPicPr>
-        <p:blipFill>
-          <a:blip r:embed="rId2">
-            <a:extLst>
-              <a:ext uri="{28A0092B-C50C-407E-A947-70E740481C1C}">
-                <a14:useLocalDpi xmlns:a14="http://schemas.microsoft.com/office/drawing/2010/main" val="0"/>
-              </a:ext>
-            </a:extLst>
-          </a:blip>
-          <a:stretch>
-            <a:fillRect/>
-          </a:stretch>
-        </p:blipFill>
-        <p:spPr>
-          <a:xfrm rot="10800000" flipH="1" flipV="1">
-            <a:off x="5880403" y="2259646"/>
-            <a:ext cx="163269" cy="163269"/>
-          </a:xfrm>
-          <a:prstGeom prst="rect">
-            <a:avLst/>
-          </a:prstGeom>
-        </p:spPr>
-      </p:pic>
-      <p:sp>
-        <p:nvSpPr>
-          <p:cNvPr id="66" name="Rectangle: Rounded Corners 65">
-            <a:extLst>
-              <a:ext uri="{FF2B5EF4-FFF2-40B4-BE49-F238E27FC236}">
-                <a16:creationId xmlns:a16="http://schemas.microsoft.com/office/drawing/2014/main" id="{D16E2C95-2500-4287-8CDD-97854E6CD4FD}"/>
-              </a:ext>
-            </a:extLst>
-          </p:cNvPr>
-          <p:cNvSpPr/>
-          <p:nvPr/>
-        </p:nvSpPr>
-        <p:spPr>
-          <a:xfrm>
-            <a:off x="8806502" y="2107480"/>
-            <a:ext cx="1813374" cy="443272"/>
-          </a:xfrm>
-          <a:prstGeom prst="roundRect">
-            <a:avLst/>
-          </a:prstGeom>
-          <a:solidFill>
-            <a:srgbClr val="00B0F0"/>
-          </a:solidFill>
-          <a:ln>
-            <a:solidFill>
-              <a:schemeClr val="accent1">
-                <a:lumMod val="60000"/>
-                <a:lumOff val="40000"/>
-              </a:schemeClr>
-            </a:solidFill>
-          </a:ln>
-        </p:spPr>
-        <p:style>
-          <a:lnRef idx="2">
-            <a:schemeClr val="accent1">
-              <a:shade val="50000"/>
-            </a:schemeClr>
-          </a:lnRef>
-          <a:fillRef idx="1">
-            <a:schemeClr val="accent1"/>
-          </a:fillRef>
-          <a:effectRef idx="0">
-            <a:schemeClr val="accent1"/>
-          </a:effectRef>
-          <a:fontRef idx="minor">
-            <a:schemeClr val="lt1"/>
-          </a:fontRef>
-        </p:style>
-        <p:txBody>
-          <a:bodyPr rtlCol="0" anchor="ctr"/>
-          <a:lstStyle/>
-          <a:p>
-            <a:pPr algn="ctr"/>
-            <a:r>
-              <a:rPr lang="en-IN" sz="1646" dirty="0"/>
               <a:t>Generate Report</a:t>
             </a:r>
           </a:p>
@@ -32611,7 +32254,7 @@
           <p:nvPr/>
         </p:nvPicPr>
         <p:blipFill>
-          <a:blip r:embed="rId3">
+          <a:blip r:embed="rId3" cstate="hqprint">
             <a:extLst>
               <a:ext uri="{28A0092B-C50C-407E-A947-70E740481C1C}">
                 <a14:useLocalDpi xmlns:a14="http://schemas.microsoft.com/office/drawing/2010/main" val="0"/>
@@ -32817,7 +32460,7 @@
               <p:nvPr/>
             </p:nvPicPr>
             <p:blipFill>
-              <a:blip r:embed="rId4">
+              <a:blip r:embed="rId4" cstate="hqprint">
                 <a:biLevel thresh="25000"/>
                 <a:extLst>
                   <a:ext uri="{28A0092B-C50C-407E-A947-70E740481C1C}">
@@ -32911,7 +32554,7 @@
             <p:nvPr/>
           </p:nvPicPr>
           <p:blipFill>
-            <a:blip r:embed="rId5">
+            <a:blip r:embed="rId5" cstate="hqprint">
               <a:extLst>
                 <a:ext uri="{28A0092B-C50C-407E-A947-70E740481C1C}">
                   <a14:useLocalDpi xmlns:a14="http://schemas.microsoft.com/office/drawing/2010/main" val="0"/>
@@ -33067,7 +32710,7 @@
             <p:nvPr/>
           </p:nvPicPr>
           <p:blipFill>
-            <a:blip r:embed="rId6">
+            <a:blip r:embed="rId6" cstate="hqprint">
               <a:lum bright="70000" contrast="-70000"/>
               <a:extLst>
                 <a:ext uri="{28A0092B-C50C-407E-A947-70E740481C1C}">
@@ -33188,7 +32831,7 @@
           <p:nvPr/>
         </p:nvPicPr>
         <p:blipFill>
-          <a:blip r:embed="rId7">
+          <a:blip r:embed="rId7" cstate="hqprint">
             <a:extLst>
               <a:ext uri="{28A0092B-C50C-407E-A947-70E740481C1C}">
                 <a14:useLocalDpi xmlns:a14="http://schemas.microsoft.com/office/drawing/2010/main" val="0"/>
@@ -33283,7 +32926,7 @@
             <p:nvPr/>
           </p:nvPicPr>
           <p:blipFill>
-            <a:blip r:embed="rId8">
+            <a:blip r:embed="rId8" cstate="hqprint">
               <a:lum bright="70000" contrast="-70000"/>
               <a:extLst>
                 <a:ext uri="{28A0092B-C50C-407E-A947-70E740481C1C}">
@@ -33381,105 +33024,21 @@
           </a:prstGeom>
         </p:spPr>
       </p:pic>
-    </p:spTree>
-    <p:extLst>
-      <p:ext uri="{BB962C8B-B14F-4D97-AF65-F5344CB8AC3E}">
-        <p14:creationId xmlns:p14="http://schemas.microsoft.com/office/powerpoint/2010/main" val="3559704554"/>
-      </p:ext>
-    </p:extLst>
-  </p:cSld>
-  <p:clrMapOvr>
-    <a:masterClrMapping/>
-  </p:clrMapOvr>
-</p:sld>
-</file>
-
-<file path=ppt/slides/slide5.xml><?xml version="1.0" encoding="utf-8"?>
-<p:sld xmlns:a="http://schemas.openxmlformats.org/drawingml/2006/main" xmlns:r="http://schemas.openxmlformats.org/officeDocument/2006/relationships" xmlns:p="http://schemas.openxmlformats.org/presentationml/2006/main">
-  <p:cSld>
-    <p:spTree>
-      <p:nvGrpSpPr>
-        <p:cNvPr id="1" name=""/>
-        <p:cNvGrpSpPr/>
-        <p:nvPr/>
-      </p:nvGrpSpPr>
-      <p:grpSpPr>
-        <a:xfrm>
-          <a:off x="0" y="0"/>
-          <a:ext cx="0" cy="0"/>
-          <a:chOff x="0" y="0"/>
-          <a:chExt cx="0" cy="0"/>
-        </a:xfrm>
-      </p:grpSpPr>
       <p:sp>
         <p:nvSpPr>
-          <p:cNvPr id="31" name="Rectangle 30">
-            <a:extLst>
-              <a:ext uri="{FF2B5EF4-FFF2-40B4-BE49-F238E27FC236}">
-                <a16:creationId xmlns:a16="http://schemas.microsoft.com/office/drawing/2014/main" id="{609BC7F1-A595-43A2-A591-869F095F504B}"/>
-              </a:ext>
-            </a:extLst>
-          </p:cNvPr>
-          <p:cNvSpPr/>
+          <p:cNvPr id="36" name="TextBox 35">
+            <a:extLst>
+              <a:ext uri="{FF2B5EF4-FFF2-40B4-BE49-F238E27FC236}">
+                <a16:creationId xmlns:a16="http://schemas.microsoft.com/office/drawing/2014/main" id="{58B54600-3910-4D30-A565-3F345745D6B3}"/>
+              </a:ext>
+            </a:extLst>
+          </p:cNvPr>
+          <p:cNvSpPr txBox="1"/>
           <p:nvPr/>
         </p:nvSpPr>
         <p:spPr>
           <a:xfrm>
-            <a:off x="2641733" y="1051006"/>
-            <a:ext cx="9833410" cy="5825124"/>
-          </a:xfrm>
-          <a:prstGeom prst="rect">
-            <a:avLst/>
-          </a:prstGeom>
-          <a:solidFill>
-            <a:schemeClr val="bg2">
-              <a:alpha val="15000"/>
-            </a:schemeClr>
-          </a:solidFill>
-          <a:ln>
-            <a:noFill/>
-          </a:ln>
-        </p:spPr>
-        <p:style>
-          <a:lnRef idx="2">
-            <a:schemeClr val="accent1">
-              <a:shade val="50000"/>
-            </a:schemeClr>
-          </a:lnRef>
-          <a:fillRef idx="1">
-            <a:schemeClr val="accent1"/>
-          </a:fillRef>
-          <a:effectRef idx="0">
-            <a:schemeClr val="accent1"/>
-          </a:effectRef>
-          <a:fontRef idx="minor">
-            <a:schemeClr val="lt1"/>
-          </a:fontRef>
-        </p:style>
-        <p:txBody>
-          <a:bodyPr rtlCol="0" anchor="ctr"/>
-          <a:lstStyle/>
-          <a:p>
-            <a:pPr algn="ctr"/>
-            <a:endParaRPr lang="en-IN" sz="1646" dirty="0"/>
-          </a:p>
-        </p:txBody>
-      </p:sp>
-      <p:sp>
-        <p:nvSpPr>
-          <p:cNvPr id="33" name="TextBox 32">
-            <a:extLst>
-              <a:ext uri="{FF2B5EF4-FFF2-40B4-BE49-F238E27FC236}">
-                <a16:creationId xmlns:a16="http://schemas.microsoft.com/office/drawing/2014/main" id="{A396A9AE-DC32-4DEF-87D8-563BEAC3D050}"/>
-              </a:ext>
-            </a:extLst>
-          </p:cNvPr>
-          <p:cNvSpPr txBox="1"/>
-          <p:nvPr/>
-        </p:nvSpPr>
-        <p:spPr>
-          <a:xfrm>
-            <a:off x="2714625" y="1358350"/>
+            <a:off x="2714623" y="3065848"/>
             <a:ext cx="3000375" cy="430887"/>
           </a:xfrm>
           <a:prstGeom prst="rect">
@@ -33501,55 +33060,14 @@
                   </a:schemeClr>
                 </a:solidFill>
               </a:rPr>
-              <a:t>Generate Reports</a:t>
-            </a:r>
-          </a:p>
-        </p:txBody>
-      </p:sp>
-      <p:sp>
-        <p:nvSpPr>
-          <p:cNvPr id="34" name="TextBox 33">
-            <a:extLst>
-              <a:ext uri="{FF2B5EF4-FFF2-40B4-BE49-F238E27FC236}">
-                <a16:creationId xmlns:a16="http://schemas.microsoft.com/office/drawing/2014/main" id="{58B54600-3910-4D30-A565-3F345745D6B3}"/>
-              </a:ext>
-            </a:extLst>
-          </p:cNvPr>
-          <p:cNvSpPr txBox="1"/>
-          <p:nvPr/>
-        </p:nvSpPr>
-        <p:spPr>
-          <a:xfrm>
-            <a:off x="2714623" y="3065848"/>
-            <a:ext cx="3000375" cy="430887"/>
-          </a:xfrm>
-          <a:prstGeom prst="rect">
-            <a:avLst/>
-          </a:prstGeom>
-          <a:noFill/>
-        </p:spPr>
-        <p:txBody>
-          <a:bodyPr wrap="square" rtlCol="0">
-            <a:spAutoFit/>
-          </a:bodyPr>
-          <a:lstStyle/>
-          <a:p>
-            <a:r>
-              <a:rPr lang="en-IN" sz="2200" dirty="0">
-                <a:solidFill>
-                  <a:schemeClr val="bg2">
-                    <a:lumMod val="50000"/>
-                  </a:schemeClr>
-                </a:solidFill>
-              </a:rPr>
-              <a:t>Report History</a:t>
+              <a:t>Audit Table</a:t>
             </a:r>
           </a:p>
         </p:txBody>
       </p:sp>
       <p:graphicFrame>
         <p:nvGraphicFramePr>
-          <p:cNvPr id="35" name="Table 34">
+          <p:cNvPr id="42" name="Table 41">
             <a:extLst>
               <a:ext uri="{FF2B5EF4-FFF2-40B4-BE49-F238E27FC236}">
                 <a16:creationId xmlns:a16="http://schemas.microsoft.com/office/drawing/2014/main" id="{CE18AB73-01A7-49E4-AA8B-040F0B8A0A14}"/>
@@ -33562,13 +33080,13 @@
           <p:nvPr>
             <p:extLst>
               <p:ext uri="{D42A27DB-BD31-4B8C-83A1-F6EECF244321}">
-                <p14:modId xmlns:p14="http://schemas.microsoft.com/office/powerpoint/2010/main" val="1919273122"/>
+                <p14:modId xmlns:p14="http://schemas.microsoft.com/office/powerpoint/2010/main" val="2591938365"/>
               </p:ext>
             </p:extLst>
           </p:nvPr>
         </p:nvGraphicFramePr>
         <p:xfrm>
-          <a:off x="2941069" y="4099874"/>
+          <a:off x="2921289" y="3720266"/>
           <a:ext cx="6551723" cy="821841"/>
         </p:xfrm>
         <a:graphic>
@@ -33749,7 +33267,259 @@
                       <a:pPr algn="ctr"/>
                       <a:r>
                         <a:rPr lang="en-IN" sz="1300" b="0" dirty="0"/>
-                        <a:t>Ram Kumar</a:t>
+                        <a:t>Kam Avida</a:t>
+                      </a:r>
+                    </a:p>
+                  </a:txBody>
+                  <a:tcPr marL="83617" marR="83617" marT="41809" marB="41809">
+                    <a:solidFill>
+                      <a:schemeClr val="bg2"/>
+                    </a:solidFill>
+                  </a:tcPr>
+                </a:tc>
+                <a:extLst>
+                  <a:ext uri="{0D108BD9-81ED-4DB2-BD59-A6C34878D82A}">
+                    <a16:rowId xmlns:a16="http://schemas.microsoft.com/office/drawing/2014/main" val="4180875282"/>
+                  </a:ext>
+                </a:extLst>
+              </a:tr>
+            </a:tbl>
+          </a:graphicData>
+        </a:graphic>
+      </p:graphicFrame>
+    </p:spTree>
+    <p:extLst>
+      <p:ext uri="{BB962C8B-B14F-4D97-AF65-F5344CB8AC3E}">
+        <p14:creationId xmlns:p14="http://schemas.microsoft.com/office/powerpoint/2010/main" val="3559704554"/>
+      </p:ext>
+    </p:extLst>
+  </p:cSld>
+  <p:clrMapOvr>
+    <a:masterClrMapping/>
+  </p:clrMapOvr>
+</p:sld>
+</file>
+
+<file path=ppt/slides/slide5.xml><?xml version="1.0" encoding="utf-8"?>
+<p:sld xmlns:a="http://schemas.openxmlformats.org/drawingml/2006/main" xmlns:r="http://schemas.openxmlformats.org/officeDocument/2006/relationships" xmlns:p="http://schemas.openxmlformats.org/presentationml/2006/main">
+  <p:cSld>
+    <p:spTree>
+      <p:nvGrpSpPr>
+        <p:cNvPr id="1" name=""/>
+        <p:cNvGrpSpPr/>
+        <p:nvPr/>
+      </p:nvGrpSpPr>
+      <p:grpSpPr>
+        <a:xfrm>
+          <a:off x="0" y="0"/>
+          <a:ext cx="0" cy="0"/>
+          <a:chOff x="0" y="0"/>
+          <a:chExt cx="0" cy="0"/>
+        </a:xfrm>
+      </p:grpSpPr>
+      <p:graphicFrame>
+        <p:nvGraphicFramePr>
+          <p:cNvPr id="49" name="Table 48">
+            <a:extLst>
+              <a:ext uri="{FF2B5EF4-FFF2-40B4-BE49-F238E27FC236}">
+                <a16:creationId xmlns:a16="http://schemas.microsoft.com/office/drawing/2014/main" id="{CE18AB73-01A7-49E4-AA8B-040F0B8A0A14}"/>
+              </a:ext>
+            </a:extLst>
+          </p:cNvPr>
+          <p:cNvGraphicFramePr>
+            <a:graphicFrameLocks noGrp="1"/>
+          </p:cNvGraphicFramePr>
+          <p:nvPr>
+            <p:extLst>
+              <p:ext uri="{D42A27DB-BD31-4B8C-83A1-F6EECF244321}">
+                <p14:modId xmlns:p14="http://schemas.microsoft.com/office/powerpoint/2010/main" val="3149571807"/>
+              </p:ext>
+            </p:extLst>
+          </p:nvPr>
+        </p:nvGraphicFramePr>
+        <p:xfrm>
+          <a:off x="2921289" y="3720266"/>
+          <a:ext cx="6551723" cy="821841"/>
+        </p:xfrm>
+        <a:graphic>
+          <a:graphicData uri="http://schemas.openxmlformats.org/drawingml/2006/table">
+            <a:tbl>
+              <a:tblPr firstRow="1" bandRow="1">
+                <a:tableStyleId>{5C22544A-7EE6-4342-B048-85BDC9FD1C3A}</a:tableStyleId>
+              </a:tblPr>
+              <a:tblGrid>
+                <a:gridCol w="1277169">
+                  <a:extLst>
+                    <a:ext uri="{9D8B030D-6E8A-4147-A177-3AD203B41FA5}">
+                      <a16:colId xmlns:a16="http://schemas.microsoft.com/office/drawing/2014/main" val="1597196308"/>
+                    </a:ext>
+                  </a:extLst>
+                </a:gridCol>
+                <a:gridCol w="1729363">
+                  <a:extLst>
+                    <a:ext uri="{9D8B030D-6E8A-4147-A177-3AD203B41FA5}">
+                      <a16:colId xmlns:a16="http://schemas.microsoft.com/office/drawing/2014/main" val="3584522483"/>
+                    </a:ext>
+                  </a:extLst>
+                </a:gridCol>
+                <a:gridCol w="1712068">
+                  <a:extLst>
+                    <a:ext uri="{9D8B030D-6E8A-4147-A177-3AD203B41FA5}">
+                      <a16:colId xmlns:a16="http://schemas.microsoft.com/office/drawing/2014/main" val="3409575032"/>
+                    </a:ext>
+                  </a:extLst>
+                </a:gridCol>
+                <a:gridCol w="1833123">
+                  <a:extLst>
+                    <a:ext uri="{9D8B030D-6E8A-4147-A177-3AD203B41FA5}">
+                      <a16:colId xmlns:a16="http://schemas.microsoft.com/office/drawing/2014/main" val="213668288"/>
+                    </a:ext>
+                  </a:extLst>
+                </a:gridCol>
+              </a:tblGrid>
+              <a:tr h="384833">
+                <a:tc>
+                  <a:txBody>
+                    <a:bodyPr/>
+                    <a:lstStyle/>
+                    <a:p>
+                      <a:pPr algn="ctr"/>
+                      <a:r>
+                        <a:rPr lang="en-IN" sz="1300" b="0" dirty="0"/>
+                        <a:t>Batch Id</a:t>
+                      </a:r>
+                    </a:p>
+                  </a:txBody>
+                  <a:tcPr marL="83617" marR="83617" marT="41809" marB="41809">
+                    <a:solidFill>
+                      <a:srgbClr val="008BAC"/>
+                    </a:solidFill>
+                  </a:tcPr>
+                </a:tc>
+                <a:tc>
+                  <a:txBody>
+                    <a:bodyPr/>
+                    <a:lstStyle/>
+                    <a:p>
+                      <a:pPr algn="ctr"/>
+                      <a:r>
+                        <a:rPr lang="en-IN" sz="1300" b="0" dirty="0"/>
+                        <a:t>Type</a:t>
+                      </a:r>
+                    </a:p>
+                  </a:txBody>
+                  <a:tcPr marL="83617" marR="83617" marT="41809" marB="41809">
+                    <a:solidFill>
+                      <a:srgbClr val="008BAC"/>
+                    </a:solidFill>
+                  </a:tcPr>
+                </a:tc>
+                <a:tc>
+                  <a:txBody>
+                    <a:bodyPr/>
+                    <a:lstStyle/>
+                    <a:p>
+                      <a:pPr algn="ctr"/>
+                      <a:r>
+                        <a:rPr lang="en-IN" sz="1300" b="0" dirty="0"/>
+                        <a:t>Generated On</a:t>
+                      </a:r>
+                    </a:p>
+                  </a:txBody>
+                  <a:tcPr marL="83617" marR="83617" marT="41809" marB="41809">
+                    <a:solidFill>
+                      <a:srgbClr val="008BAC"/>
+                    </a:solidFill>
+                  </a:tcPr>
+                </a:tc>
+                <a:tc>
+                  <a:txBody>
+                    <a:bodyPr/>
+                    <a:lstStyle/>
+                    <a:p>
+                      <a:pPr algn="ctr"/>
+                      <a:r>
+                        <a:rPr lang="en-IN" sz="1300" b="0" dirty="0"/>
+                        <a:t>Generated By</a:t>
+                      </a:r>
+                    </a:p>
+                  </a:txBody>
+                  <a:tcPr marL="83617" marR="83617" marT="41809" marB="41809">
+                    <a:solidFill>
+                      <a:srgbClr val="008BAC"/>
+                    </a:solidFill>
+                  </a:tcPr>
+                </a:tc>
+                <a:extLst>
+                  <a:ext uri="{0D108BD9-81ED-4DB2-BD59-A6C34878D82A}">
+                    <a16:rowId xmlns:a16="http://schemas.microsoft.com/office/drawing/2014/main" val="4274047974"/>
+                  </a:ext>
+                </a:extLst>
+              </a:tr>
+              <a:tr h="437008">
+                <a:tc>
+                  <a:txBody>
+                    <a:bodyPr/>
+                    <a:lstStyle/>
+                    <a:p>
+                      <a:pPr algn="ctr"/>
+                      <a:r>
+                        <a:rPr lang="en-IN" sz="1300" b="0" dirty="0"/>
+                        <a:t>BS-1232</a:t>
+                      </a:r>
+                    </a:p>
+                  </a:txBody>
+                  <a:tcPr marL="83617" marR="83617" marT="41809" marB="41809">
+                    <a:solidFill>
+                      <a:schemeClr val="bg2"/>
+                    </a:solidFill>
+                  </a:tcPr>
+                </a:tc>
+                <a:tc>
+                  <a:txBody>
+                    <a:bodyPr/>
+                    <a:lstStyle/>
+                    <a:p>
+                      <a:pPr algn="ctr"/>
+                      <a:r>
+                        <a:rPr lang="en-IN" sz="1300" b="0" dirty="0"/>
+                        <a:t>Occupation Certificate</a:t>
+                      </a:r>
+                    </a:p>
+                  </a:txBody>
+                  <a:tcPr marL="83617" marR="83617" marT="41809" marB="41809">
+                    <a:solidFill>
+                      <a:schemeClr val="bg2"/>
+                    </a:solidFill>
+                  </a:tcPr>
+                </a:tc>
+                <a:tc>
+                  <a:txBody>
+                    <a:bodyPr/>
+                    <a:lstStyle/>
+                    <a:p>
+                      <a:pPr algn="ctr"/>
+                      <a:r>
+                        <a:rPr lang="en-IN" sz="1300" b="0" dirty="0"/>
+                        <a:t>26-03-2018</a:t>
+                      </a:r>
+                    </a:p>
+                  </a:txBody>
+                  <a:tcPr marL="83617" marR="83617" marT="41809" marB="41809">
+                    <a:solidFill>
+                      <a:schemeClr val="bg2"/>
+                    </a:solidFill>
+                  </a:tcPr>
+                </a:tc>
+                <a:tc>
+                  <a:txBody>
+                    <a:bodyPr/>
+                    <a:lstStyle/>
+                    <a:p>
+                      <a:pPr algn="ctr"/>
+                      <a:r>
+                        <a:rPr lang="en-IN" sz="1300" b="0" dirty="0"/>
+                        <a:t>Kam Avida</a:t>
                       </a:r>
                     </a:p>
                   </a:txBody>
@@ -33771,10 +33541,51 @@
       </p:graphicFrame>
       <p:sp>
         <p:nvSpPr>
-          <p:cNvPr id="41" name="Rectangle 40">
-            <a:extLst>
-              <a:ext uri="{FF2B5EF4-FFF2-40B4-BE49-F238E27FC236}">
-                <a16:creationId xmlns:a16="http://schemas.microsoft.com/office/drawing/2014/main" id="{644A805B-61F0-4E7B-BACA-44D8561EBEB8}"/>
+          <p:cNvPr id="47" name="TextBox 46">
+            <a:extLst>
+              <a:ext uri="{FF2B5EF4-FFF2-40B4-BE49-F238E27FC236}">
+                <a16:creationId xmlns:a16="http://schemas.microsoft.com/office/drawing/2014/main" id="{58B54600-3910-4D30-A565-3F345745D6B3}"/>
+              </a:ext>
+            </a:extLst>
+          </p:cNvPr>
+          <p:cNvSpPr txBox="1"/>
+          <p:nvPr/>
+        </p:nvSpPr>
+        <p:spPr>
+          <a:xfrm>
+            <a:off x="2714623" y="3065848"/>
+            <a:ext cx="3000375" cy="430887"/>
+          </a:xfrm>
+          <a:prstGeom prst="rect">
+            <a:avLst/>
+          </a:prstGeom>
+          <a:noFill/>
+        </p:spPr>
+        <p:txBody>
+          <a:bodyPr wrap="square" rtlCol="0">
+            <a:spAutoFit/>
+          </a:bodyPr>
+          <a:lstStyle/>
+          <a:p>
+            <a:r>
+              <a:rPr lang="en-IN" sz="2200" dirty="0">
+                <a:solidFill>
+                  <a:schemeClr val="bg2">
+                    <a:lumMod val="50000"/>
+                  </a:schemeClr>
+                </a:solidFill>
+              </a:rPr>
+              <a:t>Audit Table</a:t>
+            </a:r>
+          </a:p>
+        </p:txBody>
+      </p:sp>
+      <p:sp>
+        <p:nvSpPr>
+          <p:cNvPr id="31" name="Rectangle 30">
+            <a:extLst>
+              <a:ext uri="{FF2B5EF4-FFF2-40B4-BE49-F238E27FC236}">
+                <a16:creationId xmlns:a16="http://schemas.microsoft.com/office/drawing/2014/main" id="{609BC7F1-A595-43A2-A591-869F095F504B}"/>
               </a:ext>
             </a:extLst>
           </p:cNvPr>
@@ -33783,14 +33594,16 @@
         </p:nvSpPr>
         <p:spPr>
           <a:xfrm>
-            <a:off x="2921289" y="1995623"/>
-            <a:ext cx="8835437" cy="694077"/>
+            <a:off x="2641733" y="1051006"/>
+            <a:ext cx="9833410" cy="5825124"/>
           </a:xfrm>
           <a:prstGeom prst="rect">
             <a:avLst/>
           </a:prstGeom>
           <a:solidFill>
-            <a:schemeClr val="bg1"/>
+            <a:schemeClr val="bg2">
+              <a:alpha val="15000"/>
+            </a:schemeClr>
           </a:solidFill>
           <a:ln>
             <a:noFill/>
@@ -33817,16 +33630,57 @@
           <a:lstStyle/>
           <a:p>
             <a:pPr algn="ctr"/>
-            <a:endParaRPr lang="en-IN" sz="1646"/>
+            <a:endParaRPr lang="en-IN" sz="1646" dirty="0"/>
           </a:p>
         </p:txBody>
       </p:sp>
       <p:sp>
         <p:nvSpPr>
-          <p:cNvPr id="45" name="Rectangle: Rounded Corners 44">
-            <a:extLst>
-              <a:ext uri="{FF2B5EF4-FFF2-40B4-BE49-F238E27FC236}">
-                <a16:creationId xmlns:a16="http://schemas.microsoft.com/office/drawing/2014/main" id="{80C72A5E-F2D7-43AE-8BD8-F389B6CCCE64}"/>
+          <p:cNvPr id="33" name="TextBox 32">
+            <a:extLst>
+              <a:ext uri="{FF2B5EF4-FFF2-40B4-BE49-F238E27FC236}">
+                <a16:creationId xmlns:a16="http://schemas.microsoft.com/office/drawing/2014/main" id="{A396A9AE-DC32-4DEF-87D8-563BEAC3D050}"/>
+              </a:ext>
+            </a:extLst>
+          </p:cNvPr>
+          <p:cNvSpPr txBox="1"/>
+          <p:nvPr/>
+        </p:nvSpPr>
+        <p:spPr>
+          <a:xfrm>
+            <a:off x="2714625" y="1358350"/>
+            <a:ext cx="3000375" cy="430887"/>
+          </a:xfrm>
+          <a:prstGeom prst="rect">
+            <a:avLst/>
+          </a:prstGeom>
+          <a:noFill/>
+        </p:spPr>
+        <p:txBody>
+          <a:bodyPr wrap="square" rtlCol="0">
+            <a:spAutoFit/>
+          </a:bodyPr>
+          <a:lstStyle/>
+          <a:p>
+            <a:r>
+              <a:rPr lang="en-IN" sz="2200" dirty="0">
+                <a:solidFill>
+                  <a:schemeClr val="bg2">
+                    <a:lumMod val="50000"/>
+                  </a:schemeClr>
+                </a:solidFill>
+              </a:rPr>
+              <a:t>Generate Reports</a:t>
+            </a:r>
+          </a:p>
+        </p:txBody>
+      </p:sp>
+      <p:sp>
+        <p:nvSpPr>
+          <p:cNvPr id="41" name="Rectangle 40">
+            <a:extLst>
+              <a:ext uri="{FF2B5EF4-FFF2-40B4-BE49-F238E27FC236}">
+                <a16:creationId xmlns:a16="http://schemas.microsoft.com/office/drawing/2014/main" id="{644A805B-61F0-4E7B-BACA-44D8561EBEB8}"/>
               </a:ext>
             </a:extLst>
           </p:cNvPr>
@@ -33835,21 +33689,17 @@
         </p:nvSpPr>
         <p:spPr>
           <a:xfrm>
-            <a:off x="2928943" y="3493289"/>
-            <a:ext cx="2782939" cy="305612"/>
-          </a:xfrm>
-          <a:prstGeom prst="roundRect">
+            <a:off x="2921289" y="1995623"/>
+            <a:ext cx="8835437" cy="694077"/>
+          </a:xfrm>
+          <a:prstGeom prst="rect">
             <a:avLst/>
           </a:prstGeom>
           <a:solidFill>
             <a:schemeClr val="bg1"/>
           </a:solidFill>
           <a:ln>
-            <a:solidFill>
-              <a:schemeClr val="bg2">
-                <a:lumMod val="50000"/>
-              </a:schemeClr>
-            </a:solidFill>
+            <a:noFill/>
           </a:ln>
         </p:spPr>
         <p:style>
@@ -33873,25 +33723,16 @@
           <a:lstStyle/>
           <a:p>
             <a:pPr algn="ctr"/>
-            <a:r>
-              <a:rPr lang="en-IN" sz="1646" dirty="0">
-                <a:solidFill>
-                  <a:schemeClr val="bg2">
-                    <a:lumMod val="50000"/>
-                  </a:schemeClr>
-                </a:solidFill>
-              </a:rPr>
-              <a:t>Enter Batch Id</a:t>
-            </a:r>
+            <a:endParaRPr lang="en-IN" sz="1646"/>
           </a:p>
         </p:txBody>
       </p:sp>
       <p:sp>
         <p:nvSpPr>
-          <p:cNvPr id="46" name="Rectangle: Rounded Corners 45">
-            <a:extLst>
-              <a:ext uri="{FF2B5EF4-FFF2-40B4-BE49-F238E27FC236}">
-                <a16:creationId xmlns:a16="http://schemas.microsoft.com/office/drawing/2014/main" id="{09AE6569-0AC4-4EA0-BBC4-67A04F669A26}"/>
+          <p:cNvPr id="56" name="Rectangle: Rounded Corners 55">
+            <a:extLst>
+              <a:ext uri="{FF2B5EF4-FFF2-40B4-BE49-F238E27FC236}">
+                <a16:creationId xmlns:a16="http://schemas.microsoft.com/office/drawing/2014/main" id="{3C6C0E24-F455-4EC1-B1D0-F5402FA45414}"/>
               </a:ext>
             </a:extLst>
           </p:cNvPr>
@@ -33900,20 +33741,19 @@
         </p:nvSpPr>
         <p:spPr>
           <a:xfrm>
-            <a:off x="5947932" y="3501710"/>
-            <a:ext cx="973247" cy="297191"/>
+            <a:off x="3044855" y="2105097"/>
+            <a:ext cx="3068078" cy="422168"/>
           </a:xfrm>
           <a:prstGeom prst="roundRect">
             <a:avLst/>
           </a:prstGeom>
           <a:solidFill>
-            <a:srgbClr val="00B0F0"/>
+            <a:schemeClr val="bg1"/>
           </a:solidFill>
           <a:ln>
             <a:solidFill>
-              <a:schemeClr val="accent1">
-                <a:lumMod val="60000"/>
-                <a:lumOff val="40000"/>
+              <a:schemeClr val="bg2">
+                <a:lumMod val="50000"/>
               </a:schemeClr>
             </a:solidFill>
           </a:ln>
@@ -33938,20 +33778,61 @@
           <a:bodyPr rtlCol="0" anchor="ctr"/>
           <a:lstStyle/>
           <a:p>
-            <a:pPr algn="ctr"/>
             <a:r>
-              <a:rPr lang="en-IN" sz="1646" dirty="0"/>
-              <a:t>Search</a:t>
+              <a:rPr lang="en-IN" sz="1646" dirty="0">
+                <a:solidFill>
+                  <a:schemeClr val="bg2">
+                    <a:lumMod val="50000"/>
+                  </a:schemeClr>
+                </a:solidFill>
+              </a:rPr>
+              <a:t> Select Report to be Generated</a:t>
             </a:r>
           </a:p>
         </p:txBody>
       </p:sp>
+      <p:pic>
+        <p:nvPicPr>
+          <p:cNvPr id="59" name="Picture 58">
+            <a:extLst>
+              <a:ext uri="{FF2B5EF4-FFF2-40B4-BE49-F238E27FC236}">
+                <a16:creationId xmlns:a16="http://schemas.microsoft.com/office/drawing/2014/main" id="{01CFCF11-C2EB-40B4-97B6-DF5B3BBA3F43}"/>
+              </a:ext>
+            </a:extLst>
+          </p:cNvPr>
+          <p:cNvPicPr>
+            <a:picLocks noChangeAspect="1"/>
+          </p:cNvPicPr>
+          <p:nvPr/>
+        </p:nvPicPr>
+        <p:blipFill>
+          <a:blip r:embed="rId2" cstate="hqprint">
+            <a:extLst>
+              <a:ext uri="{28A0092B-C50C-407E-A947-70E740481C1C}">
+                <a14:useLocalDpi xmlns:a14="http://schemas.microsoft.com/office/drawing/2010/main" val="0"/>
+              </a:ext>
+            </a:extLst>
+          </a:blip>
+          <a:stretch>
+            <a:fillRect/>
+          </a:stretch>
+        </p:blipFill>
+        <p:spPr>
+          <a:xfrm rot="10800000" flipH="1" flipV="1">
+            <a:off x="5880403" y="2259646"/>
+            <a:ext cx="163269" cy="163269"/>
+          </a:xfrm>
+          <a:prstGeom prst="rect">
+            <a:avLst/>
+          </a:prstGeom>
+        </p:spPr>
+      </p:pic>
       <p:sp>
         <p:nvSpPr>
-          <p:cNvPr id="56" name="Rectangle: Rounded Corners 55">
-            <a:extLst>
-              <a:ext uri="{FF2B5EF4-FFF2-40B4-BE49-F238E27FC236}">
-                <a16:creationId xmlns:a16="http://schemas.microsoft.com/office/drawing/2014/main" id="{3C6C0E24-F455-4EC1-B1D0-F5402FA45414}"/>
+          <p:cNvPr id="66" name="Rectangle: Rounded Corners 65">
+            <a:extLst>
+              <a:ext uri="{FF2B5EF4-FFF2-40B4-BE49-F238E27FC236}">
+                <a16:creationId xmlns:a16="http://schemas.microsoft.com/office/drawing/2014/main" id="{D16E2C95-2500-4287-8CDD-97854E6CD4FD}"/>
               </a:ext>
             </a:extLst>
           </p:cNvPr>
@@ -33960,19 +33841,20 @@
         </p:nvSpPr>
         <p:spPr>
           <a:xfrm>
-            <a:off x="3044855" y="2105097"/>
-            <a:ext cx="3068078" cy="422168"/>
+            <a:off x="8806502" y="2107480"/>
+            <a:ext cx="1813374" cy="443272"/>
           </a:xfrm>
           <a:prstGeom prst="roundRect">
             <a:avLst/>
           </a:prstGeom>
           <a:solidFill>
-            <a:schemeClr val="bg1"/>
+            <a:srgbClr val="00B0F0"/>
           </a:solidFill>
           <a:ln>
             <a:solidFill>
-              <a:schemeClr val="bg2">
-                <a:lumMod val="50000"/>
+              <a:schemeClr val="accent1">
+                <a:lumMod val="60000"/>
+                <a:lumOff val="40000"/>
               </a:schemeClr>
             </a:solidFill>
           </a:ln>
@@ -33997,107 +33879,6 @@
           <a:bodyPr rtlCol="0" anchor="ctr"/>
           <a:lstStyle/>
           <a:p>
-            <a:r>
-              <a:rPr lang="en-IN" sz="1646" dirty="0">
-                <a:solidFill>
-                  <a:schemeClr val="bg2">
-                    <a:lumMod val="50000"/>
-                  </a:schemeClr>
-                </a:solidFill>
-              </a:rPr>
-              <a:t> Select Report to be Generated</a:t>
-            </a:r>
-          </a:p>
-        </p:txBody>
-      </p:sp>
-      <p:pic>
-        <p:nvPicPr>
-          <p:cNvPr id="59" name="Picture 58">
-            <a:extLst>
-              <a:ext uri="{FF2B5EF4-FFF2-40B4-BE49-F238E27FC236}">
-                <a16:creationId xmlns:a16="http://schemas.microsoft.com/office/drawing/2014/main" id="{01CFCF11-C2EB-40B4-97B6-DF5B3BBA3F43}"/>
-              </a:ext>
-            </a:extLst>
-          </p:cNvPr>
-          <p:cNvPicPr>
-            <a:picLocks noChangeAspect="1"/>
-          </p:cNvPicPr>
-          <p:nvPr/>
-        </p:nvPicPr>
-        <p:blipFill>
-          <a:blip r:embed="rId2">
-            <a:extLst>
-              <a:ext uri="{28A0092B-C50C-407E-A947-70E740481C1C}">
-                <a14:useLocalDpi xmlns:a14="http://schemas.microsoft.com/office/drawing/2010/main" val="0"/>
-              </a:ext>
-            </a:extLst>
-          </a:blip>
-          <a:stretch>
-            <a:fillRect/>
-          </a:stretch>
-        </p:blipFill>
-        <p:spPr>
-          <a:xfrm rot="10800000" flipH="1" flipV="1">
-            <a:off x="5880403" y="2259646"/>
-            <a:ext cx="163269" cy="163269"/>
-          </a:xfrm>
-          <a:prstGeom prst="rect">
-            <a:avLst/>
-          </a:prstGeom>
-        </p:spPr>
-      </p:pic>
-      <p:sp>
-        <p:nvSpPr>
-          <p:cNvPr id="66" name="Rectangle: Rounded Corners 65">
-            <a:extLst>
-              <a:ext uri="{FF2B5EF4-FFF2-40B4-BE49-F238E27FC236}">
-                <a16:creationId xmlns:a16="http://schemas.microsoft.com/office/drawing/2014/main" id="{D16E2C95-2500-4287-8CDD-97854E6CD4FD}"/>
-              </a:ext>
-            </a:extLst>
-          </p:cNvPr>
-          <p:cNvSpPr/>
-          <p:nvPr/>
-        </p:nvSpPr>
-        <p:spPr>
-          <a:xfrm>
-            <a:off x="8806502" y="2107480"/>
-            <a:ext cx="1813374" cy="443272"/>
-          </a:xfrm>
-          <a:prstGeom prst="roundRect">
-            <a:avLst/>
-          </a:prstGeom>
-          <a:solidFill>
-            <a:srgbClr val="00B0F0"/>
-          </a:solidFill>
-          <a:ln>
-            <a:solidFill>
-              <a:schemeClr val="accent1">
-                <a:lumMod val="60000"/>
-                <a:lumOff val="40000"/>
-              </a:schemeClr>
-            </a:solidFill>
-          </a:ln>
-        </p:spPr>
-        <p:style>
-          <a:lnRef idx="2">
-            <a:schemeClr val="accent1">
-              <a:shade val="50000"/>
-            </a:schemeClr>
-          </a:lnRef>
-          <a:fillRef idx="1">
-            <a:schemeClr val="accent1"/>
-          </a:fillRef>
-          <a:effectRef idx="0">
-            <a:schemeClr val="accent1"/>
-          </a:effectRef>
-          <a:fontRef idx="minor">
-            <a:schemeClr val="lt1"/>
-          </a:fontRef>
-        </p:style>
-        <p:txBody>
-          <a:bodyPr rtlCol="0" anchor="ctr"/>
-          <a:lstStyle/>
-          <a:p>
             <a:pPr algn="ctr"/>
             <a:r>
               <a:rPr lang="en-IN" sz="1646" dirty="0"/>
@@ -34600,7 +34381,7 @@
           <p:nvPr/>
         </p:nvPicPr>
         <p:blipFill>
-          <a:blip r:embed="rId3">
+          <a:blip r:embed="rId3" cstate="hqprint">
             <a:extLst>
               <a:ext uri="{28A0092B-C50C-407E-A947-70E740481C1C}">
                 <a14:useLocalDpi xmlns:a14="http://schemas.microsoft.com/office/drawing/2010/main" val="0"/>
@@ -34806,7 +34587,7 @@
               <p:nvPr/>
             </p:nvPicPr>
             <p:blipFill>
-              <a:blip r:embed="rId4">
+              <a:blip r:embed="rId4" cstate="hqprint">
                 <a:biLevel thresh="25000"/>
                 <a:extLst>
                   <a:ext uri="{28A0092B-C50C-407E-A947-70E740481C1C}">
@@ -34900,7 +34681,7 @@
             <p:nvPr/>
           </p:nvPicPr>
           <p:blipFill>
-            <a:blip r:embed="rId5">
+            <a:blip r:embed="rId5" cstate="hqprint">
               <a:extLst>
                 <a:ext uri="{28A0092B-C50C-407E-A947-70E740481C1C}">
                   <a14:useLocalDpi xmlns:a14="http://schemas.microsoft.com/office/drawing/2010/main" val="0"/>
@@ -35056,7 +34837,7 @@
             <p:nvPr/>
           </p:nvPicPr>
           <p:blipFill>
-            <a:blip r:embed="rId6">
+            <a:blip r:embed="rId6" cstate="hqprint">
               <a:lum bright="70000" contrast="-70000"/>
               <a:extLst>
                 <a:ext uri="{28A0092B-C50C-407E-A947-70E740481C1C}">
@@ -35177,7 +34958,7 @@
           <p:nvPr/>
         </p:nvPicPr>
         <p:blipFill>
-          <a:blip r:embed="rId7">
+          <a:blip r:embed="rId7" cstate="hqprint">
             <a:extLst>
               <a:ext uri="{28A0092B-C50C-407E-A947-70E740481C1C}">
                 <a14:useLocalDpi xmlns:a14="http://schemas.microsoft.com/office/drawing/2010/main" val="0"/>
@@ -35272,7 +35053,7 @@
             <p:nvPr/>
           </p:nvPicPr>
           <p:blipFill>
-            <a:blip r:embed="rId8">
+            <a:blip r:embed="rId8" cstate="hqprint">
               <a:lum bright="70000" contrast="-70000"/>
               <a:extLst>
                 <a:ext uri="{28A0092B-C50C-407E-A947-70E740481C1C}">
@@ -35889,7 +35670,7 @@
           <p:nvPr/>
         </p:nvPicPr>
         <p:blipFill>
-          <a:blip r:embed="rId2">
+          <a:blip r:embed="rId2" cstate="hqprint">
             <a:extLst>
               <a:ext uri="{28A0092B-C50C-407E-A947-70E740481C1C}">
                 <a14:useLocalDpi xmlns:a14="http://schemas.microsoft.com/office/drawing/2010/main" val="0"/>
@@ -36049,7 +35830,7 @@
           <p:nvPr/>
         </p:nvPicPr>
         <p:blipFill>
-          <a:blip r:embed="rId3">
+          <a:blip r:embed="rId3" cstate="hqprint">
             <a:extLst>
               <a:ext uri="{28A0092B-C50C-407E-A947-70E740481C1C}">
                 <a14:useLocalDpi xmlns:a14="http://schemas.microsoft.com/office/drawing/2010/main" val="0"/>
@@ -36255,7 +36036,7 @@
               <p:nvPr/>
             </p:nvPicPr>
             <p:blipFill>
-              <a:blip r:embed="rId4">
+              <a:blip r:embed="rId4" cstate="hqprint">
                 <a:biLevel thresh="25000"/>
                 <a:extLst>
                   <a:ext uri="{28A0092B-C50C-407E-A947-70E740481C1C}">
@@ -36349,7 +36130,7 @@
             <p:nvPr/>
           </p:nvPicPr>
           <p:blipFill>
-            <a:blip r:embed="rId5">
+            <a:blip r:embed="rId5" cstate="hqprint">
               <a:extLst>
                 <a:ext uri="{28A0092B-C50C-407E-A947-70E740481C1C}">
                   <a14:useLocalDpi xmlns:a14="http://schemas.microsoft.com/office/drawing/2010/main" val="0"/>
@@ -36505,7 +36286,7 @@
             <p:nvPr/>
           </p:nvPicPr>
           <p:blipFill>
-            <a:blip r:embed="rId6">
+            <a:blip r:embed="rId6" cstate="hqprint">
               <a:lum bright="70000" contrast="-70000"/>
               <a:extLst>
                 <a:ext uri="{28A0092B-C50C-407E-A947-70E740481C1C}">
@@ -36626,7 +36407,7 @@
           <p:nvPr/>
         </p:nvPicPr>
         <p:blipFill>
-          <a:blip r:embed="rId7">
+          <a:blip r:embed="rId7" cstate="hqprint">
             <a:extLst>
               <a:ext uri="{28A0092B-C50C-407E-A947-70E740481C1C}">
                 <a14:useLocalDpi xmlns:a14="http://schemas.microsoft.com/office/drawing/2010/main" val="0"/>
@@ -36721,7 +36502,7 @@
             <p:nvPr/>
           </p:nvPicPr>
           <p:blipFill>
-            <a:blip r:embed="rId8">
+            <a:blip r:embed="rId8" cstate="hqprint">
               <a:lum bright="70000" contrast="-70000"/>
               <a:extLst>
                 <a:ext uri="{28A0092B-C50C-407E-A947-70E740481C1C}">
@@ -37171,7 +36952,7 @@
           <p:nvPr/>
         </p:nvPicPr>
         <p:blipFill>
-          <a:blip r:embed="rId3">
+          <a:blip r:embed="rId3" cstate="hqprint">
             <a:extLst>
               <a:ext uri="{28A0092B-C50C-407E-A947-70E740481C1C}">
                 <a14:useLocalDpi xmlns:a14="http://schemas.microsoft.com/office/drawing/2010/main" val="0"/>
@@ -37251,7 +37032,7 @@
           <p:nvPr/>
         </p:nvPicPr>
         <p:blipFill>
-          <a:blip r:embed="rId4">
+          <a:blip r:embed="rId4" cstate="hqprint">
             <a:extLst>
               <a:ext uri="{28A0092B-C50C-407E-A947-70E740481C1C}">
                 <a14:useLocalDpi xmlns:a14="http://schemas.microsoft.com/office/drawing/2010/main" val="0"/>
@@ -37457,7 +37238,7 @@
               <p:nvPr/>
             </p:nvPicPr>
             <p:blipFill>
-              <a:blip r:embed="rId5">
+              <a:blip r:embed="rId5" cstate="hqprint">
                 <a:biLevel thresh="25000"/>
                 <a:extLst>
                   <a:ext uri="{28A0092B-C50C-407E-A947-70E740481C1C}">
@@ -37551,7 +37332,7 @@
             <p:nvPr/>
           </p:nvPicPr>
           <p:blipFill>
-            <a:blip r:embed="rId6">
+            <a:blip r:embed="rId6" cstate="hqprint">
               <a:extLst>
                 <a:ext uri="{28A0092B-C50C-407E-A947-70E740481C1C}">
                   <a14:useLocalDpi xmlns:a14="http://schemas.microsoft.com/office/drawing/2010/main" val="0"/>
@@ -37707,7 +37488,7 @@
             <p:nvPr/>
           </p:nvPicPr>
           <p:blipFill>
-            <a:blip r:embed="rId7">
+            <a:blip r:embed="rId7" cstate="hqprint">
               <a:lum bright="70000" contrast="-70000"/>
               <a:extLst>
                 <a:ext uri="{28A0092B-C50C-407E-A947-70E740481C1C}">
@@ -37828,7 +37609,7 @@
           <p:nvPr/>
         </p:nvPicPr>
         <p:blipFill>
-          <a:blip r:embed="rId8">
+          <a:blip r:embed="rId8" cstate="hqprint">
             <a:extLst>
               <a:ext uri="{28A0092B-C50C-407E-A947-70E740481C1C}">
                 <a14:useLocalDpi xmlns:a14="http://schemas.microsoft.com/office/drawing/2010/main" val="0"/>
@@ -37923,7 +37704,7 @@
             <p:nvPr/>
           </p:nvPicPr>
           <p:blipFill>
-            <a:blip r:embed="rId9">
+            <a:blip r:embed="rId9" cstate="hqprint">
               <a:lum bright="70000" contrast="-70000"/>
               <a:extLst>
                 <a:ext uri="{28A0092B-C50C-407E-A947-70E740481C1C}">
@@ -38419,7 +38200,7 @@
           <p:nvPr/>
         </p:nvPicPr>
         <p:blipFill rotWithShape="1">
-          <a:blip r:embed="rId11">
+          <a:blip r:embed="rId11" cstate="hqprint">
             <a:extLst>
               <a:ext uri="{28A0092B-C50C-407E-A947-70E740481C1C}">
                 <a14:useLocalDpi xmlns:a14="http://schemas.microsoft.com/office/drawing/2010/main" val="0"/>
@@ -39138,7 +38919,7 @@
           <p:nvPr/>
         </p:nvPicPr>
         <p:blipFill>
-          <a:blip r:embed="rId2">
+          <a:blip r:embed="rId2" cstate="hqprint">
             <a:extLst>
               <a:ext uri="{28A0092B-C50C-407E-A947-70E740481C1C}">
                 <a14:useLocalDpi xmlns:a14="http://schemas.microsoft.com/office/drawing/2010/main" val="0"/>
@@ -39740,7 +39521,7 @@
           <p:nvPr/>
         </p:nvPicPr>
         <p:blipFill>
-          <a:blip r:embed="rId3">
+          <a:blip r:embed="rId3" cstate="hqprint">
             <a:extLst>
               <a:ext uri="{28A0092B-C50C-407E-A947-70E740481C1C}">
                 <a14:useLocalDpi xmlns:a14="http://schemas.microsoft.com/office/drawing/2010/main" val="0"/>
@@ -39946,7 +39727,7 @@
               <p:nvPr/>
             </p:nvPicPr>
             <p:blipFill>
-              <a:blip r:embed="rId4">
+              <a:blip r:embed="rId4" cstate="hqprint">
                 <a:biLevel thresh="25000"/>
                 <a:extLst>
                   <a:ext uri="{28A0092B-C50C-407E-A947-70E740481C1C}">
@@ -40040,7 +39821,7 @@
             <p:nvPr/>
           </p:nvPicPr>
           <p:blipFill>
-            <a:blip r:embed="rId5">
+            <a:blip r:embed="rId5" cstate="hqprint">
               <a:extLst>
                 <a:ext uri="{28A0092B-C50C-407E-A947-70E740481C1C}">
                   <a14:useLocalDpi xmlns:a14="http://schemas.microsoft.com/office/drawing/2010/main" val="0"/>
@@ -40196,7 +39977,7 @@
             <p:nvPr/>
           </p:nvPicPr>
           <p:blipFill>
-            <a:blip r:embed="rId6">
+            <a:blip r:embed="rId6" cstate="hqprint">
               <a:lum bright="70000" contrast="-70000"/>
               <a:extLst>
                 <a:ext uri="{28A0092B-C50C-407E-A947-70E740481C1C}">
@@ -40317,7 +40098,7 @@
           <p:nvPr/>
         </p:nvPicPr>
         <p:blipFill>
-          <a:blip r:embed="rId7">
+          <a:blip r:embed="rId7" cstate="hqprint">
             <a:extLst>
               <a:ext uri="{28A0092B-C50C-407E-A947-70E740481C1C}">
                 <a14:useLocalDpi xmlns:a14="http://schemas.microsoft.com/office/drawing/2010/main" val="0"/>
@@ -40412,7 +40193,7 @@
             <p:nvPr/>
           </p:nvPicPr>
           <p:blipFill>
-            <a:blip r:embed="rId8">
+            <a:blip r:embed="rId8" cstate="hqprint">
               <a:lum bright="70000" contrast="-70000"/>
               <a:extLst>
                 <a:ext uri="{28A0092B-C50C-407E-A947-70E740481C1C}">
@@ -40525,7 +40306,7 @@
           <p:nvPr/>
         </p:nvPicPr>
         <p:blipFill rotWithShape="1">
-          <a:blip r:embed="rId10">
+          <a:blip r:embed="rId10" cstate="hqprint">
             <a:extLst>
               <a:ext uri="{28A0092B-C50C-407E-A947-70E740481C1C}">
                 <a14:useLocalDpi xmlns:a14="http://schemas.microsoft.com/office/drawing/2010/main" val="0"/>
@@ -41184,7 +40965,7 @@
           <p:nvPr/>
         </p:nvPicPr>
         <p:blipFill>
-          <a:blip r:embed="rId2">
+          <a:blip r:embed="rId2" cstate="hqprint">
             <a:extLst>
               <a:ext uri="{28A0092B-C50C-407E-A947-70E740481C1C}">
                 <a14:useLocalDpi xmlns:a14="http://schemas.microsoft.com/office/drawing/2010/main" val="0"/>
@@ -41391,7 +41172,7 @@
           <p:nvPr/>
         </p:nvPicPr>
         <p:blipFill rotWithShape="1">
-          <a:blip r:embed="rId3">
+          <a:blip r:embed="rId3" cstate="hqprint">
             <a:extLst>
               <a:ext uri="{28A0092B-C50C-407E-A947-70E740481C1C}">
                 <a14:useLocalDpi xmlns:a14="http://schemas.microsoft.com/office/drawing/2010/main" val="0"/>
@@ -41464,7 +41245,7 @@
           <p:nvPr/>
         </p:nvPicPr>
         <p:blipFill>
-          <a:blip r:embed="rId4">
+          <a:blip r:embed="rId4" cstate="hqprint">
             <a:extLst>
               <a:ext uri="{28A0092B-C50C-407E-A947-70E740481C1C}">
                 <a14:useLocalDpi xmlns:a14="http://schemas.microsoft.com/office/drawing/2010/main" val="0"/>
@@ -41670,7 +41451,7 @@
               <p:nvPr/>
             </p:nvPicPr>
             <p:blipFill>
-              <a:blip r:embed="rId5">
+              <a:blip r:embed="rId5" cstate="hqprint">
                 <a:biLevel thresh="25000"/>
                 <a:extLst>
                   <a:ext uri="{28A0092B-C50C-407E-A947-70E740481C1C}">
@@ -41764,7 +41545,7 @@
             <p:nvPr/>
           </p:nvPicPr>
           <p:blipFill>
-            <a:blip r:embed="rId6">
+            <a:blip r:embed="rId6" cstate="hqprint">
               <a:extLst>
                 <a:ext uri="{28A0092B-C50C-407E-A947-70E740481C1C}">
                   <a14:useLocalDpi xmlns:a14="http://schemas.microsoft.com/office/drawing/2010/main" val="0"/>
@@ -41920,7 +41701,7 @@
             <p:nvPr/>
           </p:nvPicPr>
           <p:blipFill>
-            <a:blip r:embed="rId7">
+            <a:blip r:embed="rId7" cstate="hqprint">
               <a:lum bright="70000" contrast="-70000"/>
               <a:extLst>
                 <a:ext uri="{28A0092B-C50C-407E-A947-70E740481C1C}">
@@ -42041,7 +41822,7 @@
           <p:nvPr/>
         </p:nvPicPr>
         <p:blipFill>
-          <a:blip r:embed="rId8">
+          <a:blip r:embed="rId8" cstate="hqprint">
             <a:extLst>
               <a:ext uri="{28A0092B-C50C-407E-A947-70E740481C1C}">
                 <a14:useLocalDpi xmlns:a14="http://schemas.microsoft.com/office/drawing/2010/main" val="0"/>
@@ -42136,7 +41917,7 @@
             <p:nvPr/>
           </p:nvPicPr>
           <p:blipFill>
-            <a:blip r:embed="rId9">
+            <a:blip r:embed="rId9" cstate="hqprint">
               <a:lum bright="70000" contrast="-70000"/>
               <a:extLst>
                 <a:ext uri="{28A0092B-C50C-407E-A947-70E740481C1C}">

</xml_diff>

<commit_message>
Author          : Prateek Kapoor File Modified   : Updated Designs.pptx Description     : Added Update Targets design
</commit_message>
<xml_diff>
--- a/Requirements/Product Backlog/Screen Designs/Screen Design Deck/Updated Designs.pptx
+++ b/Requirements/Product Backlog/Screen Designs/Screen Design Deck/Updated Designs.pptx
@@ -5,7 +5,7 @@
     <p:sldMasterId id="2147483672" r:id="rId1"/>
   </p:sldMasterIdLst>
   <p:notesMasterIdLst>
-    <p:notesMasterId r:id="rId20"/>
+    <p:notesMasterId r:id="rId21"/>
   </p:notesMasterIdLst>
   <p:sldIdLst>
     <p:sldId id="284" r:id="rId2"/>
@@ -26,6 +26,7 @@
     <p:sldId id="272" r:id="rId17"/>
     <p:sldId id="278" r:id="rId18"/>
     <p:sldId id="280" r:id="rId19"/>
+    <p:sldId id="286" r:id="rId20"/>
   </p:sldIdLst>
   <p:sldSz cx="13103225" cy="8229600"/>
   <p:notesSz cx="6858000" cy="9144000"/>
@@ -177,7 +178,6 @@
           </a:p>
         </c:rich>
       </c:tx>
-      <c:layout/>
       <c:overlay val="0"/>
       <c:spPr>
         <a:noFill/>
@@ -415,7 +415,6 @@
     </c:plotArea>
     <c:legend>
       <c:legendPos val="b"/>
-      <c:layout/>
       <c:overlay val="0"/>
       <c:spPr>
         <a:noFill/>
@@ -447,7 +446,6 @@
     </c:legend>
     <c:plotVisOnly val="1"/>
     <c:dispBlanksAs val="gap"/>
-    <c:showDLblsOverMax val="0"/>
     <c:extLst>
       <c:ext xmlns:c16r3="http://schemas.microsoft.com/office/drawing/2017/03/chart" uri="{56B9EC1D-385E-4148-901F-78D8002777C0}">
         <c16r3:dataDisplayOptions16>
@@ -455,6 +453,7 @@
         </c16r3:dataDisplayOptions16>
       </c:ext>
     </c:extLst>
+    <c:showDLblsOverMax val="0"/>
   </c:chart>
   <c:spPr>
     <a:noFill/>
@@ -524,7 +523,6 @@
           </a:p>
         </c:rich>
       </c:tx>
-      <c:layout/>
       <c:overlay val="0"/>
       <c:spPr>
         <a:noFill/>
@@ -774,7 +772,6 @@
     </c:plotArea>
     <c:legend>
       <c:legendPos val="b"/>
-      <c:layout/>
       <c:overlay val="0"/>
       <c:spPr>
         <a:noFill/>
@@ -806,7 +803,6 @@
     </c:legend>
     <c:plotVisOnly val="1"/>
     <c:dispBlanksAs val="gap"/>
-    <c:showDLblsOverMax val="0"/>
     <c:extLst>
       <c:ext xmlns:c16r3="http://schemas.microsoft.com/office/drawing/2017/03/chart" uri="{56B9EC1D-385E-4148-901F-78D8002777C0}">
         <c16r3:dataDisplayOptions16>
@@ -814,6 +810,7 @@
         </c16r3:dataDisplayOptions16>
       </c:ext>
     </c:extLst>
+    <c:showDLblsOverMax val="0"/>
   </c:chart>
   <c:spPr>
     <a:noFill/>
@@ -2006,7 +2003,7 @@
           <a:p>
             <a:fld id="{736940B7-5369-499F-A655-F2C040499C10}" type="datetimeFigureOut">
               <a:rPr lang="en-IN" smtClean="0"/>
-              <a:t>11-07-2018</a:t>
+              <a:t>27-07-2018</a:t>
             </a:fld>
             <a:endParaRPr lang="en-IN"/>
           </a:p>
@@ -2526,6 +2523,90 @@
 </p:notes>
 </file>
 
+<file path=ppt/notesSlides/notesSlide4.xml><?xml version="1.0" encoding="utf-8"?>
+<p:notes xmlns:a="http://schemas.openxmlformats.org/drawingml/2006/main" xmlns:r="http://schemas.openxmlformats.org/officeDocument/2006/relationships" xmlns:p="http://schemas.openxmlformats.org/presentationml/2006/main">
+  <p:cSld>
+    <p:spTree>
+      <p:nvGrpSpPr>
+        <p:cNvPr id="1" name=""/>
+        <p:cNvGrpSpPr/>
+        <p:nvPr/>
+      </p:nvGrpSpPr>
+      <p:grpSpPr>
+        <a:xfrm>
+          <a:off x="0" y="0"/>
+          <a:ext cx="0" cy="0"/>
+          <a:chOff x="0" y="0"/>
+          <a:chExt cx="0" cy="0"/>
+        </a:xfrm>
+      </p:grpSpPr>
+      <p:sp>
+        <p:nvSpPr>
+          <p:cNvPr id="2" name="Slide Image Placeholder 1"/>
+          <p:cNvSpPr>
+            <a:spLocks noGrp="1" noRot="1" noChangeAspect="1"/>
+          </p:cNvSpPr>
+          <p:nvPr>
+            <p:ph type="sldImg"/>
+          </p:nvPr>
+        </p:nvSpPr>
+        <p:spPr/>
+      </p:sp>
+      <p:sp>
+        <p:nvSpPr>
+          <p:cNvPr id="3" name="Notes Placeholder 2"/>
+          <p:cNvSpPr>
+            <a:spLocks noGrp="1"/>
+          </p:cNvSpPr>
+          <p:nvPr>
+            <p:ph type="body" idx="1"/>
+          </p:nvPr>
+        </p:nvSpPr>
+        <p:spPr/>
+        <p:txBody>
+          <a:bodyPr/>
+          <a:lstStyle/>
+          <a:p>
+            <a:endParaRPr lang="en-IN" dirty="0"/>
+          </a:p>
+        </p:txBody>
+      </p:sp>
+      <p:sp>
+        <p:nvSpPr>
+          <p:cNvPr id="4" name="Slide Number Placeholder 3"/>
+          <p:cNvSpPr>
+            <a:spLocks noGrp="1"/>
+          </p:cNvSpPr>
+          <p:nvPr>
+            <p:ph type="sldNum" sz="quarter" idx="10"/>
+          </p:nvPr>
+        </p:nvSpPr>
+        <p:spPr/>
+        <p:txBody>
+          <a:bodyPr/>
+          <a:lstStyle/>
+          <a:p>
+            <a:fld id="{7DD41ED4-1231-4BDD-A166-105321184164}" type="slidenum">
+              <a:rPr lang="en-IN" smtClean="0"/>
+              <a:t>19</a:t>
+            </a:fld>
+            <a:endParaRPr lang="en-IN"/>
+          </a:p>
+        </p:txBody>
+      </p:sp>
+    </p:spTree>
+    <p:extLst>
+      <p:ext uri="{BB962C8B-B14F-4D97-AF65-F5344CB8AC3E}">
+        <p14:creationId xmlns:p14="http://schemas.microsoft.com/office/powerpoint/2010/main" val="124080991"/>
+      </p:ext>
+    </p:extLst>
+  </p:cSld>
+  <p:clrMapOvr>
+    <a:masterClrMapping/>
+  </p:clrMapOvr>
+</p:notes>
+</file>
+
 <file path=ppt/slideLayouts/slideLayout1.xml><?xml version="1.0" encoding="utf-8"?>
 <p:sldLayout xmlns:a="http://schemas.openxmlformats.org/drawingml/2006/main" xmlns:r="http://schemas.openxmlformats.org/officeDocument/2006/relationships" xmlns:p="http://schemas.openxmlformats.org/presentationml/2006/main" type="title" preserve="1">
   <p:cSld name="Title Slide">
@@ -2657,7 +2738,7 @@
           <a:p>
             <a:fld id="{0344983A-0EFF-4FA5-823C-58DD31D92387}" type="datetimeFigureOut">
               <a:rPr lang="en-IN" smtClean="0"/>
-              <a:t>11-07-2018</a:t>
+              <a:t>27-07-2018</a:t>
             </a:fld>
             <a:endParaRPr lang="en-IN"/>
           </a:p>
@@ -2827,7 +2908,7 @@
           <a:p>
             <a:fld id="{0344983A-0EFF-4FA5-823C-58DD31D92387}" type="datetimeFigureOut">
               <a:rPr lang="en-IN" smtClean="0"/>
-              <a:t>11-07-2018</a:t>
+              <a:t>27-07-2018</a:t>
             </a:fld>
             <a:endParaRPr lang="en-IN"/>
           </a:p>
@@ -3007,7 +3088,7 @@
           <a:p>
             <a:fld id="{0344983A-0EFF-4FA5-823C-58DD31D92387}" type="datetimeFigureOut">
               <a:rPr lang="en-IN" smtClean="0"/>
-              <a:t>11-07-2018</a:t>
+              <a:t>27-07-2018</a:t>
             </a:fld>
             <a:endParaRPr lang="en-IN"/>
           </a:p>
@@ -3177,7 +3258,7 @@
           <a:p>
             <a:fld id="{0344983A-0EFF-4FA5-823C-58DD31D92387}" type="datetimeFigureOut">
               <a:rPr lang="en-IN" smtClean="0"/>
-              <a:t>11-07-2018</a:t>
+              <a:t>27-07-2018</a:t>
             </a:fld>
             <a:endParaRPr lang="en-IN"/>
           </a:p>
@@ -3423,7 +3504,7 @@
           <a:p>
             <a:fld id="{0344983A-0EFF-4FA5-823C-58DD31D92387}" type="datetimeFigureOut">
               <a:rPr lang="en-IN" smtClean="0"/>
-              <a:t>11-07-2018</a:t>
+              <a:t>27-07-2018</a:t>
             </a:fld>
             <a:endParaRPr lang="en-IN"/>
           </a:p>
@@ -3655,7 +3736,7 @@
           <a:p>
             <a:fld id="{0344983A-0EFF-4FA5-823C-58DD31D92387}" type="datetimeFigureOut">
               <a:rPr lang="en-IN" smtClean="0"/>
-              <a:t>11-07-2018</a:t>
+              <a:t>27-07-2018</a:t>
             </a:fld>
             <a:endParaRPr lang="en-IN"/>
           </a:p>
@@ -4022,7 +4103,7 @@
           <a:p>
             <a:fld id="{0344983A-0EFF-4FA5-823C-58DD31D92387}" type="datetimeFigureOut">
               <a:rPr lang="en-IN" smtClean="0"/>
-              <a:t>11-07-2018</a:t>
+              <a:t>27-07-2018</a:t>
             </a:fld>
             <a:endParaRPr lang="en-IN"/>
           </a:p>
@@ -4140,7 +4221,7 @@
           <a:p>
             <a:fld id="{0344983A-0EFF-4FA5-823C-58DD31D92387}" type="datetimeFigureOut">
               <a:rPr lang="en-IN" smtClean="0"/>
-              <a:t>11-07-2018</a:t>
+              <a:t>27-07-2018</a:t>
             </a:fld>
             <a:endParaRPr lang="en-IN"/>
           </a:p>
@@ -4235,7 +4316,7 @@
           <a:p>
             <a:fld id="{0344983A-0EFF-4FA5-823C-58DD31D92387}" type="datetimeFigureOut">
               <a:rPr lang="en-IN" smtClean="0"/>
-              <a:t>11-07-2018</a:t>
+              <a:t>27-07-2018</a:t>
             </a:fld>
             <a:endParaRPr lang="en-IN"/>
           </a:p>
@@ -4512,7 +4593,7 @@
           <a:p>
             <a:fld id="{0344983A-0EFF-4FA5-823C-58DD31D92387}" type="datetimeFigureOut">
               <a:rPr lang="en-IN" smtClean="0"/>
-              <a:t>11-07-2018</a:t>
+              <a:t>27-07-2018</a:t>
             </a:fld>
             <a:endParaRPr lang="en-IN"/>
           </a:p>
@@ -4769,7 +4850,7 @@
           <a:p>
             <a:fld id="{0344983A-0EFF-4FA5-823C-58DD31D92387}" type="datetimeFigureOut">
               <a:rPr lang="en-IN" smtClean="0"/>
-              <a:t>11-07-2018</a:t>
+              <a:t>27-07-2018</a:t>
             </a:fld>
             <a:endParaRPr lang="en-IN"/>
           </a:p>
@@ -4982,7 +5063,7 @@
           <a:p>
             <a:fld id="{0344983A-0EFF-4FA5-823C-58DD31D92387}" type="datetimeFigureOut">
               <a:rPr lang="en-IN" smtClean="0"/>
-              <a:t>11-07-2018</a:t>
+              <a:t>27-07-2018</a:t>
             </a:fld>
             <a:endParaRPr lang="en-IN"/>
           </a:p>
@@ -21291,21 +21372,16 @@
                       <a:pPr algn="ctr"/>
                       <a:r>
                         <a:rPr lang="en-IN" sz="1300" b="0" dirty="0"/>
-                        <a:t>NSKFDC </a:t>
+                        <a:t>NSKFDC Reg.</a:t>
                       </a:r>
                       <a:r>
-                        <a:rPr lang="en-IN" sz="1300" b="0" dirty="0" smtClean="0"/>
-                        <a:t>Reg.</a:t>
-                      </a:r>
-                      <a:r>
-                        <a:rPr lang="en-IN" sz="1300" b="0" baseline="0" dirty="0" smtClean="0"/>
+                        <a:rPr lang="en-IN" sz="1300" b="0" baseline="0" dirty="0"/>
                         <a:t> </a:t>
                       </a:r>
                       <a:r>
-                        <a:rPr lang="en-IN" sz="1300" b="0" dirty="0" smtClean="0"/>
+                        <a:rPr lang="en-IN" sz="1300" b="0" dirty="0"/>
                         <a:t>Number</a:t>
                       </a:r>
-                      <a:endParaRPr lang="en-IN" sz="1300" b="0" dirty="0"/>
                     </a:p>
                   </a:txBody>
                   <a:tcPr marL="83617" marR="83617" marT="41809" marB="41809">
@@ -23136,13 +23212,6 @@
   <p:clrMapOvr>
     <a:masterClrMapping/>
   </p:clrMapOvr>
-  <p:timing>
-    <p:tnLst>
-      <p:par>
-        <p:cTn id="1" dur="indefinite" restart="never" nodeType="tmRoot"/>
-      </p:par>
-    </p:tnLst>
-  </p:timing>
 </p:sld>
 </file>
 
@@ -25187,13 +25256,1722 @@
   <p:clrMapOvr>
     <a:masterClrMapping/>
   </p:clrMapOvr>
-  <p:timing>
-    <p:tnLst>
-      <p:par>
-        <p:cTn id="1" dur="indefinite" restart="never" nodeType="tmRoot"/>
-      </p:par>
-    </p:tnLst>
-  </p:timing>
+</p:sld>
+</file>
+
+<file path=ppt/slides/slide19.xml><?xml version="1.0" encoding="utf-8"?>
+<p:sld xmlns:a="http://schemas.openxmlformats.org/drawingml/2006/main" xmlns:r="http://schemas.openxmlformats.org/officeDocument/2006/relationships" xmlns:p="http://schemas.openxmlformats.org/presentationml/2006/main">
+  <p:cSld>
+    <p:spTree>
+      <p:nvGrpSpPr>
+        <p:cNvPr id="1" name=""/>
+        <p:cNvGrpSpPr/>
+        <p:nvPr/>
+      </p:nvGrpSpPr>
+      <p:grpSpPr>
+        <a:xfrm>
+          <a:off x="0" y="0"/>
+          <a:ext cx="0" cy="0"/>
+          <a:chOff x="0" y="0"/>
+          <a:chExt cx="0" cy="0"/>
+        </a:xfrm>
+      </p:grpSpPr>
+      <p:sp>
+        <p:nvSpPr>
+          <p:cNvPr id="31" name="Rectangle 30">
+            <a:extLst>
+              <a:ext uri="{FF2B5EF4-FFF2-40B4-BE49-F238E27FC236}">
+                <a16:creationId xmlns:a16="http://schemas.microsoft.com/office/drawing/2014/main" id="{609BC7F1-A595-43A2-A591-869F095F504B}"/>
+              </a:ext>
+            </a:extLst>
+          </p:cNvPr>
+          <p:cNvSpPr/>
+          <p:nvPr/>
+        </p:nvSpPr>
+        <p:spPr>
+          <a:xfrm>
+            <a:off x="2641733" y="1034583"/>
+            <a:ext cx="10109067" cy="5825124"/>
+          </a:xfrm>
+          <a:prstGeom prst="rect">
+            <a:avLst/>
+          </a:prstGeom>
+          <a:solidFill>
+            <a:schemeClr val="bg2">
+              <a:alpha val="15000"/>
+            </a:schemeClr>
+          </a:solidFill>
+          <a:ln>
+            <a:noFill/>
+          </a:ln>
+        </p:spPr>
+        <p:style>
+          <a:lnRef idx="2">
+            <a:schemeClr val="accent1">
+              <a:shade val="50000"/>
+            </a:schemeClr>
+          </a:lnRef>
+          <a:fillRef idx="1">
+            <a:schemeClr val="accent1"/>
+          </a:fillRef>
+          <a:effectRef idx="0">
+            <a:schemeClr val="accent1"/>
+          </a:effectRef>
+          <a:fontRef idx="minor">
+            <a:schemeClr val="lt1"/>
+          </a:fontRef>
+        </p:style>
+        <p:txBody>
+          <a:bodyPr rtlCol="0" anchor="ctr"/>
+          <a:lstStyle/>
+          <a:p>
+            <a:pPr algn="ctr"/>
+            <a:endParaRPr lang="en-IN" sz="1646" dirty="0"/>
+          </a:p>
+        </p:txBody>
+      </p:sp>
+      <p:sp>
+        <p:nvSpPr>
+          <p:cNvPr id="34" name="TextBox 33">
+            <a:extLst>
+              <a:ext uri="{FF2B5EF4-FFF2-40B4-BE49-F238E27FC236}">
+                <a16:creationId xmlns:a16="http://schemas.microsoft.com/office/drawing/2014/main" id="{58B54600-3910-4D30-A565-3F345745D6B3}"/>
+              </a:ext>
+            </a:extLst>
+          </p:cNvPr>
+          <p:cNvSpPr txBox="1"/>
+          <p:nvPr/>
+        </p:nvSpPr>
+        <p:spPr>
+          <a:xfrm>
+            <a:off x="2951687" y="3446012"/>
+            <a:ext cx="3000375" cy="430887"/>
+          </a:xfrm>
+          <a:prstGeom prst="rect">
+            <a:avLst/>
+          </a:prstGeom>
+          <a:noFill/>
+        </p:spPr>
+        <p:txBody>
+          <a:bodyPr wrap="square" rtlCol="0">
+            <a:spAutoFit/>
+          </a:bodyPr>
+          <a:lstStyle/>
+          <a:p>
+            <a:r>
+              <a:rPr lang="en-IN" sz="2200" dirty="0">
+                <a:solidFill>
+                  <a:schemeClr val="bg2">
+                    <a:lumMod val="50000"/>
+                  </a:schemeClr>
+                </a:solidFill>
+              </a:rPr>
+              <a:t>Updated Targets</a:t>
+            </a:r>
+          </a:p>
+        </p:txBody>
+      </p:sp>
+      <p:graphicFrame>
+        <p:nvGraphicFramePr>
+          <p:cNvPr id="35" name="Table 34">
+            <a:extLst>
+              <a:ext uri="{FF2B5EF4-FFF2-40B4-BE49-F238E27FC236}">
+                <a16:creationId xmlns:a16="http://schemas.microsoft.com/office/drawing/2014/main" id="{CE18AB73-01A7-49E4-AA8B-040F0B8A0A14}"/>
+              </a:ext>
+            </a:extLst>
+          </p:cNvPr>
+          <p:cNvGraphicFramePr>
+            <a:graphicFrameLocks noGrp="1"/>
+          </p:cNvGraphicFramePr>
+          <p:nvPr>
+            <p:extLst>
+              <p:ext uri="{D42A27DB-BD31-4B8C-83A1-F6EECF244321}">
+                <p14:modId xmlns:p14="http://schemas.microsoft.com/office/powerpoint/2010/main" val="2108403385"/>
+              </p:ext>
+            </p:extLst>
+          </p:nvPr>
+        </p:nvGraphicFramePr>
+        <p:xfrm>
+          <a:off x="3053288" y="4720082"/>
+          <a:ext cx="7587003" cy="821841"/>
+        </p:xfrm>
+        <a:graphic>
+          <a:graphicData uri="http://schemas.openxmlformats.org/drawingml/2006/table">
+            <a:tbl>
+              <a:tblPr firstRow="1" bandRow="1">
+                <a:tableStyleId>{5C22544A-7EE6-4342-B048-85BDC9FD1C3A}</a:tableStyleId>
+              </a:tblPr>
+              <a:tblGrid>
+                <a:gridCol w="2072894">
+                  <a:extLst>
+                    <a:ext uri="{9D8B030D-6E8A-4147-A177-3AD203B41FA5}">
+                      <a16:colId xmlns:a16="http://schemas.microsoft.com/office/drawing/2014/main" val="1597196308"/>
+                    </a:ext>
+                  </a:extLst>
+                </a:gridCol>
+                <a:gridCol w="2064327">
+                  <a:extLst>
+                    <a:ext uri="{9D8B030D-6E8A-4147-A177-3AD203B41FA5}">
+                      <a16:colId xmlns:a16="http://schemas.microsoft.com/office/drawing/2014/main" val="3584522483"/>
+                    </a:ext>
+                  </a:extLst>
+                </a:gridCol>
+                <a:gridCol w="1842655">
+                  <a:extLst>
+                    <a:ext uri="{9D8B030D-6E8A-4147-A177-3AD203B41FA5}">
+                      <a16:colId xmlns:a16="http://schemas.microsoft.com/office/drawing/2014/main" val="3409575032"/>
+                    </a:ext>
+                  </a:extLst>
+                </a:gridCol>
+                <a:gridCol w="1607127">
+                  <a:extLst>
+                    <a:ext uri="{9D8B030D-6E8A-4147-A177-3AD203B41FA5}">
+                      <a16:colId xmlns:a16="http://schemas.microsoft.com/office/drawing/2014/main" val="213668288"/>
+                    </a:ext>
+                  </a:extLst>
+                </a:gridCol>
+              </a:tblGrid>
+              <a:tr h="384833">
+                <a:tc>
+                  <a:txBody>
+                    <a:bodyPr/>
+                    <a:lstStyle/>
+                    <a:p>
+                      <a:pPr algn="ctr"/>
+                      <a:r>
+                        <a:rPr lang="en-IN" sz="1300" b="0" dirty="0"/>
+                        <a:t>NSDC Registration Number</a:t>
+                      </a:r>
+                    </a:p>
+                  </a:txBody>
+                  <a:tcPr marL="83617" marR="83617" marT="41809" marB="41809">
+                    <a:solidFill>
+                      <a:srgbClr val="008BAC"/>
+                    </a:solidFill>
+                  </a:tcPr>
+                </a:tc>
+                <a:tc>
+                  <a:txBody>
+                    <a:bodyPr/>
+                    <a:lstStyle/>
+                    <a:p>
+                      <a:pPr algn="ctr"/>
+                      <a:r>
+                        <a:rPr lang="en-IN" sz="1300" b="0" dirty="0"/>
+                        <a:t>Training Partner</a:t>
+                      </a:r>
+                    </a:p>
+                  </a:txBody>
+                  <a:tcPr marL="83617" marR="83617" marT="41809" marB="41809">
+                    <a:solidFill>
+                      <a:srgbClr val="008BAC"/>
+                    </a:solidFill>
+                  </a:tcPr>
+                </a:tc>
+                <a:tc>
+                  <a:txBody>
+                    <a:bodyPr/>
+                    <a:lstStyle/>
+                    <a:p>
+                      <a:pPr algn="ctr"/>
+                      <a:r>
+                        <a:rPr lang="en-IN" sz="1300" b="0" dirty="0"/>
+                        <a:t>Target</a:t>
+                      </a:r>
+                    </a:p>
+                  </a:txBody>
+                  <a:tcPr marL="83617" marR="83617" marT="41809" marB="41809">
+                    <a:solidFill>
+                      <a:srgbClr val="008BAC"/>
+                    </a:solidFill>
+                  </a:tcPr>
+                </a:tc>
+                <a:tc>
+                  <a:txBody>
+                    <a:bodyPr/>
+                    <a:lstStyle/>
+                    <a:p>
+                      <a:pPr algn="ctr"/>
+                      <a:r>
+                        <a:rPr lang="en-IN" sz="1300" b="0" dirty="0"/>
+                        <a:t>Updated On</a:t>
+                      </a:r>
+                    </a:p>
+                  </a:txBody>
+                  <a:tcPr marL="83617" marR="83617" marT="41809" marB="41809">
+                    <a:solidFill>
+                      <a:srgbClr val="008BAC"/>
+                    </a:solidFill>
+                  </a:tcPr>
+                </a:tc>
+                <a:extLst>
+                  <a:ext uri="{0D108BD9-81ED-4DB2-BD59-A6C34878D82A}">
+                    <a16:rowId xmlns:a16="http://schemas.microsoft.com/office/drawing/2014/main" val="4274047974"/>
+                  </a:ext>
+                </a:extLst>
+              </a:tr>
+              <a:tr h="437008">
+                <a:tc>
+                  <a:txBody>
+                    <a:bodyPr/>
+                    <a:lstStyle/>
+                    <a:p>
+                      <a:pPr algn="ctr"/>
+                      <a:r>
+                        <a:rPr lang="en-IN" sz="1300" b="0" dirty="0"/>
+                        <a:t>NSDC-123</a:t>
+                      </a:r>
+                    </a:p>
+                  </a:txBody>
+                  <a:tcPr marL="83617" marR="83617" marT="41809" marB="41809">
+                    <a:solidFill>
+                      <a:schemeClr val="bg2"/>
+                    </a:solidFill>
+                  </a:tcPr>
+                </a:tc>
+                <a:tc>
+                  <a:txBody>
+                    <a:bodyPr/>
+                    <a:lstStyle/>
+                    <a:p>
+                      <a:pPr algn="ctr"/>
+                      <a:r>
+                        <a:rPr lang="en-IN" sz="1300" b="0" dirty="0" err="1"/>
+                        <a:t>Krisna</a:t>
+                      </a:r>
+                      <a:r>
+                        <a:rPr lang="en-IN" sz="1300" b="0" dirty="0"/>
+                        <a:t> Institute of Training</a:t>
+                      </a:r>
+                    </a:p>
+                  </a:txBody>
+                  <a:tcPr marL="83617" marR="83617" marT="41809" marB="41809">
+                    <a:solidFill>
+                      <a:schemeClr val="bg2"/>
+                    </a:solidFill>
+                  </a:tcPr>
+                </a:tc>
+                <a:tc>
+                  <a:txBody>
+                    <a:bodyPr/>
+                    <a:lstStyle/>
+                    <a:p>
+                      <a:pPr algn="ctr"/>
+                      <a:r>
+                        <a:rPr lang="en-IN" sz="1300" b="0" dirty="0"/>
+                        <a:t>2500</a:t>
+                      </a:r>
+                    </a:p>
+                  </a:txBody>
+                  <a:tcPr marL="83617" marR="83617" marT="41809" marB="41809">
+                    <a:solidFill>
+                      <a:schemeClr val="bg2"/>
+                    </a:solidFill>
+                  </a:tcPr>
+                </a:tc>
+                <a:tc>
+                  <a:txBody>
+                    <a:bodyPr/>
+                    <a:lstStyle/>
+                    <a:p>
+                      <a:pPr algn="ctr"/>
+                      <a:r>
+                        <a:rPr lang="en-IN" sz="1300" b="0" dirty="0"/>
+                        <a:t>15-06-2018</a:t>
+                      </a:r>
+                    </a:p>
+                  </a:txBody>
+                  <a:tcPr marL="83617" marR="83617" marT="41809" marB="41809">
+                    <a:solidFill>
+                      <a:schemeClr val="bg2"/>
+                    </a:solidFill>
+                  </a:tcPr>
+                </a:tc>
+                <a:extLst>
+                  <a:ext uri="{0D108BD9-81ED-4DB2-BD59-A6C34878D82A}">
+                    <a16:rowId xmlns:a16="http://schemas.microsoft.com/office/drawing/2014/main" val="4180875282"/>
+                  </a:ext>
+                </a:extLst>
+              </a:tr>
+            </a:tbl>
+          </a:graphicData>
+        </a:graphic>
+      </p:graphicFrame>
+      <p:sp>
+        <p:nvSpPr>
+          <p:cNvPr id="41" name="Rectangle 40">
+            <a:extLst>
+              <a:ext uri="{FF2B5EF4-FFF2-40B4-BE49-F238E27FC236}">
+                <a16:creationId xmlns:a16="http://schemas.microsoft.com/office/drawing/2014/main" id="{644A805B-61F0-4E7B-BACA-44D8561EBEB8}"/>
+              </a:ext>
+            </a:extLst>
+          </p:cNvPr>
+          <p:cNvSpPr/>
+          <p:nvPr/>
+        </p:nvSpPr>
+        <p:spPr>
+          <a:xfrm>
+            <a:off x="2921289" y="1997940"/>
+            <a:ext cx="9625337" cy="1062312"/>
+          </a:xfrm>
+          <a:prstGeom prst="rect">
+            <a:avLst/>
+          </a:prstGeom>
+          <a:solidFill>
+            <a:schemeClr val="bg1"/>
+          </a:solidFill>
+          <a:ln>
+            <a:noFill/>
+          </a:ln>
+        </p:spPr>
+        <p:style>
+          <a:lnRef idx="2">
+            <a:schemeClr val="accent1">
+              <a:shade val="50000"/>
+            </a:schemeClr>
+          </a:lnRef>
+          <a:fillRef idx="1">
+            <a:schemeClr val="accent1"/>
+          </a:fillRef>
+          <a:effectRef idx="0">
+            <a:schemeClr val="accent1"/>
+          </a:effectRef>
+          <a:fontRef idx="minor">
+            <a:schemeClr val="lt1"/>
+          </a:fontRef>
+        </p:style>
+        <p:txBody>
+          <a:bodyPr rtlCol="0" anchor="ctr"/>
+          <a:lstStyle/>
+          <a:p>
+            <a:pPr algn="ctr"/>
+            <a:endParaRPr lang="en-IN" sz="1646"/>
+          </a:p>
+        </p:txBody>
+      </p:sp>
+      <p:sp>
+        <p:nvSpPr>
+          <p:cNvPr id="51" name="TextBox 50">
+            <a:extLst>
+              <a:ext uri="{FF2B5EF4-FFF2-40B4-BE49-F238E27FC236}">
+                <a16:creationId xmlns:a16="http://schemas.microsoft.com/office/drawing/2014/main" id="{24267509-A56E-4DB1-AD07-D964F427C507}"/>
+              </a:ext>
+            </a:extLst>
+          </p:cNvPr>
+          <p:cNvSpPr txBox="1"/>
+          <p:nvPr/>
+        </p:nvSpPr>
+        <p:spPr>
+          <a:xfrm>
+            <a:off x="11437439" y="575641"/>
+            <a:ext cx="859749" cy="261162"/>
+          </a:xfrm>
+          <a:prstGeom prst="rect">
+            <a:avLst/>
+          </a:prstGeom>
+          <a:noFill/>
+        </p:spPr>
+        <p:txBody>
+          <a:bodyPr wrap="square" rtlCol="0">
+            <a:spAutoFit/>
+          </a:bodyPr>
+          <a:lstStyle/>
+          <a:p>
+            <a:r>
+              <a:rPr lang="en-IN" sz="1097" dirty="0"/>
+              <a:t>Logout</a:t>
+            </a:r>
+          </a:p>
+        </p:txBody>
+      </p:sp>
+      <p:pic>
+        <p:nvPicPr>
+          <p:cNvPr id="52" name="Picture 51">
+            <a:extLst>
+              <a:ext uri="{FF2B5EF4-FFF2-40B4-BE49-F238E27FC236}">
+                <a16:creationId xmlns:a16="http://schemas.microsoft.com/office/drawing/2014/main" id="{096FA9F5-CAD4-409E-B6A9-0C347187E0B4}"/>
+              </a:ext>
+            </a:extLst>
+          </p:cNvPr>
+          <p:cNvPicPr>
+            <a:picLocks noChangeAspect="1"/>
+          </p:cNvPicPr>
+          <p:nvPr/>
+        </p:nvPicPr>
+        <p:blipFill>
+          <a:blip r:embed="rId3" cstate="hqprint">
+            <a:extLst>
+              <a:ext uri="{28A0092B-C50C-407E-A947-70E740481C1C}">
+                <a14:useLocalDpi xmlns:a14="http://schemas.microsoft.com/office/drawing/2010/main" val="0"/>
+              </a:ext>
+            </a:extLst>
+          </a:blip>
+          <a:stretch>
+            <a:fillRect/>
+          </a:stretch>
+        </p:blipFill>
+        <p:spPr>
+          <a:xfrm>
+            <a:off x="11244299" y="603249"/>
+            <a:ext cx="193140" cy="193140"/>
+          </a:xfrm>
+          <a:prstGeom prst="rect">
+            <a:avLst/>
+          </a:prstGeom>
+        </p:spPr>
+      </p:pic>
+      <p:sp>
+        <p:nvSpPr>
+          <p:cNvPr id="85" name="TextBox 84">
+            <a:extLst>
+              <a:ext uri="{FF2B5EF4-FFF2-40B4-BE49-F238E27FC236}">
+                <a16:creationId xmlns:a16="http://schemas.microsoft.com/office/drawing/2014/main" id="{780FA30C-AA93-4B5C-B07E-CE14D135F9C8}"/>
+              </a:ext>
+            </a:extLst>
+          </p:cNvPr>
+          <p:cNvSpPr txBox="1"/>
+          <p:nvPr/>
+        </p:nvSpPr>
+        <p:spPr>
+          <a:xfrm>
+            <a:off x="11188260" y="298521"/>
+            <a:ext cx="1304774" cy="261162"/>
+          </a:xfrm>
+          <a:prstGeom prst="rect">
+            <a:avLst/>
+          </a:prstGeom>
+          <a:noFill/>
+        </p:spPr>
+        <p:txBody>
+          <a:bodyPr wrap="square" rtlCol="0">
+            <a:spAutoFit/>
+          </a:bodyPr>
+          <a:lstStyle/>
+          <a:p>
+            <a:r>
+              <a:rPr lang="en-IN" sz="1097" dirty="0"/>
+              <a:t>&lt;SCGJ Admin&gt;</a:t>
+            </a:r>
+          </a:p>
+        </p:txBody>
+      </p:sp>
+      <p:sp>
+        <p:nvSpPr>
+          <p:cNvPr id="56" name="Rectangle: Rounded Corners 55">
+            <a:extLst>
+              <a:ext uri="{FF2B5EF4-FFF2-40B4-BE49-F238E27FC236}">
+                <a16:creationId xmlns:a16="http://schemas.microsoft.com/office/drawing/2014/main" id="{BB9AC801-E4FE-4F16-B5EE-55E427C3FDCE}"/>
+              </a:ext>
+            </a:extLst>
+          </p:cNvPr>
+          <p:cNvSpPr/>
+          <p:nvPr/>
+        </p:nvSpPr>
+        <p:spPr>
+          <a:xfrm>
+            <a:off x="7979811" y="2142127"/>
+            <a:ext cx="1434045" cy="422562"/>
+          </a:xfrm>
+          <a:prstGeom prst="roundRect">
+            <a:avLst/>
+          </a:prstGeom>
+          <a:solidFill>
+            <a:srgbClr val="00B0F0"/>
+          </a:solidFill>
+          <a:ln>
+            <a:noFill/>
+          </a:ln>
+        </p:spPr>
+        <p:style>
+          <a:lnRef idx="2">
+            <a:schemeClr val="accent1">
+              <a:shade val="50000"/>
+            </a:schemeClr>
+          </a:lnRef>
+          <a:fillRef idx="1">
+            <a:schemeClr val="accent1"/>
+          </a:fillRef>
+          <a:effectRef idx="0">
+            <a:schemeClr val="accent1"/>
+          </a:effectRef>
+          <a:fontRef idx="minor">
+            <a:schemeClr val="lt1"/>
+          </a:fontRef>
+        </p:style>
+        <p:txBody>
+          <a:bodyPr rtlCol="0" anchor="ctr"/>
+          <a:lstStyle/>
+          <a:p>
+            <a:pPr algn="ctr"/>
+            <a:r>
+              <a:rPr lang="en-IN" sz="1646" dirty="0"/>
+              <a:t>Update Target</a:t>
+            </a:r>
+          </a:p>
+        </p:txBody>
+      </p:sp>
+      <p:sp>
+        <p:nvSpPr>
+          <p:cNvPr id="54" name="TextBox 53">
+            <a:extLst>
+              <a:ext uri="{FF2B5EF4-FFF2-40B4-BE49-F238E27FC236}">
+                <a16:creationId xmlns:a16="http://schemas.microsoft.com/office/drawing/2014/main" id="{952C085E-10B1-4BC6-9801-9258C4D35D02}"/>
+              </a:ext>
+            </a:extLst>
+          </p:cNvPr>
+          <p:cNvSpPr txBox="1"/>
+          <p:nvPr/>
+        </p:nvSpPr>
+        <p:spPr>
+          <a:xfrm>
+            <a:off x="2951688" y="1406385"/>
+            <a:ext cx="3000375" cy="430887"/>
+          </a:xfrm>
+          <a:prstGeom prst="rect">
+            <a:avLst/>
+          </a:prstGeom>
+          <a:noFill/>
+        </p:spPr>
+        <p:txBody>
+          <a:bodyPr wrap="square" rtlCol="0">
+            <a:spAutoFit/>
+          </a:bodyPr>
+          <a:lstStyle/>
+          <a:p>
+            <a:r>
+              <a:rPr lang="en-IN" sz="2200" dirty="0">
+                <a:solidFill>
+                  <a:schemeClr val="bg2">
+                    <a:lumMod val="50000"/>
+                  </a:schemeClr>
+                </a:solidFill>
+              </a:rPr>
+              <a:t>Update Target</a:t>
+            </a:r>
+          </a:p>
+        </p:txBody>
+      </p:sp>
+      <p:sp>
+        <p:nvSpPr>
+          <p:cNvPr id="8" name="Rectangle: Rounded Corners 7">
+            <a:extLst>
+              <a:ext uri="{FF2B5EF4-FFF2-40B4-BE49-F238E27FC236}">
+                <a16:creationId xmlns:a16="http://schemas.microsoft.com/office/drawing/2014/main" id="{46133D5A-ABB1-4046-9539-CFAC64BFF1A3}"/>
+              </a:ext>
+            </a:extLst>
+          </p:cNvPr>
+          <p:cNvSpPr/>
+          <p:nvPr/>
+        </p:nvSpPr>
+        <p:spPr>
+          <a:xfrm>
+            <a:off x="3044854" y="4096657"/>
+            <a:ext cx="3147933" cy="377763"/>
+          </a:xfrm>
+          <a:prstGeom prst="roundRect">
+            <a:avLst/>
+          </a:prstGeom>
+          <a:solidFill>
+            <a:schemeClr val="bg1"/>
+          </a:solidFill>
+          <a:ln>
+            <a:solidFill>
+              <a:schemeClr val="bg2">
+                <a:lumMod val="50000"/>
+              </a:schemeClr>
+            </a:solidFill>
+          </a:ln>
+        </p:spPr>
+        <p:style>
+          <a:lnRef idx="2">
+            <a:schemeClr val="accent1">
+              <a:shade val="50000"/>
+            </a:schemeClr>
+          </a:lnRef>
+          <a:fillRef idx="1">
+            <a:schemeClr val="accent1"/>
+          </a:fillRef>
+          <a:effectRef idx="0">
+            <a:schemeClr val="accent1"/>
+          </a:effectRef>
+          <a:fontRef idx="minor">
+            <a:schemeClr val="lt1"/>
+          </a:fontRef>
+        </p:style>
+        <p:txBody>
+          <a:bodyPr rtlCol="0" anchor="ctr"/>
+          <a:lstStyle/>
+          <a:p>
+            <a:pPr algn="ctr"/>
+            <a:r>
+              <a:rPr lang="en-IN" dirty="0">
+                <a:solidFill>
+                  <a:schemeClr val="bg2">
+                    <a:lumMod val="50000"/>
+                  </a:schemeClr>
+                </a:solidFill>
+              </a:rPr>
+              <a:t>NSDC Registration Number</a:t>
+            </a:r>
+          </a:p>
+        </p:txBody>
+      </p:sp>
+      <p:sp>
+        <p:nvSpPr>
+          <p:cNvPr id="32" name="Rectangle: Rounded Corners 31">
+            <a:extLst>
+              <a:ext uri="{FF2B5EF4-FFF2-40B4-BE49-F238E27FC236}">
+                <a16:creationId xmlns:a16="http://schemas.microsoft.com/office/drawing/2014/main" id="{216B42FE-236B-4E27-B5A7-070E02A61B2F}"/>
+              </a:ext>
+            </a:extLst>
+          </p:cNvPr>
+          <p:cNvSpPr/>
+          <p:nvPr/>
+        </p:nvSpPr>
+        <p:spPr>
+          <a:xfrm>
+            <a:off x="6480751" y="4077147"/>
+            <a:ext cx="883816" cy="416781"/>
+          </a:xfrm>
+          <a:prstGeom prst="roundRect">
+            <a:avLst/>
+          </a:prstGeom>
+          <a:solidFill>
+            <a:srgbClr val="00B0F0"/>
+          </a:solidFill>
+          <a:ln>
+            <a:noFill/>
+          </a:ln>
+        </p:spPr>
+        <p:style>
+          <a:lnRef idx="2">
+            <a:schemeClr val="accent1">
+              <a:shade val="50000"/>
+            </a:schemeClr>
+          </a:lnRef>
+          <a:fillRef idx="1">
+            <a:schemeClr val="accent1"/>
+          </a:fillRef>
+          <a:effectRef idx="0">
+            <a:schemeClr val="accent1"/>
+          </a:effectRef>
+          <a:fontRef idx="minor">
+            <a:schemeClr val="lt1"/>
+          </a:fontRef>
+        </p:style>
+        <p:txBody>
+          <a:bodyPr rtlCol="0" anchor="ctr"/>
+          <a:lstStyle/>
+          <a:p>
+            <a:pPr algn="ctr"/>
+            <a:r>
+              <a:rPr lang="en-IN" sz="1646" dirty="0"/>
+              <a:t>Search</a:t>
+            </a:r>
+          </a:p>
+        </p:txBody>
+      </p:sp>
+      <p:sp>
+        <p:nvSpPr>
+          <p:cNvPr id="37" name="Rectangle: Rounded Corners 36">
+            <a:extLst>
+              <a:ext uri="{FF2B5EF4-FFF2-40B4-BE49-F238E27FC236}">
+                <a16:creationId xmlns:a16="http://schemas.microsoft.com/office/drawing/2014/main" id="{31E96326-C7FA-46CC-AECE-DA116328D989}"/>
+              </a:ext>
+            </a:extLst>
+          </p:cNvPr>
+          <p:cNvSpPr/>
+          <p:nvPr/>
+        </p:nvSpPr>
+        <p:spPr>
+          <a:xfrm>
+            <a:off x="3053288" y="2142126"/>
+            <a:ext cx="2729413" cy="422168"/>
+          </a:xfrm>
+          <a:prstGeom prst="roundRect">
+            <a:avLst/>
+          </a:prstGeom>
+          <a:solidFill>
+            <a:schemeClr val="bg1"/>
+          </a:solidFill>
+          <a:ln>
+            <a:solidFill>
+              <a:schemeClr val="bg2">
+                <a:lumMod val="50000"/>
+              </a:schemeClr>
+            </a:solidFill>
+          </a:ln>
+        </p:spPr>
+        <p:style>
+          <a:lnRef idx="2">
+            <a:schemeClr val="accent1">
+              <a:shade val="50000"/>
+            </a:schemeClr>
+          </a:lnRef>
+          <a:fillRef idx="1">
+            <a:schemeClr val="accent1"/>
+          </a:fillRef>
+          <a:effectRef idx="0">
+            <a:schemeClr val="accent1"/>
+          </a:effectRef>
+          <a:fontRef idx="minor">
+            <a:schemeClr val="lt1"/>
+          </a:fontRef>
+        </p:style>
+        <p:txBody>
+          <a:bodyPr rtlCol="0" anchor="ctr"/>
+          <a:lstStyle/>
+          <a:p>
+            <a:pPr algn="ctr"/>
+            <a:r>
+              <a:rPr lang="en-IN" sz="1400" dirty="0">
+                <a:solidFill>
+                  <a:schemeClr val="bg2">
+                    <a:lumMod val="50000"/>
+                  </a:schemeClr>
+                </a:solidFill>
+              </a:rPr>
+              <a:t>Enter NSDC Registration Number</a:t>
+            </a:r>
+          </a:p>
+        </p:txBody>
+      </p:sp>
+      <p:pic>
+        <p:nvPicPr>
+          <p:cNvPr id="53" name="Picture 52">
+            <a:extLst>
+              <a:ext uri="{FF2B5EF4-FFF2-40B4-BE49-F238E27FC236}">
+                <a16:creationId xmlns:a16="http://schemas.microsoft.com/office/drawing/2014/main" id="{AD7B6363-A570-42D7-AA7F-A537F1D493FD}"/>
+              </a:ext>
+            </a:extLst>
+          </p:cNvPr>
+          <p:cNvPicPr>
+            <a:picLocks noChangeAspect="1"/>
+          </p:cNvPicPr>
+          <p:nvPr/>
+        </p:nvPicPr>
+        <p:blipFill>
+          <a:blip r:embed="rId4" cstate="hqprint">
+            <a:extLst>
+              <a:ext uri="{28A0092B-C50C-407E-A947-70E740481C1C}">
+                <a14:useLocalDpi xmlns:a14="http://schemas.microsoft.com/office/drawing/2010/main" val="0"/>
+              </a:ext>
+            </a:extLst>
+          </a:blip>
+          <a:stretch>
+            <a:fillRect/>
+          </a:stretch>
+        </p:blipFill>
+        <p:spPr>
+          <a:xfrm>
+            <a:off x="5409" y="135731"/>
+            <a:ext cx="1982556" cy="799200"/>
+          </a:xfrm>
+          <a:prstGeom prst="rect">
+            <a:avLst/>
+          </a:prstGeom>
+        </p:spPr>
+      </p:pic>
+      <p:grpSp>
+        <p:nvGrpSpPr>
+          <p:cNvPr id="55" name="Group 54">
+            <a:extLst>
+              <a:ext uri="{FF2B5EF4-FFF2-40B4-BE49-F238E27FC236}">
+                <a16:creationId xmlns:a16="http://schemas.microsoft.com/office/drawing/2014/main" id="{471F8D42-6A74-410D-AEA7-39AE9CE1CEF0}"/>
+              </a:ext>
+            </a:extLst>
+          </p:cNvPr>
+          <p:cNvGrpSpPr/>
+          <p:nvPr/>
+        </p:nvGrpSpPr>
+        <p:grpSpPr>
+          <a:xfrm>
+            <a:off x="-1" y="7537087"/>
+            <a:ext cx="13103225" cy="692513"/>
+            <a:chOff x="-1" y="7537087"/>
+            <a:chExt cx="13103225" cy="692513"/>
+          </a:xfrm>
+        </p:grpSpPr>
+        <p:sp>
+          <p:nvSpPr>
+            <p:cNvPr id="57" name="Rectangle 56">
+              <a:extLst>
+                <a:ext uri="{FF2B5EF4-FFF2-40B4-BE49-F238E27FC236}">
+                  <a16:creationId xmlns:a16="http://schemas.microsoft.com/office/drawing/2014/main" id="{2AD2DAAE-FDED-4E5D-909E-03759A091757}"/>
+                </a:ext>
+              </a:extLst>
+            </p:cNvPr>
+            <p:cNvSpPr/>
+            <p:nvPr/>
+          </p:nvSpPr>
+          <p:spPr>
+            <a:xfrm>
+              <a:off x="-1" y="7537087"/>
+              <a:ext cx="13103225" cy="692513"/>
+            </a:xfrm>
+            <a:prstGeom prst="rect">
+              <a:avLst/>
+            </a:prstGeom>
+            <a:solidFill>
+              <a:srgbClr val="0090AF"/>
+            </a:solidFill>
+            <a:ln>
+              <a:noFill/>
+            </a:ln>
+          </p:spPr>
+          <p:style>
+            <a:lnRef idx="2">
+              <a:schemeClr val="accent1">
+                <a:shade val="50000"/>
+              </a:schemeClr>
+            </a:lnRef>
+            <a:fillRef idx="1">
+              <a:schemeClr val="accent1"/>
+            </a:fillRef>
+            <a:effectRef idx="0">
+              <a:schemeClr val="accent1"/>
+            </a:effectRef>
+            <a:fontRef idx="minor">
+              <a:schemeClr val="lt1"/>
+            </a:fontRef>
+          </p:style>
+          <p:txBody>
+            <a:bodyPr rtlCol="0" anchor="ctr"/>
+            <a:lstStyle/>
+            <a:p>
+              <a:pPr algn="ctr"/>
+              <a:endParaRPr lang="en-IN" dirty="0"/>
+            </a:p>
+          </p:txBody>
+        </p:sp>
+        <p:sp>
+          <p:nvSpPr>
+            <p:cNvPr id="58" name="TextBox 57">
+              <a:extLst>
+                <a:ext uri="{FF2B5EF4-FFF2-40B4-BE49-F238E27FC236}">
+                  <a16:creationId xmlns:a16="http://schemas.microsoft.com/office/drawing/2014/main" id="{99AD9CF1-959F-4BF4-8F8E-89C7FE9B2BBC}"/>
+                </a:ext>
+              </a:extLst>
+            </p:cNvPr>
+            <p:cNvSpPr txBox="1"/>
+            <p:nvPr/>
+          </p:nvSpPr>
+          <p:spPr>
+            <a:xfrm>
+              <a:off x="3672096" y="7593983"/>
+              <a:ext cx="6632973" cy="276999"/>
+            </a:xfrm>
+            <a:prstGeom prst="rect">
+              <a:avLst/>
+            </a:prstGeom>
+            <a:noFill/>
+          </p:spPr>
+          <p:txBody>
+            <a:bodyPr wrap="square" rtlCol="0">
+              <a:spAutoFit/>
+            </a:bodyPr>
+            <a:lstStyle/>
+            <a:p>
+              <a:r>
+                <a:rPr lang="en-IN" sz="1200" dirty="0">
+                  <a:solidFill>
+                    <a:srgbClr val="FDFCFC"/>
+                  </a:solidFill>
+                </a:rPr>
+                <a:t>About Us   |  Industry Connect   |  National Standards  |  Affiliations  |  Publications  |  State Linkages</a:t>
+              </a:r>
+            </a:p>
+          </p:txBody>
+        </p:sp>
+        <p:grpSp>
+          <p:nvGrpSpPr>
+            <p:cNvPr id="60" name="Group 59">
+              <a:extLst>
+                <a:ext uri="{FF2B5EF4-FFF2-40B4-BE49-F238E27FC236}">
+                  <a16:creationId xmlns:a16="http://schemas.microsoft.com/office/drawing/2014/main" id="{1243D25A-8DE1-423F-BB98-D1435F782B09}"/>
+                </a:ext>
+              </a:extLst>
+            </p:cNvPr>
+            <p:cNvGrpSpPr/>
+            <p:nvPr/>
+          </p:nvGrpSpPr>
+          <p:grpSpPr>
+            <a:xfrm>
+              <a:off x="4984856" y="7868279"/>
+              <a:ext cx="6047419" cy="326202"/>
+              <a:chOff x="4954136" y="7915794"/>
+              <a:chExt cx="6022716" cy="307777"/>
+            </a:xfrm>
+          </p:grpSpPr>
+          <p:sp>
+            <p:nvSpPr>
+              <p:cNvPr id="61" name="TextBox 60">
+                <a:extLst>
+                  <a:ext uri="{FF2B5EF4-FFF2-40B4-BE49-F238E27FC236}">
+                    <a16:creationId xmlns:a16="http://schemas.microsoft.com/office/drawing/2014/main" id="{2F115815-0EF6-42E5-B174-EB1C7986469B}"/>
+                  </a:ext>
+                </a:extLst>
+              </p:cNvPr>
+              <p:cNvSpPr txBox="1"/>
+              <p:nvPr/>
+            </p:nvSpPr>
+            <p:spPr>
+              <a:xfrm>
+                <a:off x="4954136" y="7915794"/>
+                <a:ext cx="6022716" cy="307777"/>
+              </a:xfrm>
+              <a:prstGeom prst="rect">
+                <a:avLst/>
+              </a:prstGeom>
+              <a:noFill/>
+            </p:spPr>
+            <p:txBody>
+              <a:bodyPr wrap="square" rtlCol="0">
+                <a:spAutoFit/>
+              </a:bodyPr>
+              <a:lstStyle/>
+              <a:p>
+                <a:r>
+                  <a:rPr lang="en-IN" sz="1400" dirty="0">
+                    <a:solidFill>
+                      <a:srgbClr val="FDFCFC"/>
+                    </a:solidFill>
+                  </a:rPr>
+                  <a:t>Copyright      2016 sscgj.in – All Rights Reserved</a:t>
+                </a:r>
+              </a:p>
+            </p:txBody>
+          </p:sp>
+          <p:pic>
+            <p:nvPicPr>
+              <p:cNvPr id="62" name="Picture 61">
+                <a:extLst>
+                  <a:ext uri="{FF2B5EF4-FFF2-40B4-BE49-F238E27FC236}">
+                    <a16:creationId xmlns:a16="http://schemas.microsoft.com/office/drawing/2014/main" id="{168E111E-5F6E-4A52-BE90-B6BCAA52408A}"/>
+                  </a:ext>
+                </a:extLst>
+              </p:cNvPr>
+              <p:cNvPicPr>
+                <a:picLocks noChangeAspect="1"/>
+              </p:cNvPicPr>
+              <p:nvPr/>
+            </p:nvPicPr>
+            <p:blipFill>
+              <a:blip r:embed="rId5" cstate="hqprint">
+                <a:biLevel thresh="25000"/>
+                <a:extLst>
+                  <a:ext uri="{28A0092B-C50C-407E-A947-70E740481C1C}">
+                    <a14:useLocalDpi xmlns:a14="http://schemas.microsoft.com/office/drawing/2010/main" val="0"/>
+                  </a:ext>
+                </a:extLst>
+              </a:blip>
+              <a:stretch>
+                <a:fillRect/>
+              </a:stretch>
+            </p:blipFill>
+            <p:spPr>
+              <a:xfrm>
+                <a:off x="5789376" y="8006393"/>
+                <a:ext cx="149290" cy="140787"/>
+              </a:xfrm>
+              <a:prstGeom prst="rect">
+                <a:avLst/>
+              </a:prstGeom>
+            </p:spPr>
+          </p:pic>
+        </p:grpSp>
+      </p:grpSp>
+      <p:sp>
+        <p:nvSpPr>
+          <p:cNvPr id="40" name="TextBox 39">
+            <a:extLst>
+              <a:ext uri="{FF2B5EF4-FFF2-40B4-BE49-F238E27FC236}">
+                <a16:creationId xmlns:a16="http://schemas.microsoft.com/office/drawing/2014/main" id="{C903A062-126E-4126-A519-2D07FF45A1CF}"/>
+              </a:ext>
+            </a:extLst>
+          </p:cNvPr>
+          <p:cNvSpPr txBox="1"/>
+          <p:nvPr/>
+        </p:nvSpPr>
+        <p:spPr>
+          <a:xfrm>
+            <a:off x="654322" y="2770942"/>
+            <a:ext cx="1760563" cy="289310"/>
+          </a:xfrm>
+          <a:prstGeom prst="rect">
+            <a:avLst/>
+          </a:prstGeom>
+          <a:noFill/>
+        </p:spPr>
+        <p:txBody>
+          <a:bodyPr wrap="square" rtlCol="0">
+            <a:spAutoFit/>
+          </a:bodyPr>
+          <a:lstStyle/>
+          <a:p>
+            <a:r>
+              <a:rPr lang="en-IN" sz="1280" dirty="0">
+                <a:solidFill>
+                  <a:schemeClr val="bg1"/>
+                </a:solidFill>
+              </a:rPr>
+              <a:t>FAQ</a:t>
+            </a:r>
+          </a:p>
+        </p:txBody>
+      </p:sp>
+      <p:sp>
+        <p:nvSpPr>
+          <p:cNvPr id="63" name="Rectangle 62">
+            <a:extLst>
+              <a:ext uri="{FF2B5EF4-FFF2-40B4-BE49-F238E27FC236}">
+                <a16:creationId xmlns:a16="http://schemas.microsoft.com/office/drawing/2014/main" id="{C45CFA2C-E3B9-4F6A-81FB-BFA3E78973E8}"/>
+              </a:ext>
+            </a:extLst>
+          </p:cNvPr>
+          <p:cNvSpPr/>
+          <p:nvPr/>
+        </p:nvSpPr>
+        <p:spPr>
+          <a:xfrm>
+            <a:off x="5559" y="1034390"/>
+            <a:ext cx="2383085" cy="5901493"/>
+          </a:xfrm>
+          <a:prstGeom prst="rect">
+            <a:avLst/>
+          </a:prstGeom>
+          <a:solidFill>
+            <a:srgbClr val="0090AF"/>
+          </a:solidFill>
+          <a:ln>
+            <a:solidFill>
+              <a:srgbClr val="0090AF"/>
+            </a:solidFill>
+          </a:ln>
+        </p:spPr>
+        <p:style>
+          <a:lnRef idx="2">
+            <a:schemeClr val="accent1">
+              <a:shade val="50000"/>
+            </a:schemeClr>
+          </a:lnRef>
+          <a:fillRef idx="1">
+            <a:schemeClr val="accent1"/>
+          </a:fillRef>
+          <a:effectRef idx="0">
+            <a:schemeClr val="accent1"/>
+          </a:effectRef>
+          <a:fontRef idx="minor">
+            <a:schemeClr val="lt1"/>
+          </a:fontRef>
+        </p:style>
+        <p:txBody>
+          <a:bodyPr rot="0" spcFirstLastPara="0" vertOverflow="overflow" horzOverflow="overflow" vert="horz" wrap="square" lIns="83617" tIns="41809" rIns="83617" bIns="41809" numCol="1" spcCol="0" rtlCol="0" fromWordArt="0" anchor="ctr" anchorCtr="0" forceAA="0" compatLnSpc="1">
+            <a:prstTxWarp prst="textNoShape">
+              <a:avLst/>
+            </a:prstTxWarp>
+            <a:noAutofit/>
+          </a:bodyPr>
+          <a:lstStyle/>
+          <a:p>
+            <a:pPr algn="ctr"/>
+            <a:endParaRPr lang="en-IN" sz="1646"/>
+          </a:p>
+        </p:txBody>
+      </p:sp>
+      <p:sp>
+        <p:nvSpPr>
+          <p:cNvPr id="64" name="TextBox 63">
+            <a:extLst>
+              <a:ext uri="{FF2B5EF4-FFF2-40B4-BE49-F238E27FC236}">
+                <a16:creationId xmlns:a16="http://schemas.microsoft.com/office/drawing/2014/main" id="{E231D35F-F7C5-44B9-B36B-3B9C144B3228}"/>
+              </a:ext>
+            </a:extLst>
+          </p:cNvPr>
+          <p:cNvSpPr txBox="1"/>
+          <p:nvPr/>
+        </p:nvSpPr>
+        <p:spPr>
+          <a:xfrm>
+            <a:off x="616284" y="2770942"/>
+            <a:ext cx="1760563" cy="289310"/>
+          </a:xfrm>
+          <a:prstGeom prst="rect">
+            <a:avLst/>
+          </a:prstGeom>
+          <a:noFill/>
+        </p:spPr>
+        <p:txBody>
+          <a:bodyPr wrap="square" rtlCol="0">
+            <a:spAutoFit/>
+          </a:bodyPr>
+          <a:lstStyle/>
+          <a:p>
+            <a:r>
+              <a:rPr lang="en-IN" sz="1280" dirty="0">
+                <a:solidFill>
+                  <a:schemeClr val="bg1"/>
+                </a:solidFill>
+              </a:rPr>
+              <a:t>Generate Credentials</a:t>
+            </a:r>
+          </a:p>
+        </p:txBody>
+      </p:sp>
+      <p:sp>
+        <p:nvSpPr>
+          <p:cNvPr id="65" name="TextBox 64">
+            <a:extLst>
+              <a:ext uri="{FF2B5EF4-FFF2-40B4-BE49-F238E27FC236}">
+                <a16:creationId xmlns:a16="http://schemas.microsoft.com/office/drawing/2014/main" id="{CFEB36D8-316A-4A5A-93A3-F26843E035E9}"/>
+              </a:ext>
+            </a:extLst>
+          </p:cNvPr>
+          <p:cNvSpPr txBox="1"/>
+          <p:nvPr/>
+        </p:nvSpPr>
+        <p:spPr>
+          <a:xfrm>
+            <a:off x="613203" y="2282087"/>
+            <a:ext cx="1619697" cy="289310"/>
+          </a:xfrm>
+          <a:prstGeom prst="rect">
+            <a:avLst/>
+          </a:prstGeom>
+          <a:noFill/>
+        </p:spPr>
+        <p:txBody>
+          <a:bodyPr wrap="square" rtlCol="0">
+            <a:spAutoFit/>
+          </a:bodyPr>
+          <a:lstStyle/>
+          <a:p>
+            <a:r>
+              <a:rPr lang="en-IN" sz="1280" dirty="0">
+                <a:solidFill>
+                  <a:schemeClr val="bg1"/>
+                </a:solidFill>
+              </a:rPr>
+              <a:t>View Documents</a:t>
+            </a:r>
+            <a:endParaRPr lang="en-IN" sz="1646" dirty="0">
+              <a:solidFill>
+                <a:schemeClr val="bg1"/>
+              </a:solidFill>
+            </a:endParaRPr>
+          </a:p>
+        </p:txBody>
+      </p:sp>
+      <p:pic>
+        <p:nvPicPr>
+          <p:cNvPr id="66" name="Picture 65">
+            <a:extLst>
+              <a:ext uri="{FF2B5EF4-FFF2-40B4-BE49-F238E27FC236}">
+                <a16:creationId xmlns:a16="http://schemas.microsoft.com/office/drawing/2014/main" id="{E8C70AA3-0297-499F-A731-DDD2E08CC39E}"/>
+              </a:ext>
+            </a:extLst>
+          </p:cNvPr>
+          <p:cNvPicPr>
+            <a:picLocks noChangeAspect="1"/>
+          </p:cNvPicPr>
+          <p:nvPr/>
+        </p:nvPicPr>
+        <p:blipFill>
+          <a:blip r:embed="rId6" cstate="hqprint">
+            <a:lum bright="70000" contrast="-70000"/>
+            <a:extLst>
+              <a:ext uri="{28A0092B-C50C-407E-A947-70E740481C1C}">
+                <a14:useLocalDpi xmlns:a14="http://schemas.microsoft.com/office/drawing/2010/main" val="0"/>
+              </a:ext>
+            </a:extLst>
+          </a:blip>
+          <a:stretch>
+            <a:fillRect/>
+          </a:stretch>
+        </p:blipFill>
+        <p:spPr>
+          <a:xfrm>
+            <a:off x="215012" y="2230196"/>
+            <a:ext cx="341588" cy="341588"/>
+          </a:xfrm>
+          <a:prstGeom prst="rect">
+            <a:avLst/>
+          </a:prstGeom>
+        </p:spPr>
+      </p:pic>
+      <p:grpSp>
+        <p:nvGrpSpPr>
+          <p:cNvPr id="68" name="Group 67">
+            <a:extLst>
+              <a:ext uri="{FF2B5EF4-FFF2-40B4-BE49-F238E27FC236}">
+                <a16:creationId xmlns:a16="http://schemas.microsoft.com/office/drawing/2014/main" id="{46FEBF72-63F0-487E-8457-46D15C563EC1}"/>
+              </a:ext>
+            </a:extLst>
+          </p:cNvPr>
+          <p:cNvGrpSpPr/>
+          <p:nvPr/>
+        </p:nvGrpSpPr>
+        <p:grpSpPr>
+          <a:xfrm>
+            <a:off x="258648" y="1343802"/>
+            <a:ext cx="1572573" cy="289310"/>
+            <a:chOff x="355094" y="2175932"/>
+            <a:chExt cx="1719698" cy="316377"/>
+          </a:xfrm>
+        </p:grpSpPr>
+        <p:sp>
+          <p:nvSpPr>
+            <p:cNvPr id="69" name="TextBox 68">
+              <a:extLst>
+                <a:ext uri="{FF2B5EF4-FFF2-40B4-BE49-F238E27FC236}">
+                  <a16:creationId xmlns:a16="http://schemas.microsoft.com/office/drawing/2014/main" id="{09AC6179-F12B-4178-9859-A13686F0593C}"/>
+                </a:ext>
+              </a:extLst>
+            </p:cNvPr>
+            <p:cNvSpPr txBox="1"/>
+            <p:nvPr/>
+          </p:nvSpPr>
+          <p:spPr>
+            <a:xfrm>
+              <a:off x="742817" y="2175932"/>
+              <a:ext cx="1331975" cy="316377"/>
+            </a:xfrm>
+            <a:prstGeom prst="rect">
+              <a:avLst/>
+            </a:prstGeom>
+            <a:noFill/>
+          </p:spPr>
+          <p:txBody>
+            <a:bodyPr wrap="square" rtlCol="0">
+              <a:spAutoFit/>
+            </a:bodyPr>
+            <a:lstStyle/>
+            <a:p>
+              <a:r>
+                <a:rPr lang="en-IN" sz="1280" dirty="0">
+                  <a:solidFill>
+                    <a:schemeClr val="bg1"/>
+                  </a:solidFill>
+                </a:rPr>
+                <a:t>Dashboard</a:t>
+              </a:r>
+              <a:endParaRPr lang="en-IN" sz="2195" dirty="0">
+                <a:solidFill>
+                  <a:schemeClr val="bg1"/>
+                </a:solidFill>
+              </a:endParaRPr>
+            </a:p>
+          </p:txBody>
+        </p:sp>
+        <p:pic>
+          <p:nvPicPr>
+            <p:cNvPr id="70" name="Picture 69">
+              <a:extLst>
+                <a:ext uri="{FF2B5EF4-FFF2-40B4-BE49-F238E27FC236}">
+                  <a16:creationId xmlns:a16="http://schemas.microsoft.com/office/drawing/2014/main" id="{250B7EAB-382D-4CB8-9EE2-B491EF80538D}"/>
+                </a:ext>
+              </a:extLst>
+            </p:cNvPr>
+            <p:cNvPicPr>
+              <a:picLocks noChangeAspect="1"/>
+            </p:cNvPicPr>
+            <p:nvPr/>
+          </p:nvPicPr>
+          <p:blipFill>
+            <a:blip r:embed="rId7" cstate="hqprint">
+              <a:extLst>
+                <a:ext uri="{28A0092B-C50C-407E-A947-70E740481C1C}">
+                  <a14:useLocalDpi xmlns:a14="http://schemas.microsoft.com/office/drawing/2010/main" val="0"/>
+                </a:ext>
+              </a:extLst>
+            </a:blip>
+            <a:stretch>
+              <a:fillRect/>
+            </a:stretch>
+          </p:blipFill>
+          <p:spPr>
+            <a:xfrm>
+              <a:off x="355094" y="2191841"/>
+              <a:ext cx="271970" cy="271970"/>
+            </a:xfrm>
+            <a:prstGeom prst="rect">
+              <a:avLst/>
+            </a:prstGeom>
+          </p:spPr>
+        </p:pic>
+      </p:grpSp>
+      <p:sp>
+        <p:nvSpPr>
+          <p:cNvPr id="71" name="TextBox 70">
+            <a:extLst>
+              <a:ext uri="{FF2B5EF4-FFF2-40B4-BE49-F238E27FC236}">
+                <a16:creationId xmlns:a16="http://schemas.microsoft.com/office/drawing/2014/main" id="{2191C1D1-1479-400F-8D27-607820188B51}"/>
+              </a:ext>
+            </a:extLst>
+          </p:cNvPr>
+          <p:cNvSpPr txBox="1"/>
+          <p:nvPr/>
+        </p:nvSpPr>
+        <p:spPr>
+          <a:xfrm>
+            <a:off x="654322" y="1788809"/>
+            <a:ext cx="1760563" cy="289310"/>
+          </a:xfrm>
+          <a:prstGeom prst="rect">
+            <a:avLst/>
+          </a:prstGeom>
+          <a:noFill/>
+        </p:spPr>
+        <p:txBody>
+          <a:bodyPr wrap="square" rtlCol="0">
+            <a:spAutoFit/>
+          </a:bodyPr>
+          <a:lstStyle/>
+          <a:p>
+            <a:r>
+              <a:rPr lang="en-IN" sz="1280" dirty="0">
+                <a:solidFill>
+                  <a:schemeClr val="bg1"/>
+                </a:solidFill>
+              </a:rPr>
+              <a:t>FAQ</a:t>
+            </a:r>
+          </a:p>
+        </p:txBody>
+      </p:sp>
+      <p:pic>
+        <p:nvPicPr>
+          <p:cNvPr id="72" name="Picture 71">
+            <a:extLst>
+              <a:ext uri="{FF2B5EF4-FFF2-40B4-BE49-F238E27FC236}">
+                <a16:creationId xmlns:a16="http://schemas.microsoft.com/office/drawing/2014/main" id="{1A7609FC-03A4-494E-8590-B9B1FEF62EA8}"/>
+              </a:ext>
+            </a:extLst>
+          </p:cNvPr>
+          <p:cNvPicPr>
+            <a:picLocks noChangeAspect="1"/>
+          </p:cNvPicPr>
+          <p:nvPr/>
+        </p:nvPicPr>
+        <p:blipFill>
+          <a:blip r:embed="rId8" cstate="hqprint">
+            <a:extLst>
+              <a:ext uri="{28A0092B-C50C-407E-A947-70E740481C1C}">
+                <a14:useLocalDpi xmlns:a14="http://schemas.microsoft.com/office/drawing/2010/main" val="0"/>
+              </a:ext>
+            </a:extLst>
+          </a:blip>
+          <a:stretch>
+            <a:fillRect/>
+          </a:stretch>
+        </p:blipFill>
+        <p:spPr>
+          <a:xfrm>
+            <a:off x="243593" y="1771934"/>
+            <a:ext cx="253647" cy="253647"/>
+          </a:xfrm>
+          <a:prstGeom prst="rect">
+            <a:avLst/>
+          </a:prstGeom>
+        </p:spPr>
+      </p:pic>
+      <p:pic>
+        <p:nvPicPr>
+          <p:cNvPr id="73" name="Picture 72">
+            <a:extLst>
+              <a:ext uri="{FF2B5EF4-FFF2-40B4-BE49-F238E27FC236}">
+                <a16:creationId xmlns:a16="http://schemas.microsoft.com/office/drawing/2014/main" id="{C35AB38E-8CED-47FE-BB2F-83FA10ADAC30}"/>
+              </a:ext>
+            </a:extLst>
+          </p:cNvPr>
+          <p:cNvPicPr>
+            <a:picLocks noChangeAspect="1"/>
+          </p:cNvPicPr>
+          <p:nvPr/>
+        </p:nvPicPr>
+        <p:blipFill rotWithShape="1">
+          <a:blip r:embed="rId9" cstate="hqprint">
+            <a:lum bright="70000" contrast="-70000"/>
+            <a:extLst>
+              <a:ext uri="{28A0092B-C50C-407E-A947-70E740481C1C}">
+                <a14:useLocalDpi xmlns:a14="http://schemas.microsoft.com/office/drawing/2010/main" val="0"/>
+              </a:ext>
+            </a:extLst>
+          </a:blip>
+          <a:srcRect t="8187" b="11673"/>
+          <a:stretch/>
+        </p:blipFill>
+        <p:spPr>
+          <a:xfrm>
+            <a:off x="204060" y="2770942"/>
+            <a:ext cx="361012" cy="289310"/>
+          </a:xfrm>
+          <a:prstGeom prst="rect">
+            <a:avLst/>
+          </a:prstGeom>
+        </p:spPr>
+      </p:pic>
+      <p:grpSp>
+        <p:nvGrpSpPr>
+          <p:cNvPr id="74" name="Group 73">
+            <a:extLst>
+              <a:ext uri="{FF2B5EF4-FFF2-40B4-BE49-F238E27FC236}">
+                <a16:creationId xmlns:a16="http://schemas.microsoft.com/office/drawing/2014/main" id="{42E92ABD-F303-4B5D-88F3-BA2C0C8777A0}"/>
+              </a:ext>
+            </a:extLst>
+          </p:cNvPr>
+          <p:cNvGrpSpPr/>
+          <p:nvPr/>
+        </p:nvGrpSpPr>
+        <p:grpSpPr>
+          <a:xfrm>
+            <a:off x="202282" y="2770942"/>
+            <a:ext cx="2172787" cy="289310"/>
+            <a:chOff x="202282" y="2770942"/>
+            <a:chExt cx="2172787" cy="289310"/>
+          </a:xfrm>
+        </p:grpSpPr>
+        <p:sp>
+          <p:nvSpPr>
+            <p:cNvPr id="75" name="TextBox 74">
+              <a:extLst>
+                <a:ext uri="{FF2B5EF4-FFF2-40B4-BE49-F238E27FC236}">
+                  <a16:creationId xmlns:a16="http://schemas.microsoft.com/office/drawing/2014/main" id="{65DE5C29-8FE2-4315-82D6-47FE5363908E}"/>
+                </a:ext>
+              </a:extLst>
+            </p:cNvPr>
+            <p:cNvSpPr txBox="1"/>
+            <p:nvPr/>
+          </p:nvSpPr>
+          <p:spPr>
+            <a:xfrm>
+              <a:off x="614506" y="2770942"/>
+              <a:ext cx="1760563" cy="289310"/>
+            </a:xfrm>
+            <a:prstGeom prst="rect">
+              <a:avLst/>
+            </a:prstGeom>
+            <a:noFill/>
+          </p:spPr>
+          <p:txBody>
+            <a:bodyPr wrap="square" rtlCol="0">
+              <a:spAutoFit/>
+            </a:bodyPr>
+            <a:lstStyle/>
+            <a:p>
+              <a:r>
+                <a:rPr lang="en-IN" sz="1280" dirty="0">
+                  <a:solidFill>
+                    <a:schemeClr val="bg1"/>
+                  </a:solidFill>
+                </a:rPr>
+                <a:t>Generate Credentials</a:t>
+              </a:r>
+            </a:p>
+          </p:txBody>
+        </p:sp>
+        <p:pic>
+          <p:nvPicPr>
+            <p:cNvPr id="76" name="Picture 75">
+              <a:extLst>
+                <a:ext uri="{FF2B5EF4-FFF2-40B4-BE49-F238E27FC236}">
+                  <a16:creationId xmlns:a16="http://schemas.microsoft.com/office/drawing/2014/main" id="{82C1BB5E-BA28-430C-B7C0-EF33A56FD60B}"/>
+                </a:ext>
+              </a:extLst>
+            </p:cNvPr>
+            <p:cNvPicPr>
+              <a:picLocks noChangeAspect="1"/>
+            </p:cNvPicPr>
+            <p:nvPr/>
+          </p:nvPicPr>
+          <p:blipFill rotWithShape="1">
+            <a:blip r:embed="rId9" cstate="hqprint">
+              <a:lum bright="70000" contrast="-70000"/>
+              <a:extLst>
+                <a:ext uri="{28A0092B-C50C-407E-A947-70E740481C1C}">
+                  <a14:useLocalDpi xmlns:a14="http://schemas.microsoft.com/office/drawing/2010/main" val="0"/>
+                </a:ext>
+              </a:extLst>
+            </a:blip>
+            <a:srcRect t="8187" b="11673"/>
+            <a:stretch/>
+          </p:blipFill>
+          <p:spPr>
+            <a:xfrm>
+              <a:off x="202282" y="2770942"/>
+              <a:ext cx="361012" cy="289310"/>
+            </a:xfrm>
+            <a:prstGeom prst="rect">
+              <a:avLst/>
+            </a:prstGeom>
+          </p:spPr>
+        </p:pic>
+      </p:grpSp>
+      <p:pic>
+        <p:nvPicPr>
+          <p:cNvPr id="43" name="Picture 2" descr="Image result for update targets icon">
+            <a:extLst>
+              <a:ext uri="{FF2B5EF4-FFF2-40B4-BE49-F238E27FC236}">
+                <a16:creationId xmlns:a16="http://schemas.microsoft.com/office/drawing/2014/main" id="{5A8C2AF0-7AEA-46DB-A994-2C4A92FF9CFA}"/>
+              </a:ext>
+            </a:extLst>
+          </p:cNvPr>
+          <p:cNvPicPr>
+            <a:picLocks noChangeAspect="1" noChangeArrowheads="1"/>
+          </p:cNvPicPr>
+          <p:nvPr/>
+        </p:nvPicPr>
+        <p:blipFill>
+          <a:blip r:embed="rId10">
+            <a:lum bright="70000" contrast="-70000"/>
+            <a:extLst>
+              <a:ext uri="{28A0092B-C50C-407E-A947-70E740481C1C}">
+                <a14:useLocalDpi xmlns:a14="http://schemas.microsoft.com/office/drawing/2010/main" val="0"/>
+              </a:ext>
+            </a:extLst>
+          </a:blip>
+          <a:srcRect/>
+          <a:stretch>
+            <a:fillRect/>
+          </a:stretch>
+        </p:blipFill>
+        <p:spPr bwMode="auto">
+          <a:xfrm>
+            <a:off x="178863" y="3175375"/>
+            <a:ext cx="384432" cy="384432"/>
+          </a:xfrm>
+          <a:prstGeom prst="rect">
+            <a:avLst/>
+          </a:prstGeom>
+          <a:noFill/>
+          <a:ln>
+            <a:noFill/>
+          </a:ln>
+          <a:extLst>
+            <a:ext uri="{909E8E84-426E-40DD-AFC4-6F175D3DCCD1}">
+              <a14:hiddenFill xmlns:a14="http://schemas.microsoft.com/office/drawing/2010/main">
+                <a:solidFill>
+                  <a:srgbClr val="FFFFFF"/>
+                </a:solidFill>
+              </a14:hiddenFill>
+            </a:ext>
+          </a:extLst>
+        </p:spPr>
+      </p:pic>
+      <p:sp>
+        <p:nvSpPr>
+          <p:cNvPr id="44" name="TextBox 43">
+            <a:extLst>
+              <a:ext uri="{FF2B5EF4-FFF2-40B4-BE49-F238E27FC236}">
+                <a16:creationId xmlns:a16="http://schemas.microsoft.com/office/drawing/2014/main" id="{67F736EF-26D5-47F0-AED8-CB0BD532219A}"/>
+              </a:ext>
+            </a:extLst>
+          </p:cNvPr>
+          <p:cNvSpPr txBox="1"/>
+          <p:nvPr/>
+        </p:nvSpPr>
+        <p:spPr>
+          <a:xfrm>
+            <a:off x="654322" y="3195946"/>
+            <a:ext cx="1760563" cy="289310"/>
+          </a:xfrm>
+          <a:prstGeom prst="rect">
+            <a:avLst/>
+          </a:prstGeom>
+          <a:noFill/>
+        </p:spPr>
+        <p:txBody>
+          <a:bodyPr wrap="square" rtlCol="0">
+            <a:spAutoFit/>
+          </a:bodyPr>
+          <a:lstStyle/>
+          <a:p>
+            <a:r>
+              <a:rPr lang="en-IN" sz="1280" dirty="0">
+                <a:solidFill>
+                  <a:schemeClr val="bg1"/>
+                </a:solidFill>
+              </a:rPr>
+              <a:t>Update Target</a:t>
+            </a:r>
+          </a:p>
+        </p:txBody>
+      </p:sp>
+      <p:sp>
+        <p:nvSpPr>
+          <p:cNvPr id="45" name="Rectangle: Rounded Corners 44">
+            <a:extLst>
+              <a:ext uri="{FF2B5EF4-FFF2-40B4-BE49-F238E27FC236}">
+                <a16:creationId xmlns:a16="http://schemas.microsoft.com/office/drawing/2014/main" id="{A3738148-406E-4A79-A4FC-E003E4E24897}"/>
+              </a:ext>
+            </a:extLst>
+          </p:cNvPr>
+          <p:cNvSpPr/>
+          <p:nvPr/>
+        </p:nvSpPr>
+        <p:spPr>
+          <a:xfrm>
+            <a:off x="6039201" y="2125191"/>
+            <a:ext cx="1434044" cy="422168"/>
+          </a:xfrm>
+          <a:prstGeom prst="roundRect">
+            <a:avLst/>
+          </a:prstGeom>
+          <a:solidFill>
+            <a:schemeClr val="bg1"/>
+          </a:solidFill>
+          <a:ln>
+            <a:solidFill>
+              <a:schemeClr val="bg2">
+                <a:lumMod val="50000"/>
+              </a:schemeClr>
+            </a:solidFill>
+          </a:ln>
+        </p:spPr>
+        <p:style>
+          <a:lnRef idx="2">
+            <a:schemeClr val="accent1">
+              <a:shade val="50000"/>
+            </a:schemeClr>
+          </a:lnRef>
+          <a:fillRef idx="1">
+            <a:schemeClr val="accent1"/>
+          </a:fillRef>
+          <a:effectRef idx="0">
+            <a:schemeClr val="accent1"/>
+          </a:effectRef>
+          <a:fontRef idx="minor">
+            <a:schemeClr val="lt1"/>
+          </a:fontRef>
+        </p:style>
+        <p:txBody>
+          <a:bodyPr rtlCol="0" anchor="ctr"/>
+          <a:lstStyle/>
+          <a:p>
+            <a:pPr algn="ctr"/>
+            <a:r>
+              <a:rPr lang="en-IN" sz="1400" dirty="0">
+                <a:solidFill>
+                  <a:schemeClr val="bg2">
+                    <a:lumMod val="50000"/>
+                  </a:schemeClr>
+                </a:solidFill>
+              </a:rPr>
+              <a:t>New Target</a:t>
+            </a:r>
+          </a:p>
+        </p:txBody>
+      </p:sp>
+    </p:spTree>
+    <p:extLst>
+      <p:ext uri="{BB962C8B-B14F-4D97-AF65-F5344CB8AC3E}">
+        <p14:creationId xmlns:p14="http://schemas.microsoft.com/office/powerpoint/2010/main" val="784576596"/>
+      </p:ext>
+    </p:extLst>
+  </p:cSld>
+  <p:clrMapOvr>
+    <a:masterClrMapping/>
+  </p:clrMapOvr>
 </p:sld>
 </file>
 

</xml_diff>

<commit_message>
Author         : Prateek Kapoor File Modified  : Updated Designs.pptx Description    : Added designs for update targets
</commit_message>
<xml_diff>
--- a/Requirements/Product Backlog/Screen Designs/Screen Design Deck/Updated Designs.pptx
+++ b/Requirements/Product Backlog/Screen Designs/Screen Design Deck/Updated Designs.pptx
@@ -2003,7 +2003,7 @@
           <a:p>
             <a:fld id="{736940B7-5369-499F-A655-F2C040499C10}" type="datetimeFigureOut">
               <a:rPr lang="en-IN" smtClean="0"/>
-              <a:t>27-07-2018</a:t>
+              <a:t>01-08-2018</a:t>
             </a:fld>
             <a:endParaRPr lang="en-IN"/>
           </a:p>
@@ -2738,7 +2738,7 @@
           <a:p>
             <a:fld id="{0344983A-0EFF-4FA5-823C-58DD31D92387}" type="datetimeFigureOut">
               <a:rPr lang="en-IN" smtClean="0"/>
-              <a:t>27-07-2018</a:t>
+              <a:t>01-08-2018</a:t>
             </a:fld>
             <a:endParaRPr lang="en-IN"/>
           </a:p>
@@ -2908,7 +2908,7 @@
           <a:p>
             <a:fld id="{0344983A-0EFF-4FA5-823C-58DD31D92387}" type="datetimeFigureOut">
               <a:rPr lang="en-IN" smtClean="0"/>
-              <a:t>27-07-2018</a:t>
+              <a:t>01-08-2018</a:t>
             </a:fld>
             <a:endParaRPr lang="en-IN"/>
           </a:p>
@@ -3088,7 +3088,7 @@
           <a:p>
             <a:fld id="{0344983A-0EFF-4FA5-823C-58DD31D92387}" type="datetimeFigureOut">
               <a:rPr lang="en-IN" smtClean="0"/>
-              <a:t>27-07-2018</a:t>
+              <a:t>01-08-2018</a:t>
             </a:fld>
             <a:endParaRPr lang="en-IN"/>
           </a:p>
@@ -3258,7 +3258,7 @@
           <a:p>
             <a:fld id="{0344983A-0EFF-4FA5-823C-58DD31D92387}" type="datetimeFigureOut">
               <a:rPr lang="en-IN" smtClean="0"/>
-              <a:t>27-07-2018</a:t>
+              <a:t>01-08-2018</a:t>
             </a:fld>
             <a:endParaRPr lang="en-IN"/>
           </a:p>
@@ -3504,7 +3504,7 @@
           <a:p>
             <a:fld id="{0344983A-0EFF-4FA5-823C-58DD31D92387}" type="datetimeFigureOut">
               <a:rPr lang="en-IN" smtClean="0"/>
-              <a:t>27-07-2018</a:t>
+              <a:t>01-08-2018</a:t>
             </a:fld>
             <a:endParaRPr lang="en-IN"/>
           </a:p>
@@ -3736,7 +3736,7 @@
           <a:p>
             <a:fld id="{0344983A-0EFF-4FA5-823C-58DD31D92387}" type="datetimeFigureOut">
               <a:rPr lang="en-IN" smtClean="0"/>
-              <a:t>27-07-2018</a:t>
+              <a:t>01-08-2018</a:t>
             </a:fld>
             <a:endParaRPr lang="en-IN"/>
           </a:p>
@@ -4103,7 +4103,7 @@
           <a:p>
             <a:fld id="{0344983A-0EFF-4FA5-823C-58DD31D92387}" type="datetimeFigureOut">
               <a:rPr lang="en-IN" smtClean="0"/>
-              <a:t>27-07-2018</a:t>
+              <a:t>01-08-2018</a:t>
             </a:fld>
             <a:endParaRPr lang="en-IN"/>
           </a:p>
@@ -4221,7 +4221,7 @@
           <a:p>
             <a:fld id="{0344983A-0EFF-4FA5-823C-58DD31D92387}" type="datetimeFigureOut">
               <a:rPr lang="en-IN" smtClean="0"/>
-              <a:t>27-07-2018</a:t>
+              <a:t>01-08-2018</a:t>
             </a:fld>
             <a:endParaRPr lang="en-IN"/>
           </a:p>
@@ -4316,7 +4316,7 @@
           <a:p>
             <a:fld id="{0344983A-0EFF-4FA5-823C-58DD31D92387}" type="datetimeFigureOut">
               <a:rPr lang="en-IN" smtClean="0"/>
-              <a:t>27-07-2018</a:t>
+              <a:t>01-08-2018</a:t>
             </a:fld>
             <a:endParaRPr lang="en-IN"/>
           </a:p>
@@ -4593,7 +4593,7 @@
           <a:p>
             <a:fld id="{0344983A-0EFF-4FA5-823C-58DD31D92387}" type="datetimeFigureOut">
               <a:rPr lang="en-IN" smtClean="0"/>
-              <a:t>27-07-2018</a:t>
+              <a:t>01-08-2018</a:t>
             </a:fld>
             <a:endParaRPr lang="en-IN"/>
           </a:p>
@@ -4850,7 +4850,7 @@
           <a:p>
             <a:fld id="{0344983A-0EFF-4FA5-823C-58DD31D92387}" type="datetimeFigureOut">
               <a:rPr lang="en-IN" smtClean="0"/>
-              <a:t>27-07-2018</a:t>
+              <a:t>01-08-2018</a:t>
             </a:fld>
             <a:endParaRPr lang="en-IN"/>
           </a:p>
@@ -5063,7 +5063,7 @@
           <a:p>
             <a:fld id="{0344983A-0EFF-4FA5-823C-58DD31D92387}" type="datetimeFigureOut">
               <a:rPr lang="en-IN" smtClean="0"/>
-              <a:t>27-07-2018</a:t>
+              <a:t>01-08-2018</a:t>
             </a:fld>
             <a:endParaRPr lang="en-IN"/>
           </a:p>
@@ -10868,7 +10868,7 @@
           <a:p>
             <a:r>
               <a:rPr lang="en-IN" sz="1097" dirty="0"/>
-              <a:t>&lt;SCGJ Admin&gt;</a:t>
+              <a:t>kamal@sscgj.in</a:t>
             </a:r>
           </a:p>
         </p:txBody>
@@ -10934,10 +10934,10 @@
       </p:sp>
       <p:sp>
         <p:nvSpPr>
-          <p:cNvPr id="40" name="TextBox 39">
-            <a:extLst>
-              <a:ext uri="{FF2B5EF4-FFF2-40B4-BE49-F238E27FC236}">
-                <a16:creationId xmlns:a16="http://schemas.microsoft.com/office/drawing/2014/main" id="{0A89F8E3-B384-4AB2-B391-A12FD1802471}"/>
+          <p:cNvPr id="58" name="TextBox 57">
+            <a:extLst>
+              <a:ext uri="{FF2B5EF4-FFF2-40B4-BE49-F238E27FC236}">
+                <a16:creationId xmlns:a16="http://schemas.microsoft.com/office/drawing/2014/main" id="{D7BDDEE7-3283-4C79-935F-19A0EC04B8CF}"/>
               </a:ext>
             </a:extLst>
           </p:cNvPr>
@@ -10946,46 +10946,7 @@
         </p:nvSpPr>
         <p:spPr>
           <a:xfrm>
-            <a:off x="616284" y="2770942"/>
-            <a:ext cx="1760563" cy="289310"/>
-          </a:xfrm>
-          <a:prstGeom prst="rect">
-            <a:avLst/>
-          </a:prstGeom>
-          <a:noFill/>
-        </p:spPr>
-        <p:txBody>
-          <a:bodyPr wrap="square" rtlCol="0">
-            <a:spAutoFit/>
-          </a:bodyPr>
-          <a:lstStyle/>
-          <a:p>
-            <a:r>
-              <a:rPr lang="en-IN" sz="1280" dirty="0">
-                <a:solidFill>
-                  <a:schemeClr val="bg1"/>
-                </a:solidFill>
-              </a:rPr>
-              <a:t>Generate Credentials</a:t>
-            </a:r>
-          </a:p>
-        </p:txBody>
-      </p:sp>
-      <p:sp>
-        <p:nvSpPr>
-          <p:cNvPr id="58" name="TextBox 57">
-            <a:extLst>
-              <a:ext uri="{FF2B5EF4-FFF2-40B4-BE49-F238E27FC236}">
-                <a16:creationId xmlns:a16="http://schemas.microsoft.com/office/drawing/2014/main" id="{D7BDDEE7-3283-4C79-935F-19A0EC04B8CF}"/>
-              </a:ext>
-            </a:extLst>
-          </p:cNvPr>
-          <p:cNvSpPr txBox="1"/>
-          <p:nvPr/>
-        </p:nvSpPr>
-        <p:spPr>
-          <a:xfrm>
-            <a:off x="613203" y="2282087"/>
+            <a:off x="613203" y="1853105"/>
             <a:ext cx="1619697" cy="289310"/>
           </a:xfrm>
           <a:prstGeom prst="rect">
@@ -11044,7 +11005,7 @@
         </p:blipFill>
         <p:spPr>
           <a:xfrm>
-            <a:off x="215012" y="2230196"/>
+            <a:off x="215012" y="1801214"/>
             <a:ext cx="341588" cy="341588"/>
           </a:xfrm>
           <a:prstGeom prst="rect">
@@ -11153,81 +11114,6 @@
           </p:spPr>
         </p:pic>
       </p:grpSp>
-      <p:sp>
-        <p:nvSpPr>
-          <p:cNvPr id="28" name="TextBox 27">
-            <a:extLst>
-              <a:ext uri="{FF2B5EF4-FFF2-40B4-BE49-F238E27FC236}">
-                <a16:creationId xmlns:a16="http://schemas.microsoft.com/office/drawing/2014/main" id="{7599B6CD-CB1A-4A08-86BA-2BF006A47353}"/>
-              </a:ext>
-            </a:extLst>
-          </p:cNvPr>
-          <p:cNvSpPr txBox="1"/>
-          <p:nvPr/>
-        </p:nvSpPr>
-        <p:spPr>
-          <a:xfrm>
-            <a:off x="654322" y="1788809"/>
-            <a:ext cx="1760563" cy="289310"/>
-          </a:xfrm>
-          <a:prstGeom prst="rect">
-            <a:avLst/>
-          </a:prstGeom>
-          <a:noFill/>
-        </p:spPr>
-        <p:txBody>
-          <a:bodyPr wrap="square" rtlCol="0">
-            <a:spAutoFit/>
-          </a:bodyPr>
-          <a:lstStyle/>
-          <a:p>
-            <a:r>
-              <a:rPr lang="en-IN" sz="1280" dirty="0">
-                <a:solidFill>
-                  <a:schemeClr val="bg1"/>
-                </a:solidFill>
-              </a:rPr>
-              <a:t>FAQ</a:t>
-            </a:r>
-          </a:p>
-        </p:txBody>
-      </p:sp>
-      <p:pic>
-        <p:nvPicPr>
-          <p:cNvPr id="29" name="Picture 28">
-            <a:extLst>
-              <a:ext uri="{FF2B5EF4-FFF2-40B4-BE49-F238E27FC236}">
-                <a16:creationId xmlns:a16="http://schemas.microsoft.com/office/drawing/2014/main" id="{82700779-388B-4579-9E4F-C9BDD3B5AA53}"/>
-              </a:ext>
-            </a:extLst>
-          </p:cNvPr>
-          <p:cNvPicPr>
-            <a:picLocks noChangeAspect="1"/>
-          </p:cNvPicPr>
-          <p:nvPr/>
-        </p:nvPicPr>
-        <p:blipFill>
-          <a:blip r:embed="rId5" cstate="hqprint">
-            <a:extLst>
-              <a:ext uri="{28A0092B-C50C-407E-A947-70E740481C1C}">
-                <a14:useLocalDpi xmlns:a14="http://schemas.microsoft.com/office/drawing/2010/main" val="0"/>
-              </a:ext>
-            </a:extLst>
-          </a:blip>
-          <a:stretch>
-            <a:fillRect/>
-          </a:stretch>
-        </p:blipFill>
-        <p:spPr>
-          <a:xfrm>
-            <a:off x="243593" y="1771934"/>
-            <a:ext cx="253647" cy="253647"/>
-          </a:xfrm>
-          <a:prstGeom prst="rect">
-            <a:avLst/>
-          </a:prstGeom>
-        </p:spPr>
-      </p:pic>
       <p:grpSp>
         <p:nvGrpSpPr>
           <p:cNvPr id="30" name="Group 29">
@@ -11861,7 +11747,7 @@
         </p:xfrm>
         <a:graphic>
           <a:graphicData uri="http://schemas.openxmlformats.org/drawingml/2006/chart">
-            <c:chart xmlns:c="http://schemas.openxmlformats.org/drawingml/2006/chart" xmlns:r="http://schemas.openxmlformats.org/officeDocument/2006/relationships" r:id="rId6"/>
+            <c:chart xmlns:c="http://schemas.openxmlformats.org/drawingml/2006/chart" xmlns:r="http://schemas.openxmlformats.org/officeDocument/2006/relationships" r:id="rId5"/>
           </a:graphicData>
         </a:graphic>
       </p:graphicFrame>
@@ -11880,7 +11766,7 @@
           <p:nvPr/>
         </p:nvPicPr>
         <p:blipFill>
-          <a:blip r:embed="rId7">
+          <a:blip r:embed="rId6">
             <a:extLst>
               <a:ext uri="{28A0092B-C50C-407E-A947-70E740481C1C}">
                 <a14:useLocalDpi xmlns:a14="http://schemas.microsoft.com/office/drawing/2010/main" val="0"/>
@@ -11925,7 +11811,7 @@
         </p:xfrm>
         <a:graphic>
           <a:graphicData uri="http://schemas.openxmlformats.org/drawingml/2006/chart">
-            <c:chart xmlns:c="http://schemas.openxmlformats.org/drawingml/2006/chart" xmlns:r="http://schemas.openxmlformats.org/officeDocument/2006/relationships" r:id="rId8"/>
+            <c:chart xmlns:c="http://schemas.openxmlformats.org/drawingml/2006/chart" xmlns:r="http://schemas.openxmlformats.org/officeDocument/2006/relationships" r:id="rId7"/>
           </a:graphicData>
         </a:graphic>
       </p:graphicFrame>
@@ -12147,7 +12033,7 @@
           <p:nvPr/>
         </p:nvPicPr>
         <p:blipFill>
-          <a:blip r:embed="rId9" cstate="hqprint">
+          <a:blip r:embed="rId8" cstate="hqprint">
             <a:extLst>
               <a:ext uri="{28A0092B-C50C-407E-A947-70E740481C1C}">
                 <a14:useLocalDpi xmlns:a14="http://schemas.microsoft.com/office/drawing/2010/main" val="0"/>
@@ -12353,7 +12239,7 @@
               <p:nvPr/>
             </p:nvPicPr>
             <p:blipFill>
-              <a:blip r:embed="rId10" cstate="hqprint">
+              <a:blip r:embed="rId9" cstate="hqprint">
                 <a:biLevel thresh="25000"/>
                 <a:extLst>
                   <a:ext uri="{28A0092B-C50C-407E-A947-70E740481C1C}">
@@ -12377,42 +12263,6 @@
           </p:pic>
         </p:grpSp>
       </p:grpSp>
-      <p:pic>
-        <p:nvPicPr>
-          <p:cNvPr id="3" name="Picture 2">
-            <a:extLst>
-              <a:ext uri="{FF2B5EF4-FFF2-40B4-BE49-F238E27FC236}">
-                <a16:creationId xmlns:a16="http://schemas.microsoft.com/office/drawing/2014/main" id="{CBAF290B-250D-482B-A06B-B5D700319267}"/>
-              </a:ext>
-            </a:extLst>
-          </p:cNvPr>
-          <p:cNvPicPr>
-            <a:picLocks noChangeAspect="1"/>
-          </p:cNvPicPr>
-          <p:nvPr/>
-        </p:nvPicPr>
-        <p:blipFill rotWithShape="1">
-          <a:blip r:embed="rId11" cstate="hqprint">
-            <a:lum bright="70000" contrast="-70000"/>
-            <a:extLst>
-              <a:ext uri="{28A0092B-C50C-407E-A947-70E740481C1C}">
-                <a14:useLocalDpi xmlns:a14="http://schemas.microsoft.com/office/drawing/2010/main" val="0"/>
-              </a:ext>
-            </a:extLst>
-          </a:blip>
-          <a:srcRect t="8187" b="11673"/>
-          <a:stretch/>
-        </p:blipFill>
-        <p:spPr>
-          <a:xfrm>
-            <a:off x="204060" y="2770942"/>
-            <a:ext cx="361012" cy="289310"/>
-          </a:xfrm>
-          <a:prstGeom prst="rect">
-            <a:avLst/>
-          </a:prstGeom>
-        </p:spPr>
-      </p:pic>
       <p:grpSp>
         <p:nvGrpSpPr>
           <p:cNvPr id="4" name="Group 3">
@@ -12427,7 +12277,7 @@
         </p:nvGrpSpPr>
         <p:grpSpPr>
           <a:xfrm>
-            <a:off x="202282" y="2770942"/>
+            <a:off x="202282" y="2341960"/>
             <a:ext cx="2172787" cy="289310"/>
             <a:chOff x="202282" y="2770942"/>
             <a:chExt cx="2172787" cy="289310"/>
@@ -12487,7 +12337,7 @@
             <p:nvPr/>
           </p:nvPicPr>
           <p:blipFill rotWithShape="1">
-            <a:blip r:embed="rId11" cstate="hqprint">
+            <a:blip r:embed="rId10" cstate="hqprint">
               <a:lum bright="70000" contrast="-70000"/>
               <a:extLst>
                 <a:ext uri="{28A0092B-C50C-407E-A947-70E740481C1C}">
@@ -12509,6 +12359,96 @@
           </p:spPr>
         </p:pic>
       </p:grpSp>
+      <p:pic>
+        <p:nvPicPr>
+          <p:cNvPr id="76" name="Picture 2" descr="Image result for update targets icon">
+            <a:extLst>
+              <a:ext uri="{FF2B5EF4-FFF2-40B4-BE49-F238E27FC236}">
+                <a16:creationId xmlns:a16="http://schemas.microsoft.com/office/drawing/2014/main" id="{B835F5C8-28C9-4BC3-B6E8-1C2FF1641180}"/>
+              </a:ext>
+            </a:extLst>
+          </p:cNvPr>
+          <p:cNvPicPr>
+            <a:picLocks noChangeAspect="1" noChangeArrowheads="1"/>
+          </p:cNvPicPr>
+          <p:nvPr/>
+        </p:nvPicPr>
+        <p:blipFill>
+          <a:blip r:embed="rId11">
+            <a:lum bright="70000" contrast="-70000"/>
+            <a:extLst>
+              <a:ext uri="{28A0092B-C50C-407E-A947-70E740481C1C}">
+                <a14:useLocalDpi xmlns:a14="http://schemas.microsoft.com/office/drawing/2010/main" val="0"/>
+              </a:ext>
+            </a:extLst>
+          </a:blip>
+          <a:srcRect/>
+          <a:stretch>
+            <a:fillRect/>
+          </a:stretch>
+        </p:blipFill>
+        <p:spPr bwMode="auto">
+          <a:xfrm>
+            <a:off x="212730" y="2825416"/>
+            <a:ext cx="384432" cy="384432"/>
+          </a:xfrm>
+          <a:prstGeom prst="rect">
+            <a:avLst/>
+          </a:prstGeom>
+          <a:noFill/>
+          <a:ln>
+            <a:noFill/>
+          </a:ln>
+          <a:extLst>
+            <a:ext uri="{909E8E84-426E-40DD-AFC4-6F175D3DCCD1}">
+              <a14:hiddenFill xmlns:a14="http://schemas.microsoft.com/office/drawing/2010/main">
+                <a:solidFill>
+                  <a:srgbClr val="FFFFFF"/>
+                </a:solidFill>
+              </a14:hiddenFill>
+            </a:ext>
+          </a:extLst>
+        </p:spPr>
+      </p:pic>
+      <p:sp>
+        <p:nvSpPr>
+          <p:cNvPr id="77" name="TextBox 76">
+            <a:extLst>
+              <a:ext uri="{FF2B5EF4-FFF2-40B4-BE49-F238E27FC236}">
+                <a16:creationId xmlns:a16="http://schemas.microsoft.com/office/drawing/2014/main" id="{A6388D39-9551-4721-8E8F-DEF63ED2BF46}"/>
+              </a:ext>
+            </a:extLst>
+          </p:cNvPr>
+          <p:cNvSpPr txBox="1"/>
+          <p:nvPr/>
+        </p:nvSpPr>
+        <p:spPr>
+          <a:xfrm>
+            <a:off x="688189" y="2845987"/>
+            <a:ext cx="1760563" cy="289310"/>
+          </a:xfrm>
+          <a:prstGeom prst="rect">
+            <a:avLst/>
+          </a:prstGeom>
+          <a:noFill/>
+        </p:spPr>
+        <p:txBody>
+          <a:bodyPr wrap="square" rtlCol="0">
+            <a:spAutoFit/>
+          </a:bodyPr>
+          <a:lstStyle/>
+          <a:p>
+            <a:r>
+              <a:rPr lang="en-IN" sz="1280" dirty="0">
+                <a:solidFill>
+                  <a:schemeClr val="bg1"/>
+                </a:solidFill>
+              </a:rPr>
+              <a:t>Update Target</a:t>
+            </a:r>
+          </a:p>
+        </p:txBody>
+      </p:sp>
     </p:spTree>
     <p:extLst>
       <p:ext uri="{BB962C8B-B14F-4D97-AF65-F5344CB8AC3E}">
@@ -17197,10 +17137,234 @@
       </p:grpSp>
       <p:sp>
         <p:nvSpPr>
-          <p:cNvPr id="46" name="TextBox 45">
-            <a:extLst>
-              <a:ext uri="{FF2B5EF4-FFF2-40B4-BE49-F238E27FC236}">
-                <a16:creationId xmlns:a16="http://schemas.microsoft.com/office/drawing/2014/main" id="{F6014889-8F9D-438A-BF08-399C8A285C95}"/>
+          <p:cNvPr id="2" name="TextBox 1">
+            <a:extLst>
+              <a:ext uri="{FF2B5EF4-FFF2-40B4-BE49-F238E27FC236}">
+                <a16:creationId xmlns:a16="http://schemas.microsoft.com/office/drawing/2014/main" id="{681F2909-4F86-4EAE-B285-84861A507740}"/>
+              </a:ext>
+            </a:extLst>
+          </p:cNvPr>
+          <p:cNvSpPr txBox="1"/>
+          <p:nvPr/>
+        </p:nvSpPr>
+        <p:spPr>
+          <a:xfrm>
+            <a:off x="8487732" y="2105097"/>
+            <a:ext cx="620486" cy="369332"/>
+          </a:xfrm>
+          <a:prstGeom prst="rect">
+            <a:avLst/>
+          </a:prstGeom>
+          <a:noFill/>
+        </p:spPr>
+        <p:txBody>
+          <a:bodyPr wrap="square" rtlCol="0">
+            <a:spAutoFit/>
+          </a:bodyPr>
+          <a:lstStyle/>
+          <a:p>
+            <a:r>
+              <a:rPr lang="en-IN" dirty="0">
+                <a:solidFill>
+                  <a:schemeClr val="bg2">
+                    <a:lumMod val="50000"/>
+                  </a:schemeClr>
+                </a:solidFill>
+              </a:rPr>
+              <a:t>or</a:t>
+            </a:r>
+          </a:p>
+        </p:txBody>
+      </p:sp>
+      <p:sp>
+        <p:nvSpPr>
+          <p:cNvPr id="37" name="Rectangle: Rounded Corners 36">
+            <a:extLst>
+              <a:ext uri="{FF2B5EF4-FFF2-40B4-BE49-F238E27FC236}">
+                <a16:creationId xmlns:a16="http://schemas.microsoft.com/office/drawing/2014/main" id="{0E948056-134F-4731-9253-635C9015E262}"/>
+              </a:ext>
+            </a:extLst>
+          </p:cNvPr>
+          <p:cNvSpPr/>
+          <p:nvPr/>
+        </p:nvSpPr>
+        <p:spPr>
+          <a:xfrm>
+            <a:off x="8924519" y="2105097"/>
+            <a:ext cx="2107755" cy="422168"/>
+          </a:xfrm>
+          <a:prstGeom prst="roundRect">
+            <a:avLst/>
+          </a:prstGeom>
+          <a:solidFill>
+            <a:schemeClr val="bg1"/>
+          </a:solidFill>
+          <a:ln>
+            <a:solidFill>
+              <a:schemeClr val="bg2">
+                <a:lumMod val="50000"/>
+              </a:schemeClr>
+            </a:solidFill>
+          </a:ln>
+        </p:spPr>
+        <p:style>
+          <a:lnRef idx="2">
+            <a:schemeClr val="accent1">
+              <a:shade val="50000"/>
+            </a:schemeClr>
+          </a:lnRef>
+          <a:fillRef idx="1">
+            <a:schemeClr val="accent1"/>
+          </a:fillRef>
+          <a:effectRef idx="0">
+            <a:schemeClr val="accent1"/>
+          </a:effectRef>
+          <a:fontRef idx="minor">
+            <a:schemeClr val="lt1"/>
+          </a:fontRef>
+        </p:style>
+        <p:txBody>
+          <a:bodyPr rtlCol="0" anchor="ctr"/>
+          <a:lstStyle/>
+          <a:p>
+            <a:r>
+              <a:rPr lang="en-IN" sz="1646" dirty="0">
+                <a:solidFill>
+                  <a:schemeClr val="bg2">
+                    <a:lumMod val="50000"/>
+                  </a:schemeClr>
+                </a:solidFill>
+              </a:rPr>
+              <a:t>SCGJ Batch Number</a:t>
+            </a:r>
+          </a:p>
+        </p:txBody>
+      </p:sp>
+      <p:sp>
+        <p:nvSpPr>
+          <p:cNvPr id="38" name="Rectangle: Rounded Corners 37">
+            <a:extLst>
+              <a:ext uri="{FF2B5EF4-FFF2-40B4-BE49-F238E27FC236}">
+                <a16:creationId xmlns:a16="http://schemas.microsoft.com/office/drawing/2014/main" id="{AB0168C3-B7DC-4844-B814-0692AEC4AEA2}"/>
+              </a:ext>
+            </a:extLst>
+          </p:cNvPr>
+          <p:cNvSpPr/>
+          <p:nvPr/>
+        </p:nvSpPr>
+        <p:spPr>
+          <a:xfrm>
+            <a:off x="11286173" y="2057648"/>
+            <a:ext cx="973247" cy="416781"/>
+          </a:xfrm>
+          <a:prstGeom prst="roundRect">
+            <a:avLst/>
+          </a:prstGeom>
+          <a:solidFill>
+            <a:srgbClr val="00B0F0"/>
+          </a:solidFill>
+          <a:ln>
+            <a:noFill/>
+          </a:ln>
+        </p:spPr>
+        <p:style>
+          <a:lnRef idx="2">
+            <a:schemeClr val="accent1">
+              <a:shade val="50000"/>
+            </a:schemeClr>
+          </a:lnRef>
+          <a:fillRef idx="1">
+            <a:schemeClr val="accent1"/>
+          </a:fillRef>
+          <a:effectRef idx="0">
+            <a:schemeClr val="accent1"/>
+          </a:effectRef>
+          <a:fontRef idx="minor">
+            <a:schemeClr val="lt1"/>
+          </a:fontRef>
+        </p:style>
+        <p:txBody>
+          <a:bodyPr rtlCol="0" anchor="ctr"/>
+          <a:lstStyle/>
+          <a:p>
+            <a:pPr algn="ctr"/>
+            <a:r>
+              <a:rPr lang="en-IN" sz="1646" dirty="0"/>
+              <a:t>Search</a:t>
+            </a:r>
+          </a:p>
+        </p:txBody>
+      </p:sp>
+      <p:sp>
+        <p:nvSpPr>
+          <p:cNvPr id="39" name="Rectangle: Rounded Corners 38">
+            <a:extLst>
+              <a:ext uri="{FF2B5EF4-FFF2-40B4-BE49-F238E27FC236}">
+                <a16:creationId xmlns:a16="http://schemas.microsoft.com/office/drawing/2014/main" id="{6B1CB6FA-0325-4E52-A341-FC5A4F95EC7D}"/>
+              </a:ext>
+            </a:extLst>
+          </p:cNvPr>
+          <p:cNvSpPr/>
+          <p:nvPr/>
+        </p:nvSpPr>
+        <p:spPr>
+          <a:xfrm>
+            <a:off x="8924520" y="2105097"/>
+            <a:ext cx="2107755" cy="422168"/>
+          </a:xfrm>
+          <a:prstGeom prst="roundRect">
+            <a:avLst/>
+          </a:prstGeom>
+          <a:solidFill>
+            <a:schemeClr val="bg1"/>
+          </a:solidFill>
+          <a:ln>
+            <a:solidFill>
+              <a:schemeClr val="bg2">
+                <a:lumMod val="50000"/>
+              </a:schemeClr>
+            </a:solidFill>
+          </a:ln>
+        </p:spPr>
+        <p:style>
+          <a:lnRef idx="2">
+            <a:schemeClr val="accent1">
+              <a:shade val="50000"/>
+            </a:schemeClr>
+          </a:lnRef>
+          <a:fillRef idx="1">
+            <a:schemeClr val="accent1"/>
+          </a:fillRef>
+          <a:effectRef idx="0">
+            <a:schemeClr val="accent1"/>
+          </a:effectRef>
+          <a:fontRef idx="minor">
+            <a:schemeClr val="lt1"/>
+          </a:fontRef>
+        </p:style>
+        <p:txBody>
+          <a:bodyPr rtlCol="0" anchor="ctr"/>
+          <a:lstStyle/>
+          <a:p>
+            <a:r>
+              <a:rPr lang="en-IN" sz="1646" dirty="0">
+                <a:solidFill>
+                  <a:schemeClr val="bg2">
+                    <a:lumMod val="50000"/>
+                  </a:schemeClr>
+                </a:solidFill>
+              </a:rPr>
+              <a:t>SCGJ Batch Number</a:t>
+            </a:r>
+          </a:p>
+        </p:txBody>
+      </p:sp>
+      <p:sp>
+        <p:nvSpPr>
+          <p:cNvPr id="40" name="TextBox 39">
+            <a:extLst>
+              <a:ext uri="{FF2B5EF4-FFF2-40B4-BE49-F238E27FC236}">
+                <a16:creationId xmlns:a16="http://schemas.microsoft.com/office/drawing/2014/main" id="{F6ACFA37-DA62-4B7A-A427-BF4271EC2B31}"/>
               </a:ext>
             </a:extLst>
           </p:cNvPr>
@@ -17236,10 +17400,10 @@
       </p:sp>
       <p:sp>
         <p:nvSpPr>
-          <p:cNvPr id="47" name="Rectangle 46">
-            <a:extLst>
-              <a:ext uri="{FF2B5EF4-FFF2-40B4-BE49-F238E27FC236}">
-                <a16:creationId xmlns:a16="http://schemas.microsoft.com/office/drawing/2014/main" id="{7A8BABD5-D0BD-41AE-BA92-5326569A142A}"/>
+          <p:cNvPr id="58" name="Rectangle 57">
+            <a:extLst>
+              <a:ext uri="{FF2B5EF4-FFF2-40B4-BE49-F238E27FC236}">
+                <a16:creationId xmlns:a16="http://schemas.microsoft.com/office/drawing/2014/main" id="{23EB29DF-BB74-4C03-912E-571FD3E255A9}"/>
               </a:ext>
             </a:extLst>
           </p:cNvPr>
@@ -17295,10 +17459,10 @@
       </p:sp>
       <p:sp>
         <p:nvSpPr>
-          <p:cNvPr id="48" name="TextBox 47">
-            <a:extLst>
-              <a:ext uri="{FF2B5EF4-FFF2-40B4-BE49-F238E27FC236}">
-                <a16:creationId xmlns:a16="http://schemas.microsoft.com/office/drawing/2014/main" id="{E4EB8544-238E-44E2-923C-9B0EA94834A0}"/>
+          <p:cNvPr id="67" name="TextBox 66">
+            <a:extLst>
+              <a:ext uri="{FF2B5EF4-FFF2-40B4-BE49-F238E27FC236}">
+                <a16:creationId xmlns:a16="http://schemas.microsoft.com/office/drawing/2014/main" id="{5101E0B2-6C1C-4FA7-A7AE-5A54F436DE64}"/>
               </a:ext>
             </a:extLst>
           </p:cNvPr>
@@ -17307,46 +17471,7 @@
         </p:nvSpPr>
         <p:spPr>
           <a:xfrm>
-            <a:off x="616284" y="2770942"/>
-            <a:ext cx="1760563" cy="289310"/>
-          </a:xfrm>
-          <a:prstGeom prst="rect">
-            <a:avLst/>
-          </a:prstGeom>
-          <a:noFill/>
-        </p:spPr>
-        <p:txBody>
-          <a:bodyPr wrap="square" rtlCol="0">
-            <a:spAutoFit/>
-          </a:bodyPr>
-          <a:lstStyle/>
-          <a:p>
-            <a:r>
-              <a:rPr lang="en-IN" sz="1280" dirty="0">
-                <a:solidFill>
-                  <a:schemeClr val="bg1"/>
-                </a:solidFill>
-              </a:rPr>
-              <a:t>Generate Credentials</a:t>
-            </a:r>
-          </a:p>
-        </p:txBody>
-      </p:sp>
-      <p:sp>
-        <p:nvSpPr>
-          <p:cNvPr id="49" name="TextBox 48">
-            <a:extLst>
-              <a:ext uri="{FF2B5EF4-FFF2-40B4-BE49-F238E27FC236}">
-                <a16:creationId xmlns:a16="http://schemas.microsoft.com/office/drawing/2014/main" id="{808890C2-7A5C-4C94-BB71-8DF29DC9D695}"/>
-              </a:ext>
-            </a:extLst>
-          </p:cNvPr>
-          <p:cNvSpPr txBox="1"/>
-          <p:nvPr/>
-        </p:nvSpPr>
-        <p:spPr>
-          <a:xfrm>
-            <a:off x="613203" y="2282087"/>
+            <a:off x="613203" y="1853105"/>
             <a:ext cx="1619697" cy="289310"/>
           </a:xfrm>
           <a:prstGeom prst="rect">
@@ -17378,10 +17503,10 @@
       </p:sp>
       <p:pic>
         <p:nvPicPr>
-          <p:cNvPr id="53" name="Picture 52">
-            <a:extLst>
-              <a:ext uri="{FF2B5EF4-FFF2-40B4-BE49-F238E27FC236}">
-                <a16:creationId xmlns:a16="http://schemas.microsoft.com/office/drawing/2014/main" id="{DE43EB6C-56FF-4159-A876-C9D56872B675}"/>
+          <p:cNvPr id="68" name="Picture 67">
+            <a:extLst>
+              <a:ext uri="{FF2B5EF4-FFF2-40B4-BE49-F238E27FC236}">
+                <a16:creationId xmlns:a16="http://schemas.microsoft.com/office/drawing/2014/main" id="{CF766F56-30D0-4CE0-AEA6-F718C71A68B3}"/>
               </a:ext>
             </a:extLst>
           </p:cNvPr>
@@ -17405,7 +17530,7 @@
         </p:blipFill>
         <p:spPr>
           <a:xfrm>
-            <a:off x="215012" y="2230196"/>
+            <a:off x="215012" y="1801214"/>
             <a:ext cx="341588" cy="341588"/>
           </a:xfrm>
           <a:prstGeom prst="rect">
@@ -17415,10 +17540,10 @@
       </p:pic>
       <p:grpSp>
         <p:nvGrpSpPr>
-          <p:cNvPr id="55" name="Group 54">
-            <a:extLst>
-              <a:ext uri="{FF2B5EF4-FFF2-40B4-BE49-F238E27FC236}">
-                <a16:creationId xmlns:a16="http://schemas.microsoft.com/office/drawing/2014/main" id="{548D07F5-AF4A-43AC-BA0D-B804564662DE}"/>
+          <p:cNvPr id="69" name="Group 68">
+            <a:extLst>
+              <a:ext uri="{FF2B5EF4-FFF2-40B4-BE49-F238E27FC236}">
+                <a16:creationId xmlns:a16="http://schemas.microsoft.com/office/drawing/2014/main" id="{8E2618DE-90FF-4BF7-B875-2CE3E72E94EF}"/>
               </a:ext>
             </a:extLst>
           </p:cNvPr>
@@ -17435,10 +17560,10 @@
         </p:grpSpPr>
         <p:sp>
           <p:nvSpPr>
-            <p:cNvPr id="57" name="TextBox 56">
+            <p:cNvPr id="70" name="TextBox 69">
               <a:extLst>
                 <a:ext uri="{FF2B5EF4-FFF2-40B4-BE49-F238E27FC236}">
-                  <a16:creationId xmlns:a16="http://schemas.microsoft.com/office/drawing/2014/main" id="{E40005A7-FC2C-42DF-BB94-E7BB16C0CA09}"/>
+                  <a16:creationId xmlns:a16="http://schemas.microsoft.com/office/drawing/2014/main" id="{D6072560-3DC9-44A4-9398-2243859D8710}"/>
                 </a:ext>
               </a:extLst>
             </p:cNvPr>
@@ -17479,10 +17604,10 @@
         </p:sp>
         <p:pic>
           <p:nvPicPr>
-            <p:cNvPr id="60" name="Picture 59">
+            <p:cNvPr id="71" name="Picture 70">
               <a:extLst>
                 <a:ext uri="{FF2B5EF4-FFF2-40B4-BE49-F238E27FC236}">
-                  <a16:creationId xmlns:a16="http://schemas.microsoft.com/office/drawing/2014/main" id="{C8A00023-D41A-4E78-83C4-8370BD3E26A6}"/>
+                  <a16:creationId xmlns:a16="http://schemas.microsoft.com/office/drawing/2014/main" id="{26ACFCD9-2C2B-4B95-B6DA-7D80FE3847ED}"/>
                 </a:ext>
               </a:extLst>
             </p:cNvPr>
@@ -17514,123 +17639,12 @@
           </p:spPr>
         </p:pic>
       </p:grpSp>
-      <p:sp>
-        <p:nvSpPr>
-          <p:cNvPr id="61" name="TextBox 60">
-            <a:extLst>
-              <a:ext uri="{FF2B5EF4-FFF2-40B4-BE49-F238E27FC236}">
-                <a16:creationId xmlns:a16="http://schemas.microsoft.com/office/drawing/2014/main" id="{30202CE4-F16C-4D51-B097-37DCDE0A5D09}"/>
-              </a:ext>
-            </a:extLst>
-          </p:cNvPr>
-          <p:cNvSpPr txBox="1"/>
-          <p:nvPr/>
-        </p:nvSpPr>
-        <p:spPr>
-          <a:xfrm>
-            <a:off x="654322" y="1788809"/>
-            <a:ext cx="1760563" cy="289310"/>
-          </a:xfrm>
-          <a:prstGeom prst="rect">
-            <a:avLst/>
-          </a:prstGeom>
-          <a:noFill/>
-        </p:spPr>
-        <p:txBody>
-          <a:bodyPr wrap="square" rtlCol="0">
-            <a:spAutoFit/>
-          </a:bodyPr>
-          <a:lstStyle/>
-          <a:p>
-            <a:r>
-              <a:rPr lang="en-IN" sz="1280" dirty="0">
-                <a:solidFill>
-                  <a:schemeClr val="bg1"/>
-                </a:solidFill>
-              </a:rPr>
-              <a:t>FAQ</a:t>
-            </a:r>
-          </a:p>
-        </p:txBody>
-      </p:sp>
-      <p:pic>
-        <p:nvPicPr>
-          <p:cNvPr id="62" name="Picture 61">
-            <a:extLst>
-              <a:ext uri="{FF2B5EF4-FFF2-40B4-BE49-F238E27FC236}">
-                <a16:creationId xmlns:a16="http://schemas.microsoft.com/office/drawing/2014/main" id="{857136C0-453A-4DD5-A848-FB0585D4B32A}"/>
-              </a:ext>
-            </a:extLst>
-          </p:cNvPr>
-          <p:cNvPicPr>
-            <a:picLocks noChangeAspect="1"/>
-          </p:cNvPicPr>
-          <p:nvPr/>
-        </p:nvPicPr>
-        <p:blipFill>
-          <a:blip r:embed="rId7" cstate="hqprint">
-            <a:extLst>
-              <a:ext uri="{28A0092B-C50C-407E-A947-70E740481C1C}">
-                <a14:useLocalDpi xmlns:a14="http://schemas.microsoft.com/office/drawing/2010/main" val="0"/>
-              </a:ext>
-            </a:extLst>
-          </a:blip>
-          <a:stretch>
-            <a:fillRect/>
-          </a:stretch>
-        </p:blipFill>
-        <p:spPr>
-          <a:xfrm>
-            <a:off x="243593" y="1771934"/>
-            <a:ext cx="253647" cy="253647"/>
-          </a:xfrm>
-          <a:prstGeom prst="rect">
-            <a:avLst/>
-          </a:prstGeom>
-        </p:spPr>
-      </p:pic>
-      <p:pic>
-        <p:nvPicPr>
-          <p:cNvPr id="63" name="Picture 62">
-            <a:extLst>
-              <a:ext uri="{FF2B5EF4-FFF2-40B4-BE49-F238E27FC236}">
-                <a16:creationId xmlns:a16="http://schemas.microsoft.com/office/drawing/2014/main" id="{B10A7B9D-B2E3-4C38-9228-15E83CA9913C}"/>
-              </a:ext>
-            </a:extLst>
-          </p:cNvPr>
-          <p:cNvPicPr>
-            <a:picLocks noChangeAspect="1"/>
-          </p:cNvPicPr>
-          <p:nvPr/>
-        </p:nvPicPr>
-        <p:blipFill rotWithShape="1">
-          <a:blip r:embed="rId8" cstate="hqprint">
-            <a:lum bright="70000" contrast="-70000"/>
-            <a:extLst>
-              <a:ext uri="{28A0092B-C50C-407E-A947-70E740481C1C}">
-                <a14:useLocalDpi xmlns:a14="http://schemas.microsoft.com/office/drawing/2010/main" val="0"/>
-              </a:ext>
-            </a:extLst>
-          </a:blip>
-          <a:srcRect t="8187" b="11673"/>
-          <a:stretch/>
-        </p:blipFill>
-        <p:spPr>
-          <a:xfrm>
-            <a:off x="204060" y="2770942"/>
-            <a:ext cx="361012" cy="289310"/>
-          </a:xfrm>
-          <a:prstGeom prst="rect">
-            <a:avLst/>
-          </a:prstGeom>
-        </p:spPr>
-      </p:pic>
       <p:grpSp>
         <p:nvGrpSpPr>
-          <p:cNvPr id="64" name="Group 63">
-            <a:extLst>
-              <a:ext uri="{FF2B5EF4-FFF2-40B4-BE49-F238E27FC236}">
-                <a16:creationId xmlns:a16="http://schemas.microsoft.com/office/drawing/2014/main" id="{E05E987A-FD78-4AC6-8051-BD472401B24E}"/>
+          <p:cNvPr id="72" name="Group 71">
+            <a:extLst>
+              <a:ext uri="{FF2B5EF4-FFF2-40B4-BE49-F238E27FC236}">
+                <a16:creationId xmlns:a16="http://schemas.microsoft.com/office/drawing/2014/main" id="{59701065-5838-4594-80AF-5BE9FB96E2C4}"/>
               </a:ext>
             </a:extLst>
           </p:cNvPr>
@@ -17639,7 +17653,7 @@
         </p:nvGrpSpPr>
         <p:grpSpPr>
           <a:xfrm>
-            <a:off x="202282" y="2770942"/>
+            <a:off x="202282" y="2341960"/>
             <a:ext cx="2172787" cy="289310"/>
             <a:chOff x="202282" y="2770942"/>
             <a:chExt cx="2172787" cy="289310"/>
@@ -17647,10 +17661,10 @@
         </p:grpSpPr>
         <p:sp>
           <p:nvSpPr>
-            <p:cNvPr id="65" name="TextBox 64">
+            <p:cNvPr id="73" name="TextBox 72">
               <a:extLst>
                 <a:ext uri="{FF2B5EF4-FFF2-40B4-BE49-F238E27FC236}">
-                  <a16:creationId xmlns:a16="http://schemas.microsoft.com/office/drawing/2014/main" id="{D0A189B7-157F-483F-8427-BA735D1DE695}"/>
+                  <a16:creationId xmlns:a16="http://schemas.microsoft.com/office/drawing/2014/main" id="{77FA86AF-41A3-478E-8776-E78A0E9379BF}"/>
                 </a:ext>
               </a:extLst>
             </p:cNvPr>
@@ -17686,10 +17700,10 @@
         </p:sp>
         <p:pic>
           <p:nvPicPr>
-            <p:cNvPr id="66" name="Picture 65">
+            <p:cNvPr id="74" name="Picture 73">
               <a:extLst>
                 <a:ext uri="{FF2B5EF4-FFF2-40B4-BE49-F238E27FC236}">
-                  <a16:creationId xmlns:a16="http://schemas.microsoft.com/office/drawing/2014/main" id="{B60A18A0-FAD1-4481-BE68-A5D73FED51DE}"/>
+                  <a16:creationId xmlns:a16="http://schemas.microsoft.com/office/drawing/2014/main" id="{6CF5F329-873B-4A1D-86F7-19AFEEEF01FF}"/>
                 </a:ext>
               </a:extLst>
             </p:cNvPr>
@@ -17699,7 +17713,7 @@
             <p:nvPr/>
           </p:nvPicPr>
           <p:blipFill rotWithShape="1">
-            <a:blip r:embed="rId8" cstate="hqprint">
+            <a:blip r:embed="rId7" cstate="hqprint">
               <a:lum bright="70000" contrast="-70000"/>
               <a:extLst>
                 <a:ext uri="{28A0092B-C50C-407E-A947-70E740481C1C}">
@@ -17721,12 +17735,63 @@
           </p:spPr>
         </p:pic>
       </p:grpSp>
+      <p:pic>
+        <p:nvPicPr>
+          <p:cNvPr id="75" name="Picture 2" descr="Image result for update targets icon">
+            <a:extLst>
+              <a:ext uri="{FF2B5EF4-FFF2-40B4-BE49-F238E27FC236}">
+                <a16:creationId xmlns:a16="http://schemas.microsoft.com/office/drawing/2014/main" id="{69A87F14-AC69-4834-98D9-41B1D87D320D}"/>
+              </a:ext>
+            </a:extLst>
+          </p:cNvPr>
+          <p:cNvPicPr>
+            <a:picLocks noChangeAspect="1" noChangeArrowheads="1"/>
+          </p:cNvPicPr>
+          <p:nvPr/>
+        </p:nvPicPr>
+        <p:blipFill>
+          <a:blip r:embed="rId8">
+            <a:lum bright="70000" contrast="-70000"/>
+            <a:extLst>
+              <a:ext uri="{28A0092B-C50C-407E-A947-70E740481C1C}">
+                <a14:useLocalDpi xmlns:a14="http://schemas.microsoft.com/office/drawing/2010/main" val="0"/>
+              </a:ext>
+            </a:extLst>
+          </a:blip>
+          <a:srcRect/>
+          <a:stretch>
+            <a:fillRect/>
+          </a:stretch>
+        </p:blipFill>
+        <p:spPr bwMode="auto">
+          <a:xfrm>
+            <a:off x="212730" y="2825416"/>
+            <a:ext cx="384432" cy="384432"/>
+          </a:xfrm>
+          <a:prstGeom prst="rect">
+            <a:avLst/>
+          </a:prstGeom>
+          <a:noFill/>
+          <a:ln>
+            <a:noFill/>
+          </a:ln>
+          <a:extLst>
+            <a:ext uri="{909E8E84-426E-40DD-AFC4-6F175D3DCCD1}">
+              <a14:hiddenFill xmlns:a14="http://schemas.microsoft.com/office/drawing/2010/main">
+                <a:solidFill>
+                  <a:srgbClr val="FFFFFF"/>
+                </a:solidFill>
+              </a14:hiddenFill>
+            </a:ext>
+          </a:extLst>
+        </p:spPr>
+      </p:pic>
       <p:sp>
         <p:nvSpPr>
-          <p:cNvPr id="2" name="TextBox 1">
-            <a:extLst>
-              <a:ext uri="{FF2B5EF4-FFF2-40B4-BE49-F238E27FC236}">
-                <a16:creationId xmlns:a16="http://schemas.microsoft.com/office/drawing/2014/main" id="{681F2909-4F86-4EAE-B285-84861A507740}"/>
+          <p:cNvPr id="76" name="TextBox 75">
+            <a:extLst>
+              <a:ext uri="{FF2B5EF4-FFF2-40B4-BE49-F238E27FC236}">
+                <a16:creationId xmlns:a16="http://schemas.microsoft.com/office/drawing/2014/main" id="{3DBA1E38-2171-4560-97CB-6B2A8AB13162}"/>
               </a:ext>
             </a:extLst>
           </p:cNvPr>
@@ -17735,8 +17800,8 @@
         </p:nvSpPr>
         <p:spPr>
           <a:xfrm>
-            <a:off x="8487732" y="2105097"/>
-            <a:ext cx="620486" cy="369332"/>
+            <a:off x="688189" y="2845987"/>
+            <a:ext cx="1760563" cy="289310"/>
           </a:xfrm>
           <a:prstGeom prst="rect">
             <a:avLst/>
@@ -17750,197 +17815,12 @@
           <a:lstStyle/>
           <a:p>
             <a:r>
-              <a:rPr lang="en-IN" dirty="0">
+              <a:rPr lang="en-IN" sz="1280" dirty="0">
                 <a:solidFill>
-                  <a:schemeClr val="bg2">
-                    <a:lumMod val="50000"/>
-                  </a:schemeClr>
+                  <a:schemeClr val="bg1"/>
                 </a:solidFill>
               </a:rPr>
-              <a:t>or</a:t>
-            </a:r>
-          </a:p>
-        </p:txBody>
-      </p:sp>
-      <p:sp>
-        <p:nvSpPr>
-          <p:cNvPr id="37" name="Rectangle: Rounded Corners 36">
-            <a:extLst>
-              <a:ext uri="{FF2B5EF4-FFF2-40B4-BE49-F238E27FC236}">
-                <a16:creationId xmlns:a16="http://schemas.microsoft.com/office/drawing/2014/main" id="{0E948056-134F-4731-9253-635C9015E262}"/>
-              </a:ext>
-            </a:extLst>
-          </p:cNvPr>
-          <p:cNvSpPr/>
-          <p:nvPr/>
-        </p:nvSpPr>
-        <p:spPr>
-          <a:xfrm>
-            <a:off x="8924519" y="2105097"/>
-            <a:ext cx="2107755" cy="422168"/>
-          </a:xfrm>
-          <a:prstGeom prst="roundRect">
-            <a:avLst/>
-          </a:prstGeom>
-          <a:solidFill>
-            <a:schemeClr val="bg1"/>
-          </a:solidFill>
-          <a:ln>
-            <a:solidFill>
-              <a:schemeClr val="bg2">
-                <a:lumMod val="50000"/>
-              </a:schemeClr>
-            </a:solidFill>
-          </a:ln>
-        </p:spPr>
-        <p:style>
-          <a:lnRef idx="2">
-            <a:schemeClr val="accent1">
-              <a:shade val="50000"/>
-            </a:schemeClr>
-          </a:lnRef>
-          <a:fillRef idx="1">
-            <a:schemeClr val="accent1"/>
-          </a:fillRef>
-          <a:effectRef idx="0">
-            <a:schemeClr val="accent1"/>
-          </a:effectRef>
-          <a:fontRef idx="minor">
-            <a:schemeClr val="lt1"/>
-          </a:fontRef>
-        </p:style>
-        <p:txBody>
-          <a:bodyPr rtlCol="0" anchor="ctr"/>
-          <a:lstStyle/>
-          <a:p>
-            <a:r>
-              <a:rPr lang="en-IN" sz="1646" dirty="0">
-                <a:solidFill>
-                  <a:schemeClr val="bg2">
-                    <a:lumMod val="50000"/>
-                  </a:schemeClr>
-                </a:solidFill>
-              </a:rPr>
-              <a:t>SCGJ Batch Number</a:t>
-            </a:r>
-          </a:p>
-        </p:txBody>
-      </p:sp>
-      <p:sp>
-        <p:nvSpPr>
-          <p:cNvPr id="38" name="Rectangle: Rounded Corners 37">
-            <a:extLst>
-              <a:ext uri="{FF2B5EF4-FFF2-40B4-BE49-F238E27FC236}">
-                <a16:creationId xmlns:a16="http://schemas.microsoft.com/office/drawing/2014/main" id="{AB0168C3-B7DC-4844-B814-0692AEC4AEA2}"/>
-              </a:ext>
-            </a:extLst>
-          </p:cNvPr>
-          <p:cNvSpPr/>
-          <p:nvPr/>
-        </p:nvSpPr>
-        <p:spPr>
-          <a:xfrm>
-            <a:off x="11286173" y="2057648"/>
-            <a:ext cx="973247" cy="416781"/>
-          </a:xfrm>
-          <a:prstGeom prst="roundRect">
-            <a:avLst/>
-          </a:prstGeom>
-          <a:solidFill>
-            <a:srgbClr val="00B0F0"/>
-          </a:solidFill>
-          <a:ln>
-            <a:noFill/>
-          </a:ln>
-        </p:spPr>
-        <p:style>
-          <a:lnRef idx="2">
-            <a:schemeClr val="accent1">
-              <a:shade val="50000"/>
-            </a:schemeClr>
-          </a:lnRef>
-          <a:fillRef idx="1">
-            <a:schemeClr val="accent1"/>
-          </a:fillRef>
-          <a:effectRef idx="0">
-            <a:schemeClr val="accent1"/>
-          </a:effectRef>
-          <a:fontRef idx="minor">
-            <a:schemeClr val="lt1"/>
-          </a:fontRef>
-        </p:style>
-        <p:txBody>
-          <a:bodyPr rtlCol="0" anchor="ctr"/>
-          <a:lstStyle/>
-          <a:p>
-            <a:pPr algn="ctr"/>
-            <a:r>
-              <a:rPr lang="en-IN" sz="1646" dirty="0"/>
-              <a:t>Search</a:t>
-            </a:r>
-          </a:p>
-        </p:txBody>
-      </p:sp>
-      <p:sp>
-        <p:nvSpPr>
-          <p:cNvPr id="39" name="Rectangle: Rounded Corners 38">
-            <a:extLst>
-              <a:ext uri="{FF2B5EF4-FFF2-40B4-BE49-F238E27FC236}">
-                <a16:creationId xmlns:a16="http://schemas.microsoft.com/office/drawing/2014/main" id="{6B1CB6FA-0325-4E52-A341-FC5A4F95EC7D}"/>
-              </a:ext>
-            </a:extLst>
-          </p:cNvPr>
-          <p:cNvSpPr/>
-          <p:nvPr/>
-        </p:nvSpPr>
-        <p:spPr>
-          <a:xfrm>
-            <a:off x="8924520" y="2105097"/>
-            <a:ext cx="2107755" cy="422168"/>
-          </a:xfrm>
-          <a:prstGeom prst="roundRect">
-            <a:avLst/>
-          </a:prstGeom>
-          <a:solidFill>
-            <a:schemeClr val="bg1"/>
-          </a:solidFill>
-          <a:ln>
-            <a:solidFill>
-              <a:schemeClr val="bg2">
-                <a:lumMod val="50000"/>
-              </a:schemeClr>
-            </a:solidFill>
-          </a:ln>
-        </p:spPr>
-        <p:style>
-          <a:lnRef idx="2">
-            <a:schemeClr val="accent1">
-              <a:shade val="50000"/>
-            </a:schemeClr>
-          </a:lnRef>
-          <a:fillRef idx="1">
-            <a:schemeClr val="accent1"/>
-          </a:fillRef>
-          <a:effectRef idx="0">
-            <a:schemeClr val="accent1"/>
-          </a:effectRef>
-          <a:fontRef idx="minor">
-            <a:schemeClr val="lt1"/>
-          </a:fontRef>
-        </p:style>
-        <p:txBody>
-          <a:bodyPr rtlCol="0" anchor="ctr"/>
-          <a:lstStyle/>
-          <a:p>
-            <a:r>
-              <a:rPr lang="en-IN" sz="1646" dirty="0">
-                <a:solidFill>
-                  <a:schemeClr val="bg2">
-                    <a:lumMod val="50000"/>
-                  </a:schemeClr>
-                </a:solidFill>
-              </a:rPr>
-              <a:t>SCGJ Batch Number</a:t>
+              <a:t>Update Target</a:t>
             </a:r>
           </a:p>
         </p:txBody>
@@ -20031,7 +19911,7 @@
           <a:p>
             <a:r>
               <a:rPr lang="en-IN" sz="1097" dirty="0"/>
-              <a:t>&lt;SCGJ Admin&gt;</a:t>
+              <a:t>kamal@sscgj.in</a:t>
             </a:r>
           </a:p>
         </p:txBody>
@@ -20159,7 +20039,7 @@
                   </a:schemeClr>
                 </a:solidFill>
               </a:rPr>
-              <a:t>BS-1231</a:t>
+              <a:t>1231</a:t>
             </a:r>
           </a:p>
         </p:txBody>
@@ -20487,10 +20367,170 @@
       </p:grpSp>
       <p:sp>
         <p:nvSpPr>
-          <p:cNvPr id="37" name="TextBox 36">
-            <a:extLst>
-              <a:ext uri="{FF2B5EF4-FFF2-40B4-BE49-F238E27FC236}">
-                <a16:creationId xmlns:a16="http://schemas.microsoft.com/office/drawing/2014/main" id="{6C8C181A-08D7-4F85-8236-AB9FD6685D4A}"/>
+          <p:cNvPr id="42" name="TextBox 41">
+            <a:extLst>
+              <a:ext uri="{FF2B5EF4-FFF2-40B4-BE49-F238E27FC236}">
+                <a16:creationId xmlns:a16="http://schemas.microsoft.com/office/drawing/2014/main" id="{D69AA5F8-C308-42FA-8ECD-624A71C0EE54}"/>
+              </a:ext>
+            </a:extLst>
+          </p:cNvPr>
+          <p:cNvSpPr txBox="1"/>
+          <p:nvPr/>
+        </p:nvSpPr>
+        <p:spPr>
+          <a:xfrm>
+            <a:off x="8500853" y="2105097"/>
+            <a:ext cx="620486" cy="369332"/>
+          </a:xfrm>
+          <a:prstGeom prst="rect">
+            <a:avLst/>
+          </a:prstGeom>
+          <a:noFill/>
+        </p:spPr>
+        <p:txBody>
+          <a:bodyPr wrap="square" rtlCol="0">
+            <a:spAutoFit/>
+          </a:bodyPr>
+          <a:lstStyle/>
+          <a:p>
+            <a:r>
+              <a:rPr lang="en-IN" dirty="0">
+                <a:solidFill>
+                  <a:schemeClr val="bg2">
+                    <a:lumMod val="50000"/>
+                  </a:schemeClr>
+                </a:solidFill>
+              </a:rPr>
+              <a:t>or</a:t>
+            </a:r>
+          </a:p>
+        </p:txBody>
+      </p:sp>
+      <p:sp>
+        <p:nvSpPr>
+          <p:cNvPr id="43" name="Rectangle: Rounded Corners 42">
+            <a:extLst>
+              <a:ext uri="{FF2B5EF4-FFF2-40B4-BE49-F238E27FC236}">
+                <a16:creationId xmlns:a16="http://schemas.microsoft.com/office/drawing/2014/main" id="{DB5BDE37-5218-44A4-B082-D39014309C53}"/>
+              </a:ext>
+            </a:extLst>
+          </p:cNvPr>
+          <p:cNvSpPr/>
+          <p:nvPr/>
+        </p:nvSpPr>
+        <p:spPr>
+          <a:xfrm>
+            <a:off x="11286173" y="2057648"/>
+            <a:ext cx="973247" cy="416781"/>
+          </a:xfrm>
+          <a:prstGeom prst="roundRect">
+            <a:avLst/>
+          </a:prstGeom>
+          <a:solidFill>
+            <a:srgbClr val="00B0F0"/>
+          </a:solidFill>
+          <a:ln>
+            <a:noFill/>
+          </a:ln>
+        </p:spPr>
+        <p:style>
+          <a:lnRef idx="2">
+            <a:schemeClr val="accent1">
+              <a:shade val="50000"/>
+            </a:schemeClr>
+          </a:lnRef>
+          <a:fillRef idx="1">
+            <a:schemeClr val="accent1"/>
+          </a:fillRef>
+          <a:effectRef idx="0">
+            <a:schemeClr val="accent1"/>
+          </a:effectRef>
+          <a:fontRef idx="minor">
+            <a:schemeClr val="lt1"/>
+          </a:fontRef>
+        </p:style>
+        <p:txBody>
+          <a:bodyPr rtlCol="0" anchor="ctr"/>
+          <a:lstStyle/>
+          <a:p>
+            <a:pPr algn="ctr"/>
+            <a:r>
+              <a:rPr lang="en-IN" sz="1646" dirty="0"/>
+              <a:t>Search</a:t>
+            </a:r>
+          </a:p>
+        </p:txBody>
+      </p:sp>
+      <p:sp>
+        <p:nvSpPr>
+          <p:cNvPr id="67" name="Rectangle: Rounded Corners 66">
+            <a:extLst>
+              <a:ext uri="{FF2B5EF4-FFF2-40B4-BE49-F238E27FC236}">
+                <a16:creationId xmlns:a16="http://schemas.microsoft.com/office/drawing/2014/main" id="{DF8E01BA-F80A-412F-BD28-55518FA79AD8}"/>
+              </a:ext>
+            </a:extLst>
+          </p:cNvPr>
+          <p:cNvSpPr/>
+          <p:nvPr/>
+        </p:nvSpPr>
+        <p:spPr>
+          <a:xfrm>
+            <a:off x="8924520" y="2105097"/>
+            <a:ext cx="2107755" cy="422168"/>
+          </a:xfrm>
+          <a:prstGeom prst="roundRect">
+            <a:avLst/>
+          </a:prstGeom>
+          <a:solidFill>
+            <a:schemeClr val="bg1"/>
+          </a:solidFill>
+          <a:ln>
+            <a:solidFill>
+              <a:schemeClr val="bg2">
+                <a:lumMod val="50000"/>
+              </a:schemeClr>
+            </a:solidFill>
+          </a:ln>
+        </p:spPr>
+        <p:style>
+          <a:lnRef idx="2">
+            <a:schemeClr val="accent1">
+              <a:shade val="50000"/>
+            </a:schemeClr>
+          </a:lnRef>
+          <a:fillRef idx="1">
+            <a:schemeClr val="accent1"/>
+          </a:fillRef>
+          <a:effectRef idx="0">
+            <a:schemeClr val="accent1"/>
+          </a:effectRef>
+          <a:fontRef idx="minor">
+            <a:schemeClr val="lt1"/>
+          </a:fontRef>
+        </p:style>
+        <p:txBody>
+          <a:bodyPr rtlCol="0" anchor="ctr"/>
+          <a:lstStyle/>
+          <a:p>
+            <a:r>
+              <a:rPr lang="en-IN" sz="1646" dirty="0">
+                <a:solidFill>
+                  <a:schemeClr val="bg2">
+                    <a:lumMod val="50000"/>
+                  </a:schemeClr>
+                </a:solidFill>
+              </a:rPr>
+              <a:t>SCGJ Batch Number</a:t>
+            </a:r>
+          </a:p>
+        </p:txBody>
+      </p:sp>
+      <p:sp>
+        <p:nvSpPr>
+          <p:cNvPr id="56" name="TextBox 55">
+            <a:extLst>
+              <a:ext uri="{FF2B5EF4-FFF2-40B4-BE49-F238E27FC236}">
+                <a16:creationId xmlns:a16="http://schemas.microsoft.com/office/drawing/2014/main" id="{08867B1A-6675-49E1-A565-FF144CFDC1A1}"/>
               </a:ext>
             </a:extLst>
           </p:cNvPr>
@@ -20526,10 +20566,10 @@
       </p:sp>
       <p:sp>
         <p:nvSpPr>
-          <p:cNvPr id="39" name="Rectangle 38">
-            <a:extLst>
-              <a:ext uri="{FF2B5EF4-FFF2-40B4-BE49-F238E27FC236}">
-                <a16:creationId xmlns:a16="http://schemas.microsoft.com/office/drawing/2014/main" id="{EA75A56D-039D-411A-8CE0-0EC51B9E9235}"/>
+          <p:cNvPr id="68" name="Rectangle 67">
+            <a:extLst>
+              <a:ext uri="{FF2B5EF4-FFF2-40B4-BE49-F238E27FC236}">
+                <a16:creationId xmlns:a16="http://schemas.microsoft.com/office/drawing/2014/main" id="{84352B75-B493-447B-9639-7149812C9927}"/>
               </a:ext>
             </a:extLst>
           </p:cNvPr>
@@ -20585,10 +20625,10 @@
       </p:sp>
       <p:sp>
         <p:nvSpPr>
-          <p:cNvPr id="40" name="TextBox 39">
-            <a:extLst>
-              <a:ext uri="{FF2B5EF4-FFF2-40B4-BE49-F238E27FC236}">
-                <a16:creationId xmlns:a16="http://schemas.microsoft.com/office/drawing/2014/main" id="{9D8B4AA4-D295-4A56-B26F-84A6901D5762}"/>
+          <p:cNvPr id="69" name="TextBox 68">
+            <a:extLst>
+              <a:ext uri="{FF2B5EF4-FFF2-40B4-BE49-F238E27FC236}">
+                <a16:creationId xmlns:a16="http://schemas.microsoft.com/office/drawing/2014/main" id="{EF908F3D-5F07-440C-99FB-80FD4C8AEDEF}"/>
               </a:ext>
             </a:extLst>
           </p:cNvPr>
@@ -20597,46 +20637,7 @@
         </p:nvSpPr>
         <p:spPr>
           <a:xfrm>
-            <a:off x="616284" y="2770942"/>
-            <a:ext cx="1760563" cy="289310"/>
-          </a:xfrm>
-          <a:prstGeom prst="rect">
-            <a:avLst/>
-          </a:prstGeom>
-          <a:noFill/>
-        </p:spPr>
-        <p:txBody>
-          <a:bodyPr wrap="square" rtlCol="0">
-            <a:spAutoFit/>
-          </a:bodyPr>
-          <a:lstStyle/>
-          <a:p>
-            <a:r>
-              <a:rPr lang="en-IN" sz="1280" dirty="0">
-                <a:solidFill>
-                  <a:schemeClr val="bg1"/>
-                </a:solidFill>
-              </a:rPr>
-              <a:t>Generate Credentials</a:t>
-            </a:r>
-          </a:p>
-        </p:txBody>
-      </p:sp>
-      <p:sp>
-        <p:nvSpPr>
-          <p:cNvPr id="53" name="TextBox 52">
-            <a:extLst>
-              <a:ext uri="{FF2B5EF4-FFF2-40B4-BE49-F238E27FC236}">
-                <a16:creationId xmlns:a16="http://schemas.microsoft.com/office/drawing/2014/main" id="{FCFF8EFA-80D8-4046-A563-26923B52095D}"/>
-              </a:ext>
-            </a:extLst>
-          </p:cNvPr>
-          <p:cNvSpPr txBox="1"/>
-          <p:nvPr/>
-        </p:nvSpPr>
-        <p:spPr>
-          <a:xfrm>
-            <a:off x="613203" y="2282087"/>
+            <a:off x="613203" y="1853105"/>
             <a:ext cx="1619697" cy="289310"/>
           </a:xfrm>
           <a:prstGeom prst="rect">
@@ -20668,10 +20669,10 @@
       </p:sp>
       <p:pic>
         <p:nvPicPr>
-          <p:cNvPr id="55" name="Picture 54">
-            <a:extLst>
-              <a:ext uri="{FF2B5EF4-FFF2-40B4-BE49-F238E27FC236}">
-                <a16:creationId xmlns:a16="http://schemas.microsoft.com/office/drawing/2014/main" id="{02400EE6-A2FE-4ABD-8DD5-D850AE025298}"/>
+          <p:cNvPr id="70" name="Picture 69">
+            <a:extLst>
+              <a:ext uri="{FF2B5EF4-FFF2-40B4-BE49-F238E27FC236}">
+                <a16:creationId xmlns:a16="http://schemas.microsoft.com/office/drawing/2014/main" id="{1A1EF9AB-BD62-4921-99E2-A82B04FFFEB0}"/>
               </a:ext>
             </a:extLst>
           </p:cNvPr>
@@ -20695,7 +20696,7 @@
         </p:blipFill>
         <p:spPr>
           <a:xfrm>
-            <a:off x="215012" y="2230196"/>
+            <a:off x="215012" y="1801214"/>
             <a:ext cx="341588" cy="341588"/>
           </a:xfrm>
           <a:prstGeom prst="rect">
@@ -20705,10 +20706,10 @@
       </p:pic>
       <p:grpSp>
         <p:nvGrpSpPr>
-          <p:cNvPr id="57" name="Group 56">
-            <a:extLst>
-              <a:ext uri="{FF2B5EF4-FFF2-40B4-BE49-F238E27FC236}">
-                <a16:creationId xmlns:a16="http://schemas.microsoft.com/office/drawing/2014/main" id="{EC7B8344-81A7-4922-962D-3AF56566857A}"/>
+          <p:cNvPr id="71" name="Group 70">
+            <a:extLst>
+              <a:ext uri="{FF2B5EF4-FFF2-40B4-BE49-F238E27FC236}">
+                <a16:creationId xmlns:a16="http://schemas.microsoft.com/office/drawing/2014/main" id="{EF60FF2C-1FE0-481C-89AD-3EB9B05ECBA8}"/>
               </a:ext>
             </a:extLst>
           </p:cNvPr>
@@ -20725,10 +20726,10 @@
         </p:grpSpPr>
         <p:sp>
           <p:nvSpPr>
-            <p:cNvPr id="58" name="TextBox 57">
+            <p:cNvPr id="72" name="TextBox 71">
               <a:extLst>
                 <a:ext uri="{FF2B5EF4-FFF2-40B4-BE49-F238E27FC236}">
-                  <a16:creationId xmlns:a16="http://schemas.microsoft.com/office/drawing/2014/main" id="{F3D65B32-238A-4C7A-8556-E9129445E3F1}"/>
+                  <a16:creationId xmlns:a16="http://schemas.microsoft.com/office/drawing/2014/main" id="{A172D960-099A-4AE9-8945-580D73478974}"/>
                 </a:ext>
               </a:extLst>
             </p:cNvPr>
@@ -20769,10 +20770,10 @@
         </p:sp>
         <p:pic>
           <p:nvPicPr>
-            <p:cNvPr id="60" name="Picture 59">
+            <p:cNvPr id="73" name="Picture 72">
               <a:extLst>
                 <a:ext uri="{FF2B5EF4-FFF2-40B4-BE49-F238E27FC236}">
-                  <a16:creationId xmlns:a16="http://schemas.microsoft.com/office/drawing/2014/main" id="{36AB2511-A1E1-4554-AE54-861F5CFF1B99}"/>
+                  <a16:creationId xmlns:a16="http://schemas.microsoft.com/office/drawing/2014/main" id="{59EB76FB-D32C-4843-89C2-9B2016A8C2D3}"/>
                 </a:ext>
               </a:extLst>
             </p:cNvPr>
@@ -20804,123 +20805,12 @@
           </p:spPr>
         </p:pic>
       </p:grpSp>
-      <p:sp>
-        <p:nvSpPr>
-          <p:cNvPr id="61" name="TextBox 60">
-            <a:extLst>
-              <a:ext uri="{FF2B5EF4-FFF2-40B4-BE49-F238E27FC236}">
-                <a16:creationId xmlns:a16="http://schemas.microsoft.com/office/drawing/2014/main" id="{1A3432F1-EF7B-4EE0-9BE0-EBA7A04EB5EB}"/>
-              </a:ext>
-            </a:extLst>
-          </p:cNvPr>
-          <p:cNvSpPr txBox="1"/>
-          <p:nvPr/>
-        </p:nvSpPr>
-        <p:spPr>
-          <a:xfrm>
-            <a:off x="654322" y="1788809"/>
-            <a:ext cx="1760563" cy="289310"/>
-          </a:xfrm>
-          <a:prstGeom prst="rect">
-            <a:avLst/>
-          </a:prstGeom>
-          <a:noFill/>
-        </p:spPr>
-        <p:txBody>
-          <a:bodyPr wrap="square" rtlCol="0">
-            <a:spAutoFit/>
-          </a:bodyPr>
-          <a:lstStyle/>
-          <a:p>
-            <a:r>
-              <a:rPr lang="en-IN" sz="1280" dirty="0">
-                <a:solidFill>
-                  <a:schemeClr val="bg1"/>
-                </a:solidFill>
-              </a:rPr>
-              <a:t>FAQ</a:t>
-            </a:r>
-          </a:p>
-        </p:txBody>
-      </p:sp>
-      <p:pic>
-        <p:nvPicPr>
-          <p:cNvPr id="62" name="Picture 61">
-            <a:extLst>
-              <a:ext uri="{FF2B5EF4-FFF2-40B4-BE49-F238E27FC236}">
-                <a16:creationId xmlns:a16="http://schemas.microsoft.com/office/drawing/2014/main" id="{DE040A91-8433-48AF-8153-FC73ACBBFBFD}"/>
-              </a:ext>
-            </a:extLst>
-          </p:cNvPr>
-          <p:cNvPicPr>
-            <a:picLocks noChangeAspect="1"/>
-          </p:cNvPicPr>
-          <p:nvPr/>
-        </p:nvPicPr>
-        <p:blipFill>
-          <a:blip r:embed="rId9" cstate="hqprint">
-            <a:extLst>
-              <a:ext uri="{28A0092B-C50C-407E-A947-70E740481C1C}">
-                <a14:useLocalDpi xmlns:a14="http://schemas.microsoft.com/office/drawing/2010/main" val="0"/>
-              </a:ext>
-            </a:extLst>
-          </a:blip>
-          <a:stretch>
-            <a:fillRect/>
-          </a:stretch>
-        </p:blipFill>
-        <p:spPr>
-          <a:xfrm>
-            <a:off x="243593" y="1771934"/>
-            <a:ext cx="253647" cy="253647"/>
-          </a:xfrm>
-          <a:prstGeom prst="rect">
-            <a:avLst/>
-          </a:prstGeom>
-        </p:spPr>
-      </p:pic>
-      <p:pic>
-        <p:nvPicPr>
-          <p:cNvPr id="63" name="Picture 62">
-            <a:extLst>
-              <a:ext uri="{FF2B5EF4-FFF2-40B4-BE49-F238E27FC236}">
-                <a16:creationId xmlns:a16="http://schemas.microsoft.com/office/drawing/2014/main" id="{A99B7D53-0E87-4502-9119-E3282581F245}"/>
-              </a:ext>
-            </a:extLst>
-          </p:cNvPr>
-          <p:cNvPicPr>
-            <a:picLocks noChangeAspect="1"/>
-          </p:cNvPicPr>
-          <p:nvPr/>
-        </p:nvPicPr>
-        <p:blipFill rotWithShape="1">
-          <a:blip r:embed="rId10" cstate="hqprint">
-            <a:lum bright="70000" contrast="-70000"/>
-            <a:extLst>
-              <a:ext uri="{28A0092B-C50C-407E-A947-70E740481C1C}">
-                <a14:useLocalDpi xmlns:a14="http://schemas.microsoft.com/office/drawing/2010/main" val="0"/>
-              </a:ext>
-            </a:extLst>
-          </a:blip>
-          <a:srcRect t="8187" b="11673"/>
-          <a:stretch/>
-        </p:blipFill>
-        <p:spPr>
-          <a:xfrm>
-            <a:off x="204060" y="2770942"/>
-            <a:ext cx="361012" cy="289310"/>
-          </a:xfrm>
-          <a:prstGeom prst="rect">
-            <a:avLst/>
-          </a:prstGeom>
-        </p:spPr>
-      </p:pic>
       <p:grpSp>
         <p:nvGrpSpPr>
-          <p:cNvPr id="64" name="Group 63">
-            <a:extLst>
-              <a:ext uri="{FF2B5EF4-FFF2-40B4-BE49-F238E27FC236}">
-                <a16:creationId xmlns:a16="http://schemas.microsoft.com/office/drawing/2014/main" id="{5AF3A374-1BF4-4DE6-9998-5691FA18A1BB}"/>
+          <p:cNvPr id="74" name="Group 73">
+            <a:extLst>
+              <a:ext uri="{FF2B5EF4-FFF2-40B4-BE49-F238E27FC236}">
+                <a16:creationId xmlns:a16="http://schemas.microsoft.com/office/drawing/2014/main" id="{480D28A1-847E-4612-A52F-BA89057460ED}"/>
               </a:ext>
             </a:extLst>
           </p:cNvPr>
@@ -20929,7 +20819,7 @@
         </p:nvGrpSpPr>
         <p:grpSpPr>
           <a:xfrm>
-            <a:off x="202282" y="2770942"/>
+            <a:off x="202282" y="2341960"/>
             <a:ext cx="2172787" cy="289310"/>
             <a:chOff x="202282" y="2770942"/>
             <a:chExt cx="2172787" cy="289310"/>
@@ -20937,10 +20827,10 @@
         </p:grpSpPr>
         <p:sp>
           <p:nvSpPr>
-            <p:cNvPr id="65" name="TextBox 64">
+            <p:cNvPr id="75" name="TextBox 74">
               <a:extLst>
                 <a:ext uri="{FF2B5EF4-FFF2-40B4-BE49-F238E27FC236}">
-                  <a16:creationId xmlns:a16="http://schemas.microsoft.com/office/drawing/2014/main" id="{31B35DB9-8D36-4EC1-8BC5-86A6A6F3DA92}"/>
+                  <a16:creationId xmlns:a16="http://schemas.microsoft.com/office/drawing/2014/main" id="{DF75B5F7-8959-4502-B6DC-A789CB659E29}"/>
                 </a:ext>
               </a:extLst>
             </p:cNvPr>
@@ -20976,10 +20866,10 @@
         </p:sp>
         <p:pic>
           <p:nvPicPr>
-            <p:cNvPr id="66" name="Picture 65">
+            <p:cNvPr id="76" name="Picture 75">
               <a:extLst>
                 <a:ext uri="{FF2B5EF4-FFF2-40B4-BE49-F238E27FC236}">
-                  <a16:creationId xmlns:a16="http://schemas.microsoft.com/office/drawing/2014/main" id="{04C7BA4D-579C-44D1-9359-9BC583EE4D43}"/>
+                  <a16:creationId xmlns:a16="http://schemas.microsoft.com/office/drawing/2014/main" id="{4518B78A-60CA-474D-A0A8-B4643986945A}"/>
                 </a:ext>
               </a:extLst>
             </p:cNvPr>
@@ -20989,7 +20879,7 @@
             <p:nvPr/>
           </p:nvPicPr>
           <p:blipFill rotWithShape="1">
-            <a:blip r:embed="rId10" cstate="hqprint">
+            <a:blip r:embed="rId9" cstate="hqprint">
               <a:lum bright="70000" contrast="-70000"/>
               <a:extLst>
                 <a:ext uri="{28A0092B-C50C-407E-A947-70E740481C1C}">
@@ -21011,12 +20901,63 @@
           </p:spPr>
         </p:pic>
       </p:grpSp>
+      <p:pic>
+        <p:nvPicPr>
+          <p:cNvPr id="77" name="Picture 2" descr="Image result for update targets icon">
+            <a:extLst>
+              <a:ext uri="{FF2B5EF4-FFF2-40B4-BE49-F238E27FC236}">
+                <a16:creationId xmlns:a16="http://schemas.microsoft.com/office/drawing/2014/main" id="{E845E44B-FE48-4148-829A-7E7170633918}"/>
+              </a:ext>
+            </a:extLst>
+          </p:cNvPr>
+          <p:cNvPicPr>
+            <a:picLocks noChangeAspect="1" noChangeArrowheads="1"/>
+          </p:cNvPicPr>
+          <p:nvPr/>
+        </p:nvPicPr>
+        <p:blipFill>
+          <a:blip r:embed="rId10">
+            <a:lum bright="70000" contrast="-70000"/>
+            <a:extLst>
+              <a:ext uri="{28A0092B-C50C-407E-A947-70E740481C1C}">
+                <a14:useLocalDpi xmlns:a14="http://schemas.microsoft.com/office/drawing/2010/main" val="0"/>
+              </a:ext>
+            </a:extLst>
+          </a:blip>
+          <a:srcRect/>
+          <a:stretch>
+            <a:fillRect/>
+          </a:stretch>
+        </p:blipFill>
+        <p:spPr bwMode="auto">
+          <a:xfrm>
+            <a:off x="212730" y="2825416"/>
+            <a:ext cx="384432" cy="384432"/>
+          </a:xfrm>
+          <a:prstGeom prst="rect">
+            <a:avLst/>
+          </a:prstGeom>
+          <a:noFill/>
+          <a:ln>
+            <a:noFill/>
+          </a:ln>
+          <a:extLst>
+            <a:ext uri="{909E8E84-426E-40DD-AFC4-6F175D3DCCD1}">
+              <a14:hiddenFill xmlns:a14="http://schemas.microsoft.com/office/drawing/2010/main">
+                <a:solidFill>
+                  <a:srgbClr val="FFFFFF"/>
+                </a:solidFill>
+              </a14:hiddenFill>
+            </a:ext>
+          </a:extLst>
+        </p:spPr>
+      </p:pic>
       <p:sp>
         <p:nvSpPr>
-          <p:cNvPr id="42" name="TextBox 41">
-            <a:extLst>
-              <a:ext uri="{FF2B5EF4-FFF2-40B4-BE49-F238E27FC236}">
-                <a16:creationId xmlns:a16="http://schemas.microsoft.com/office/drawing/2014/main" id="{D69AA5F8-C308-42FA-8ECD-624A71C0EE54}"/>
+          <p:cNvPr id="78" name="TextBox 77">
+            <a:extLst>
+              <a:ext uri="{FF2B5EF4-FFF2-40B4-BE49-F238E27FC236}">
+                <a16:creationId xmlns:a16="http://schemas.microsoft.com/office/drawing/2014/main" id="{87116CD7-522E-4D75-96E3-C4BCA47C60C1}"/>
               </a:ext>
             </a:extLst>
           </p:cNvPr>
@@ -21025,8 +20966,8 @@
         </p:nvSpPr>
         <p:spPr>
           <a:xfrm>
-            <a:off x="8500853" y="2105097"/>
-            <a:ext cx="620486" cy="369332"/>
+            <a:off x="688189" y="2845987"/>
+            <a:ext cx="1760563" cy="289310"/>
           </a:xfrm>
           <a:prstGeom prst="rect">
             <a:avLst/>
@@ -21040,133 +20981,12 @@
           <a:lstStyle/>
           <a:p>
             <a:r>
-              <a:rPr lang="en-IN" dirty="0">
+              <a:rPr lang="en-IN" sz="1280" dirty="0">
                 <a:solidFill>
-                  <a:schemeClr val="bg2">
-                    <a:lumMod val="50000"/>
-                  </a:schemeClr>
+                  <a:schemeClr val="bg1"/>
                 </a:solidFill>
               </a:rPr>
-              <a:t>or</a:t>
-            </a:r>
-          </a:p>
-        </p:txBody>
-      </p:sp>
-      <p:sp>
-        <p:nvSpPr>
-          <p:cNvPr id="43" name="Rectangle: Rounded Corners 42">
-            <a:extLst>
-              <a:ext uri="{FF2B5EF4-FFF2-40B4-BE49-F238E27FC236}">
-                <a16:creationId xmlns:a16="http://schemas.microsoft.com/office/drawing/2014/main" id="{DB5BDE37-5218-44A4-B082-D39014309C53}"/>
-              </a:ext>
-            </a:extLst>
-          </p:cNvPr>
-          <p:cNvSpPr/>
-          <p:nvPr/>
-        </p:nvSpPr>
-        <p:spPr>
-          <a:xfrm>
-            <a:off x="11286173" y="2057648"/>
-            <a:ext cx="973247" cy="416781"/>
-          </a:xfrm>
-          <a:prstGeom prst="roundRect">
-            <a:avLst/>
-          </a:prstGeom>
-          <a:solidFill>
-            <a:srgbClr val="00B0F0"/>
-          </a:solidFill>
-          <a:ln>
-            <a:noFill/>
-          </a:ln>
-        </p:spPr>
-        <p:style>
-          <a:lnRef idx="2">
-            <a:schemeClr val="accent1">
-              <a:shade val="50000"/>
-            </a:schemeClr>
-          </a:lnRef>
-          <a:fillRef idx="1">
-            <a:schemeClr val="accent1"/>
-          </a:fillRef>
-          <a:effectRef idx="0">
-            <a:schemeClr val="accent1"/>
-          </a:effectRef>
-          <a:fontRef idx="minor">
-            <a:schemeClr val="lt1"/>
-          </a:fontRef>
-        </p:style>
-        <p:txBody>
-          <a:bodyPr rtlCol="0" anchor="ctr"/>
-          <a:lstStyle/>
-          <a:p>
-            <a:pPr algn="ctr"/>
-            <a:r>
-              <a:rPr lang="en-IN" sz="1646" dirty="0"/>
-              <a:t>Search</a:t>
-            </a:r>
-          </a:p>
-        </p:txBody>
-      </p:sp>
-      <p:sp>
-        <p:nvSpPr>
-          <p:cNvPr id="67" name="Rectangle: Rounded Corners 66">
-            <a:extLst>
-              <a:ext uri="{FF2B5EF4-FFF2-40B4-BE49-F238E27FC236}">
-                <a16:creationId xmlns:a16="http://schemas.microsoft.com/office/drawing/2014/main" id="{DF8E01BA-F80A-412F-BD28-55518FA79AD8}"/>
-              </a:ext>
-            </a:extLst>
-          </p:cNvPr>
-          <p:cNvSpPr/>
-          <p:nvPr/>
-        </p:nvSpPr>
-        <p:spPr>
-          <a:xfrm>
-            <a:off x="8924520" y="2105097"/>
-            <a:ext cx="2107755" cy="422168"/>
-          </a:xfrm>
-          <a:prstGeom prst="roundRect">
-            <a:avLst/>
-          </a:prstGeom>
-          <a:solidFill>
-            <a:schemeClr val="bg1"/>
-          </a:solidFill>
-          <a:ln>
-            <a:solidFill>
-              <a:schemeClr val="bg2">
-                <a:lumMod val="50000"/>
-              </a:schemeClr>
-            </a:solidFill>
-          </a:ln>
-        </p:spPr>
-        <p:style>
-          <a:lnRef idx="2">
-            <a:schemeClr val="accent1">
-              <a:shade val="50000"/>
-            </a:schemeClr>
-          </a:lnRef>
-          <a:fillRef idx="1">
-            <a:schemeClr val="accent1"/>
-          </a:fillRef>
-          <a:effectRef idx="0">
-            <a:schemeClr val="accent1"/>
-          </a:effectRef>
-          <a:fontRef idx="minor">
-            <a:schemeClr val="lt1"/>
-          </a:fontRef>
-        </p:style>
-        <p:txBody>
-          <a:bodyPr rtlCol="0" anchor="ctr"/>
-          <a:lstStyle/>
-          <a:p>
-            <a:r>
-              <a:rPr lang="en-IN" sz="1646" dirty="0">
-                <a:solidFill>
-                  <a:schemeClr val="bg2">
-                    <a:lumMod val="50000"/>
-                  </a:schemeClr>
-                </a:solidFill>
-              </a:rPr>
-              <a:t>SCGJ Batch Number</a:t>
+              <a:t>Update Target</a:t>
             </a:r>
           </a:p>
         </p:txBody>
@@ -22678,10 +22498,10 @@
       </p:grpSp>
       <p:sp>
         <p:nvSpPr>
-          <p:cNvPr id="40" name="TextBox 39">
-            <a:extLst>
-              <a:ext uri="{FF2B5EF4-FFF2-40B4-BE49-F238E27FC236}">
-                <a16:creationId xmlns:a16="http://schemas.microsoft.com/office/drawing/2014/main" id="{3A6F0543-E6CD-40B2-99E6-40CB1AAF04A7}"/>
+          <p:cNvPr id="42" name="TextBox 41">
+            <a:extLst>
+              <a:ext uri="{FF2B5EF4-FFF2-40B4-BE49-F238E27FC236}">
+                <a16:creationId xmlns:a16="http://schemas.microsoft.com/office/drawing/2014/main" id="{5673C789-6238-40CA-BF0F-E8191C71876D}"/>
               </a:ext>
             </a:extLst>
           </p:cNvPr>
@@ -22717,10 +22537,10 @@
       </p:sp>
       <p:sp>
         <p:nvSpPr>
-          <p:cNvPr id="55" name="Rectangle 54">
-            <a:extLst>
-              <a:ext uri="{FF2B5EF4-FFF2-40B4-BE49-F238E27FC236}">
-                <a16:creationId xmlns:a16="http://schemas.microsoft.com/office/drawing/2014/main" id="{6AB29287-DB60-4E77-AA79-812CB6C0DCA4}"/>
+          <p:cNvPr id="43" name="Rectangle 42">
+            <a:extLst>
+              <a:ext uri="{FF2B5EF4-FFF2-40B4-BE49-F238E27FC236}">
+                <a16:creationId xmlns:a16="http://schemas.microsoft.com/office/drawing/2014/main" id="{519CA0B3-A197-4DE9-A928-6CB85BCE53D5}"/>
               </a:ext>
             </a:extLst>
           </p:cNvPr>
@@ -22776,10 +22596,10 @@
       </p:sp>
       <p:sp>
         <p:nvSpPr>
-          <p:cNvPr id="64" name="TextBox 63">
-            <a:extLst>
-              <a:ext uri="{FF2B5EF4-FFF2-40B4-BE49-F238E27FC236}">
-                <a16:creationId xmlns:a16="http://schemas.microsoft.com/office/drawing/2014/main" id="{B1C47761-80E2-425F-A44A-CF1286F2AB2C}"/>
+          <p:cNvPr id="44" name="TextBox 43">
+            <a:extLst>
+              <a:ext uri="{FF2B5EF4-FFF2-40B4-BE49-F238E27FC236}">
+                <a16:creationId xmlns:a16="http://schemas.microsoft.com/office/drawing/2014/main" id="{C66C1D69-A7CF-4D9D-93DE-ADD0D9EA081A}"/>
               </a:ext>
             </a:extLst>
           </p:cNvPr>
@@ -22788,46 +22608,7 @@
         </p:nvSpPr>
         <p:spPr>
           <a:xfrm>
-            <a:off x="616284" y="2770942"/>
-            <a:ext cx="1760563" cy="289310"/>
-          </a:xfrm>
-          <a:prstGeom prst="rect">
-            <a:avLst/>
-          </a:prstGeom>
-          <a:noFill/>
-        </p:spPr>
-        <p:txBody>
-          <a:bodyPr wrap="square" rtlCol="0">
-            <a:spAutoFit/>
-          </a:bodyPr>
-          <a:lstStyle/>
-          <a:p>
-            <a:r>
-              <a:rPr lang="en-IN" sz="1280" dirty="0">
-                <a:solidFill>
-                  <a:schemeClr val="bg1"/>
-                </a:solidFill>
-              </a:rPr>
-              <a:t>Generate Credentials</a:t>
-            </a:r>
-          </a:p>
-        </p:txBody>
-      </p:sp>
-      <p:sp>
-        <p:nvSpPr>
-          <p:cNvPr id="65" name="TextBox 64">
-            <a:extLst>
-              <a:ext uri="{FF2B5EF4-FFF2-40B4-BE49-F238E27FC236}">
-                <a16:creationId xmlns:a16="http://schemas.microsoft.com/office/drawing/2014/main" id="{60875939-1915-4145-82F1-3360BB5958A3}"/>
-              </a:ext>
-            </a:extLst>
-          </p:cNvPr>
-          <p:cNvSpPr txBox="1"/>
-          <p:nvPr/>
-        </p:nvSpPr>
-        <p:spPr>
-          <a:xfrm>
-            <a:off x="613203" y="2282087"/>
+            <a:off x="613203" y="1853105"/>
             <a:ext cx="1619697" cy="289310"/>
           </a:xfrm>
           <a:prstGeom prst="rect">
@@ -22859,10 +22640,10 @@
       </p:sp>
       <p:pic>
         <p:nvPicPr>
-          <p:cNvPr id="66" name="Picture 65">
-            <a:extLst>
-              <a:ext uri="{FF2B5EF4-FFF2-40B4-BE49-F238E27FC236}">
-                <a16:creationId xmlns:a16="http://schemas.microsoft.com/office/drawing/2014/main" id="{8CC186E7-EFC3-4D90-9977-1CAA97BA994E}"/>
+          <p:cNvPr id="45" name="Picture 44">
+            <a:extLst>
+              <a:ext uri="{FF2B5EF4-FFF2-40B4-BE49-F238E27FC236}">
+                <a16:creationId xmlns:a16="http://schemas.microsoft.com/office/drawing/2014/main" id="{31D19266-96E6-4452-BCD3-A22958F925B5}"/>
               </a:ext>
             </a:extLst>
           </p:cNvPr>
@@ -22886,7 +22667,7 @@
         </p:blipFill>
         <p:spPr>
           <a:xfrm>
-            <a:off x="215012" y="2230196"/>
+            <a:off x="215012" y="1801214"/>
             <a:ext cx="341588" cy="341588"/>
           </a:xfrm>
           <a:prstGeom prst="rect">
@@ -22896,10 +22677,10 @@
       </p:pic>
       <p:grpSp>
         <p:nvGrpSpPr>
-          <p:cNvPr id="68" name="Group 67">
-            <a:extLst>
-              <a:ext uri="{FF2B5EF4-FFF2-40B4-BE49-F238E27FC236}">
-                <a16:creationId xmlns:a16="http://schemas.microsoft.com/office/drawing/2014/main" id="{9BDB6314-8355-4F56-98E5-2A9F97111F3C}"/>
+          <p:cNvPr id="46" name="Group 45">
+            <a:extLst>
+              <a:ext uri="{FF2B5EF4-FFF2-40B4-BE49-F238E27FC236}">
+                <a16:creationId xmlns:a16="http://schemas.microsoft.com/office/drawing/2014/main" id="{3FA9AD04-9987-4332-99A5-0BD59B2F24A1}"/>
               </a:ext>
             </a:extLst>
           </p:cNvPr>
@@ -22916,10 +22697,10 @@
         </p:grpSpPr>
         <p:sp>
           <p:nvSpPr>
-            <p:cNvPr id="69" name="TextBox 68">
+            <p:cNvPr id="47" name="TextBox 46">
               <a:extLst>
                 <a:ext uri="{FF2B5EF4-FFF2-40B4-BE49-F238E27FC236}">
-                  <a16:creationId xmlns:a16="http://schemas.microsoft.com/office/drawing/2014/main" id="{3FA46A0B-D643-49BE-B8CB-24A6E1562AC6}"/>
+                  <a16:creationId xmlns:a16="http://schemas.microsoft.com/office/drawing/2014/main" id="{B4BBD15F-5C2F-48DA-B252-6259DDC53A79}"/>
                 </a:ext>
               </a:extLst>
             </p:cNvPr>
@@ -22960,10 +22741,10 @@
         </p:sp>
         <p:pic>
           <p:nvPicPr>
-            <p:cNvPr id="70" name="Picture 69">
+            <p:cNvPr id="48" name="Picture 47">
               <a:extLst>
                 <a:ext uri="{FF2B5EF4-FFF2-40B4-BE49-F238E27FC236}">
-                  <a16:creationId xmlns:a16="http://schemas.microsoft.com/office/drawing/2014/main" id="{969328B6-D70C-4BE6-AD50-AF89B71454AA}"/>
+                  <a16:creationId xmlns:a16="http://schemas.microsoft.com/office/drawing/2014/main" id="{9B1DC870-AA2F-4CA8-BCC1-82ED11A062B8}"/>
                 </a:ext>
               </a:extLst>
             </p:cNvPr>
@@ -22995,123 +22776,12 @@
           </p:spPr>
         </p:pic>
       </p:grpSp>
-      <p:sp>
-        <p:nvSpPr>
-          <p:cNvPr id="71" name="TextBox 70">
-            <a:extLst>
-              <a:ext uri="{FF2B5EF4-FFF2-40B4-BE49-F238E27FC236}">
-                <a16:creationId xmlns:a16="http://schemas.microsoft.com/office/drawing/2014/main" id="{2F28A231-58FA-4F1B-A5E7-728A584AF9F1}"/>
-              </a:ext>
-            </a:extLst>
-          </p:cNvPr>
-          <p:cNvSpPr txBox="1"/>
-          <p:nvPr/>
-        </p:nvSpPr>
-        <p:spPr>
-          <a:xfrm>
-            <a:off x="654322" y="1788809"/>
-            <a:ext cx="1760563" cy="289310"/>
-          </a:xfrm>
-          <a:prstGeom prst="rect">
-            <a:avLst/>
-          </a:prstGeom>
-          <a:noFill/>
-        </p:spPr>
-        <p:txBody>
-          <a:bodyPr wrap="square" rtlCol="0">
-            <a:spAutoFit/>
-          </a:bodyPr>
-          <a:lstStyle/>
-          <a:p>
-            <a:r>
-              <a:rPr lang="en-IN" sz="1280" dirty="0">
-                <a:solidFill>
-                  <a:schemeClr val="bg1"/>
-                </a:solidFill>
-              </a:rPr>
-              <a:t>FAQ</a:t>
-            </a:r>
-          </a:p>
-        </p:txBody>
-      </p:sp>
-      <p:pic>
-        <p:nvPicPr>
-          <p:cNvPr id="72" name="Picture 71">
-            <a:extLst>
-              <a:ext uri="{FF2B5EF4-FFF2-40B4-BE49-F238E27FC236}">
-                <a16:creationId xmlns:a16="http://schemas.microsoft.com/office/drawing/2014/main" id="{D20E2D62-C754-4B3D-94F5-896CC8298723}"/>
-              </a:ext>
-            </a:extLst>
-          </p:cNvPr>
-          <p:cNvPicPr>
-            <a:picLocks noChangeAspect="1"/>
-          </p:cNvPicPr>
-          <p:nvPr/>
-        </p:nvPicPr>
-        <p:blipFill>
-          <a:blip r:embed="rId9" cstate="hqprint">
-            <a:extLst>
-              <a:ext uri="{28A0092B-C50C-407E-A947-70E740481C1C}">
-                <a14:useLocalDpi xmlns:a14="http://schemas.microsoft.com/office/drawing/2010/main" val="0"/>
-              </a:ext>
-            </a:extLst>
-          </a:blip>
-          <a:stretch>
-            <a:fillRect/>
-          </a:stretch>
-        </p:blipFill>
-        <p:spPr>
-          <a:xfrm>
-            <a:off x="243593" y="1771934"/>
-            <a:ext cx="253647" cy="253647"/>
-          </a:xfrm>
-          <a:prstGeom prst="rect">
-            <a:avLst/>
-          </a:prstGeom>
-        </p:spPr>
-      </p:pic>
-      <p:pic>
-        <p:nvPicPr>
-          <p:cNvPr id="73" name="Picture 72">
-            <a:extLst>
-              <a:ext uri="{FF2B5EF4-FFF2-40B4-BE49-F238E27FC236}">
-                <a16:creationId xmlns:a16="http://schemas.microsoft.com/office/drawing/2014/main" id="{5BA73802-AD29-4A09-AA1F-C71E56A13257}"/>
-              </a:ext>
-            </a:extLst>
-          </p:cNvPr>
-          <p:cNvPicPr>
-            <a:picLocks noChangeAspect="1"/>
-          </p:cNvPicPr>
-          <p:nvPr/>
-        </p:nvPicPr>
-        <p:blipFill rotWithShape="1">
-          <a:blip r:embed="rId10" cstate="hqprint">
-            <a:lum bright="70000" contrast="-70000"/>
-            <a:extLst>
-              <a:ext uri="{28A0092B-C50C-407E-A947-70E740481C1C}">
-                <a14:useLocalDpi xmlns:a14="http://schemas.microsoft.com/office/drawing/2010/main" val="0"/>
-              </a:ext>
-            </a:extLst>
-          </a:blip>
-          <a:srcRect t="8187" b="11673"/>
-          <a:stretch/>
-        </p:blipFill>
-        <p:spPr>
-          <a:xfrm>
-            <a:off x="204060" y="2770942"/>
-            <a:ext cx="361012" cy="289310"/>
-          </a:xfrm>
-          <a:prstGeom prst="rect">
-            <a:avLst/>
-          </a:prstGeom>
-        </p:spPr>
-      </p:pic>
       <p:grpSp>
         <p:nvGrpSpPr>
-          <p:cNvPr id="74" name="Group 73">
-            <a:extLst>
-              <a:ext uri="{FF2B5EF4-FFF2-40B4-BE49-F238E27FC236}">
-                <a16:creationId xmlns:a16="http://schemas.microsoft.com/office/drawing/2014/main" id="{2991D591-B5AE-4B16-AC3A-C28CA4140339}"/>
+          <p:cNvPr id="49" name="Group 48">
+            <a:extLst>
+              <a:ext uri="{FF2B5EF4-FFF2-40B4-BE49-F238E27FC236}">
+                <a16:creationId xmlns:a16="http://schemas.microsoft.com/office/drawing/2014/main" id="{86150B8E-DFA3-4829-AE42-4FAFF2924587}"/>
               </a:ext>
             </a:extLst>
           </p:cNvPr>
@@ -23120,7 +22790,7 @@
         </p:nvGrpSpPr>
         <p:grpSpPr>
           <a:xfrm>
-            <a:off x="202282" y="2770942"/>
+            <a:off x="202282" y="2341960"/>
             <a:ext cx="2172787" cy="289310"/>
             <a:chOff x="202282" y="2770942"/>
             <a:chExt cx="2172787" cy="289310"/>
@@ -23128,10 +22798,10 @@
         </p:grpSpPr>
         <p:sp>
           <p:nvSpPr>
-            <p:cNvPr id="75" name="TextBox 74">
+            <p:cNvPr id="67" name="TextBox 66">
               <a:extLst>
                 <a:ext uri="{FF2B5EF4-FFF2-40B4-BE49-F238E27FC236}">
-                  <a16:creationId xmlns:a16="http://schemas.microsoft.com/office/drawing/2014/main" id="{40739E53-A514-4152-815A-2A140E6E734F}"/>
+                  <a16:creationId xmlns:a16="http://schemas.microsoft.com/office/drawing/2014/main" id="{AAED5033-D2B9-4965-BE9D-849AB1FDE68E}"/>
                 </a:ext>
               </a:extLst>
             </p:cNvPr>
@@ -23167,10 +22837,10 @@
         </p:sp>
         <p:pic>
           <p:nvPicPr>
-            <p:cNvPr id="76" name="Picture 75">
+            <p:cNvPr id="77" name="Picture 76">
               <a:extLst>
                 <a:ext uri="{FF2B5EF4-FFF2-40B4-BE49-F238E27FC236}">
-                  <a16:creationId xmlns:a16="http://schemas.microsoft.com/office/drawing/2014/main" id="{5B4E242D-F655-4536-A0E1-B90DDA239A7A}"/>
+                  <a16:creationId xmlns:a16="http://schemas.microsoft.com/office/drawing/2014/main" id="{62ECE7EC-362C-475D-8A66-367DB9F77EAA}"/>
                 </a:ext>
               </a:extLst>
             </p:cNvPr>
@@ -23180,7 +22850,7 @@
             <p:nvPr/>
           </p:nvPicPr>
           <p:blipFill rotWithShape="1">
-            <a:blip r:embed="rId10" cstate="hqprint">
+            <a:blip r:embed="rId9" cstate="hqprint">
               <a:lum bright="70000" contrast="-70000"/>
               <a:extLst>
                 <a:ext uri="{28A0092B-C50C-407E-A947-70E740481C1C}">
@@ -23202,6 +22872,96 @@
           </p:spPr>
         </p:pic>
       </p:grpSp>
+      <p:pic>
+        <p:nvPicPr>
+          <p:cNvPr id="78" name="Picture 2" descr="Image result for update targets icon">
+            <a:extLst>
+              <a:ext uri="{FF2B5EF4-FFF2-40B4-BE49-F238E27FC236}">
+                <a16:creationId xmlns:a16="http://schemas.microsoft.com/office/drawing/2014/main" id="{DB1A6413-7C40-42F0-8F38-9C436481A64F}"/>
+              </a:ext>
+            </a:extLst>
+          </p:cNvPr>
+          <p:cNvPicPr>
+            <a:picLocks noChangeAspect="1" noChangeArrowheads="1"/>
+          </p:cNvPicPr>
+          <p:nvPr/>
+        </p:nvPicPr>
+        <p:blipFill>
+          <a:blip r:embed="rId10">
+            <a:lum bright="70000" contrast="-70000"/>
+            <a:extLst>
+              <a:ext uri="{28A0092B-C50C-407E-A947-70E740481C1C}">
+                <a14:useLocalDpi xmlns:a14="http://schemas.microsoft.com/office/drawing/2010/main" val="0"/>
+              </a:ext>
+            </a:extLst>
+          </a:blip>
+          <a:srcRect/>
+          <a:stretch>
+            <a:fillRect/>
+          </a:stretch>
+        </p:blipFill>
+        <p:spPr bwMode="auto">
+          <a:xfrm>
+            <a:off x="212730" y="2825416"/>
+            <a:ext cx="384432" cy="384432"/>
+          </a:xfrm>
+          <a:prstGeom prst="rect">
+            <a:avLst/>
+          </a:prstGeom>
+          <a:noFill/>
+          <a:ln>
+            <a:noFill/>
+          </a:ln>
+          <a:extLst>
+            <a:ext uri="{909E8E84-426E-40DD-AFC4-6F175D3DCCD1}">
+              <a14:hiddenFill xmlns:a14="http://schemas.microsoft.com/office/drawing/2010/main">
+                <a:solidFill>
+                  <a:srgbClr val="FFFFFF"/>
+                </a:solidFill>
+              </a14:hiddenFill>
+            </a:ext>
+          </a:extLst>
+        </p:spPr>
+      </p:pic>
+      <p:sp>
+        <p:nvSpPr>
+          <p:cNvPr id="79" name="TextBox 78">
+            <a:extLst>
+              <a:ext uri="{FF2B5EF4-FFF2-40B4-BE49-F238E27FC236}">
+                <a16:creationId xmlns:a16="http://schemas.microsoft.com/office/drawing/2014/main" id="{2FCECD46-C6EC-45CA-867E-674111BD8AB2}"/>
+              </a:ext>
+            </a:extLst>
+          </p:cNvPr>
+          <p:cNvSpPr txBox="1"/>
+          <p:nvPr/>
+        </p:nvSpPr>
+        <p:spPr>
+          <a:xfrm>
+            <a:off x="688189" y="2845987"/>
+            <a:ext cx="1760563" cy="289310"/>
+          </a:xfrm>
+          <a:prstGeom prst="rect">
+            <a:avLst/>
+          </a:prstGeom>
+          <a:noFill/>
+        </p:spPr>
+        <p:txBody>
+          <a:bodyPr wrap="square" rtlCol="0">
+            <a:spAutoFit/>
+          </a:bodyPr>
+          <a:lstStyle/>
+          <a:p>
+            <a:r>
+              <a:rPr lang="en-IN" sz="1280" dirty="0">
+                <a:solidFill>
+                  <a:schemeClr val="bg1"/>
+                </a:solidFill>
+              </a:rPr>
+              <a:t>Update Target</a:t>
+            </a:r>
+          </a:p>
+        </p:txBody>
+      </p:sp>
     </p:spTree>
     <p:extLst>
       <p:ext uri="{BB962C8B-B14F-4D97-AF65-F5344CB8AC3E}">
@@ -24658,10 +24418,74 @@
       </p:grpSp>
       <p:sp>
         <p:nvSpPr>
-          <p:cNvPr id="40" name="TextBox 39">
-            <a:extLst>
-              <a:ext uri="{FF2B5EF4-FFF2-40B4-BE49-F238E27FC236}">
-                <a16:creationId xmlns:a16="http://schemas.microsoft.com/office/drawing/2014/main" id="{C903A062-126E-4126-A519-2D07FF45A1CF}"/>
+          <p:cNvPr id="42" name="Rectangle: Rounded Corners 41">
+            <a:extLst>
+              <a:ext uri="{FF2B5EF4-FFF2-40B4-BE49-F238E27FC236}">
+                <a16:creationId xmlns:a16="http://schemas.microsoft.com/office/drawing/2014/main" id="{1F724B1A-9D58-4A67-8485-D21E8C2B2F59}"/>
+              </a:ext>
+            </a:extLst>
+          </p:cNvPr>
+          <p:cNvSpPr/>
+          <p:nvPr/>
+        </p:nvSpPr>
+        <p:spPr>
+          <a:xfrm>
+            <a:off x="8761357" y="2748176"/>
+            <a:ext cx="2426903" cy="422168"/>
+          </a:xfrm>
+          <a:prstGeom prst="roundRect">
+            <a:avLst/>
+          </a:prstGeom>
+          <a:solidFill>
+            <a:schemeClr val="bg1"/>
+          </a:solidFill>
+          <a:ln>
+            <a:solidFill>
+              <a:schemeClr val="bg2">
+                <a:lumMod val="50000"/>
+              </a:schemeClr>
+            </a:solidFill>
+          </a:ln>
+        </p:spPr>
+        <p:style>
+          <a:lnRef idx="2">
+            <a:schemeClr val="accent1">
+              <a:shade val="50000"/>
+            </a:schemeClr>
+          </a:lnRef>
+          <a:fillRef idx="1">
+            <a:schemeClr val="accent1"/>
+          </a:fillRef>
+          <a:effectRef idx="0">
+            <a:schemeClr val="accent1"/>
+          </a:effectRef>
+          <a:fontRef idx="minor">
+            <a:schemeClr val="lt1"/>
+          </a:fontRef>
+        </p:style>
+        <p:txBody>
+          <a:bodyPr rtlCol="0" anchor="ctr"/>
+          <a:lstStyle/>
+          <a:p>
+            <a:r>
+              <a:rPr lang="en-IN" sz="1400" dirty="0">
+                <a:solidFill>
+                  <a:schemeClr val="bg2">
+                    <a:lumMod val="50000"/>
+                  </a:schemeClr>
+                </a:solidFill>
+              </a:rPr>
+              <a:t>Target to be Allocated</a:t>
+            </a:r>
+          </a:p>
+        </p:txBody>
+      </p:sp>
+      <p:sp>
+        <p:nvSpPr>
+          <p:cNvPr id="43" name="TextBox 42">
+            <a:extLst>
+              <a:ext uri="{FF2B5EF4-FFF2-40B4-BE49-F238E27FC236}">
+                <a16:creationId xmlns:a16="http://schemas.microsoft.com/office/drawing/2014/main" id="{F7A007D5-E006-4867-87AD-6062617703AE}"/>
               </a:ext>
             </a:extLst>
           </p:cNvPr>
@@ -24697,10 +24521,10 @@
       </p:sp>
       <p:sp>
         <p:nvSpPr>
-          <p:cNvPr id="63" name="Rectangle 62">
-            <a:extLst>
-              <a:ext uri="{FF2B5EF4-FFF2-40B4-BE49-F238E27FC236}">
-                <a16:creationId xmlns:a16="http://schemas.microsoft.com/office/drawing/2014/main" id="{C45CFA2C-E3B9-4F6A-81FB-BFA3E78973E8}"/>
+          <p:cNvPr id="44" name="Rectangle 43">
+            <a:extLst>
+              <a:ext uri="{FF2B5EF4-FFF2-40B4-BE49-F238E27FC236}">
+                <a16:creationId xmlns:a16="http://schemas.microsoft.com/office/drawing/2014/main" id="{8A4D9C27-1F01-410A-9A1D-A1AEC87C7213}"/>
               </a:ext>
             </a:extLst>
           </p:cNvPr>
@@ -24756,10 +24580,10 @@
       </p:sp>
       <p:sp>
         <p:nvSpPr>
-          <p:cNvPr id="64" name="TextBox 63">
-            <a:extLst>
-              <a:ext uri="{FF2B5EF4-FFF2-40B4-BE49-F238E27FC236}">
-                <a16:creationId xmlns:a16="http://schemas.microsoft.com/office/drawing/2014/main" id="{E231D35F-F7C5-44B9-B36B-3B9C144B3228}"/>
+          <p:cNvPr id="45" name="TextBox 44">
+            <a:extLst>
+              <a:ext uri="{FF2B5EF4-FFF2-40B4-BE49-F238E27FC236}">
+                <a16:creationId xmlns:a16="http://schemas.microsoft.com/office/drawing/2014/main" id="{643F73F0-07E3-46A4-9D79-6EE402C9DC99}"/>
               </a:ext>
             </a:extLst>
           </p:cNvPr>
@@ -24768,46 +24592,7 @@
         </p:nvSpPr>
         <p:spPr>
           <a:xfrm>
-            <a:off x="616284" y="2770942"/>
-            <a:ext cx="1760563" cy="289310"/>
-          </a:xfrm>
-          <a:prstGeom prst="rect">
-            <a:avLst/>
-          </a:prstGeom>
-          <a:noFill/>
-        </p:spPr>
-        <p:txBody>
-          <a:bodyPr wrap="square" rtlCol="0">
-            <a:spAutoFit/>
-          </a:bodyPr>
-          <a:lstStyle/>
-          <a:p>
-            <a:r>
-              <a:rPr lang="en-IN" sz="1280" dirty="0">
-                <a:solidFill>
-                  <a:schemeClr val="bg1"/>
-                </a:solidFill>
-              </a:rPr>
-              <a:t>Generate Credentials</a:t>
-            </a:r>
-          </a:p>
-        </p:txBody>
-      </p:sp>
-      <p:sp>
-        <p:nvSpPr>
-          <p:cNvPr id="65" name="TextBox 64">
-            <a:extLst>
-              <a:ext uri="{FF2B5EF4-FFF2-40B4-BE49-F238E27FC236}">
-                <a16:creationId xmlns:a16="http://schemas.microsoft.com/office/drawing/2014/main" id="{CFEB36D8-316A-4A5A-93A3-F26843E035E9}"/>
-              </a:ext>
-            </a:extLst>
-          </p:cNvPr>
-          <p:cNvSpPr txBox="1"/>
-          <p:nvPr/>
-        </p:nvSpPr>
-        <p:spPr>
-          <a:xfrm>
-            <a:off x="613203" y="2282087"/>
+            <a:off x="613203" y="1853105"/>
             <a:ext cx="1619697" cy="289310"/>
           </a:xfrm>
           <a:prstGeom prst="rect">
@@ -24839,10 +24624,10 @@
       </p:sp>
       <p:pic>
         <p:nvPicPr>
-          <p:cNvPr id="66" name="Picture 65">
-            <a:extLst>
-              <a:ext uri="{FF2B5EF4-FFF2-40B4-BE49-F238E27FC236}">
-                <a16:creationId xmlns:a16="http://schemas.microsoft.com/office/drawing/2014/main" id="{E8C70AA3-0297-499F-A731-DDD2E08CC39E}"/>
+          <p:cNvPr id="46" name="Picture 45">
+            <a:extLst>
+              <a:ext uri="{FF2B5EF4-FFF2-40B4-BE49-F238E27FC236}">
+                <a16:creationId xmlns:a16="http://schemas.microsoft.com/office/drawing/2014/main" id="{33E007D6-5897-45B7-94C0-960A067A47AD}"/>
               </a:ext>
             </a:extLst>
           </p:cNvPr>
@@ -24866,7 +24651,7 @@
         </p:blipFill>
         <p:spPr>
           <a:xfrm>
-            <a:off x="215012" y="2230196"/>
+            <a:off x="215012" y="1801214"/>
             <a:ext cx="341588" cy="341588"/>
           </a:xfrm>
           <a:prstGeom prst="rect">
@@ -24876,10 +24661,10 @@
       </p:pic>
       <p:grpSp>
         <p:nvGrpSpPr>
-          <p:cNvPr id="68" name="Group 67">
-            <a:extLst>
-              <a:ext uri="{FF2B5EF4-FFF2-40B4-BE49-F238E27FC236}">
-                <a16:creationId xmlns:a16="http://schemas.microsoft.com/office/drawing/2014/main" id="{46FEBF72-63F0-487E-8457-46D15C563EC1}"/>
+          <p:cNvPr id="47" name="Group 46">
+            <a:extLst>
+              <a:ext uri="{FF2B5EF4-FFF2-40B4-BE49-F238E27FC236}">
+                <a16:creationId xmlns:a16="http://schemas.microsoft.com/office/drawing/2014/main" id="{59BA4E56-D188-4D5C-9B15-8207BE3C3EDE}"/>
               </a:ext>
             </a:extLst>
           </p:cNvPr>
@@ -24896,10 +24681,10 @@
         </p:grpSpPr>
         <p:sp>
           <p:nvSpPr>
-            <p:cNvPr id="69" name="TextBox 68">
+            <p:cNvPr id="48" name="TextBox 47">
               <a:extLst>
                 <a:ext uri="{FF2B5EF4-FFF2-40B4-BE49-F238E27FC236}">
-                  <a16:creationId xmlns:a16="http://schemas.microsoft.com/office/drawing/2014/main" id="{09AC6179-F12B-4178-9859-A13686F0593C}"/>
+                  <a16:creationId xmlns:a16="http://schemas.microsoft.com/office/drawing/2014/main" id="{4B0BA3C2-B4B5-4C2B-85E6-62C865C3B777}"/>
                 </a:ext>
               </a:extLst>
             </p:cNvPr>
@@ -24940,10 +24725,10 @@
         </p:sp>
         <p:pic>
           <p:nvPicPr>
-            <p:cNvPr id="70" name="Picture 69">
+            <p:cNvPr id="49" name="Picture 48">
               <a:extLst>
                 <a:ext uri="{FF2B5EF4-FFF2-40B4-BE49-F238E27FC236}">
-                  <a16:creationId xmlns:a16="http://schemas.microsoft.com/office/drawing/2014/main" id="{250B7EAB-382D-4CB8-9EE2-B491EF80538D}"/>
+                  <a16:creationId xmlns:a16="http://schemas.microsoft.com/office/drawing/2014/main" id="{3920EF57-61AD-450F-8659-612245B67CCE}"/>
                 </a:ext>
               </a:extLst>
             </p:cNvPr>
@@ -24975,123 +24760,12 @@
           </p:spPr>
         </p:pic>
       </p:grpSp>
-      <p:sp>
-        <p:nvSpPr>
-          <p:cNvPr id="71" name="TextBox 70">
-            <a:extLst>
-              <a:ext uri="{FF2B5EF4-FFF2-40B4-BE49-F238E27FC236}">
-                <a16:creationId xmlns:a16="http://schemas.microsoft.com/office/drawing/2014/main" id="{2191C1D1-1479-400F-8D27-607820188B51}"/>
-              </a:ext>
-            </a:extLst>
-          </p:cNvPr>
-          <p:cNvSpPr txBox="1"/>
-          <p:nvPr/>
-        </p:nvSpPr>
-        <p:spPr>
-          <a:xfrm>
-            <a:off x="654322" y="1788809"/>
-            <a:ext cx="1760563" cy="289310"/>
-          </a:xfrm>
-          <a:prstGeom prst="rect">
-            <a:avLst/>
-          </a:prstGeom>
-          <a:noFill/>
-        </p:spPr>
-        <p:txBody>
-          <a:bodyPr wrap="square" rtlCol="0">
-            <a:spAutoFit/>
-          </a:bodyPr>
-          <a:lstStyle/>
-          <a:p>
-            <a:r>
-              <a:rPr lang="en-IN" sz="1280" dirty="0">
-                <a:solidFill>
-                  <a:schemeClr val="bg1"/>
-                </a:solidFill>
-              </a:rPr>
-              <a:t>FAQ</a:t>
-            </a:r>
-          </a:p>
-        </p:txBody>
-      </p:sp>
-      <p:pic>
-        <p:nvPicPr>
-          <p:cNvPr id="72" name="Picture 71">
-            <a:extLst>
-              <a:ext uri="{FF2B5EF4-FFF2-40B4-BE49-F238E27FC236}">
-                <a16:creationId xmlns:a16="http://schemas.microsoft.com/office/drawing/2014/main" id="{1A7609FC-03A4-494E-8590-B9B1FEF62EA8}"/>
-              </a:ext>
-            </a:extLst>
-          </p:cNvPr>
-          <p:cNvPicPr>
-            <a:picLocks noChangeAspect="1"/>
-          </p:cNvPicPr>
-          <p:nvPr/>
-        </p:nvPicPr>
-        <p:blipFill>
-          <a:blip r:embed="rId10" cstate="hqprint">
-            <a:extLst>
-              <a:ext uri="{28A0092B-C50C-407E-A947-70E740481C1C}">
-                <a14:useLocalDpi xmlns:a14="http://schemas.microsoft.com/office/drawing/2010/main" val="0"/>
-              </a:ext>
-            </a:extLst>
-          </a:blip>
-          <a:stretch>
-            <a:fillRect/>
-          </a:stretch>
-        </p:blipFill>
-        <p:spPr>
-          <a:xfrm>
-            <a:off x="243593" y="1771934"/>
-            <a:ext cx="253647" cy="253647"/>
-          </a:xfrm>
-          <a:prstGeom prst="rect">
-            <a:avLst/>
-          </a:prstGeom>
-        </p:spPr>
-      </p:pic>
-      <p:pic>
-        <p:nvPicPr>
-          <p:cNvPr id="73" name="Picture 72">
-            <a:extLst>
-              <a:ext uri="{FF2B5EF4-FFF2-40B4-BE49-F238E27FC236}">
-                <a16:creationId xmlns:a16="http://schemas.microsoft.com/office/drawing/2014/main" id="{C35AB38E-8CED-47FE-BB2F-83FA10ADAC30}"/>
-              </a:ext>
-            </a:extLst>
-          </p:cNvPr>
-          <p:cNvPicPr>
-            <a:picLocks noChangeAspect="1"/>
-          </p:cNvPicPr>
-          <p:nvPr/>
-        </p:nvPicPr>
-        <p:blipFill rotWithShape="1">
-          <a:blip r:embed="rId11" cstate="hqprint">
-            <a:lum bright="70000" contrast="-70000"/>
-            <a:extLst>
-              <a:ext uri="{28A0092B-C50C-407E-A947-70E740481C1C}">
-                <a14:useLocalDpi xmlns:a14="http://schemas.microsoft.com/office/drawing/2010/main" val="0"/>
-              </a:ext>
-            </a:extLst>
-          </a:blip>
-          <a:srcRect t="8187" b="11673"/>
-          <a:stretch/>
-        </p:blipFill>
-        <p:spPr>
-          <a:xfrm>
-            <a:off x="204060" y="2770942"/>
-            <a:ext cx="361012" cy="289310"/>
-          </a:xfrm>
-          <a:prstGeom prst="rect">
-            <a:avLst/>
-          </a:prstGeom>
-        </p:spPr>
-      </p:pic>
       <p:grpSp>
         <p:nvGrpSpPr>
-          <p:cNvPr id="74" name="Group 73">
-            <a:extLst>
-              <a:ext uri="{FF2B5EF4-FFF2-40B4-BE49-F238E27FC236}">
-                <a16:creationId xmlns:a16="http://schemas.microsoft.com/office/drawing/2014/main" id="{42E92ABD-F303-4B5D-88F3-BA2C0C8777A0}"/>
+          <p:cNvPr id="67" name="Group 66">
+            <a:extLst>
+              <a:ext uri="{FF2B5EF4-FFF2-40B4-BE49-F238E27FC236}">
+                <a16:creationId xmlns:a16="http://schemas.microsoft.com/office/drawing/2014/main" id="{317F55E8-29F4-45A2-AE2E-1E6CB78553BA}"/>
               </a:ext>
             </a:extLst>
           </p:cNvPr>
@@ -25100,7 +24774,7 @@
         </p:nvGrpSpPr>
         <p:grpSpPr>
           <a:xfrm>
-            <a:off x="202282" y="2770942"/>
+            <a:off x="202282" y="2341960"/>
             <a:ext cx="2172787" cy="289310"/>
             <a:chOff x="202282" y="2770942"/>
             <a:chExt cx="2172787" cy="289310"/>
@@ -25108,10 +24782,10 @@
         </p:grpSpPr>
         <p:sp>
           <p:nvSpPr>
-            <p:cNvPr id="75" name="TextBox 74">
+            <p:cNvPr id="77" name="TextBox 76">
               <a:extLst>
                 <a:ext uri="{FF2B5EF4-FFF2-40B4-BE49-F238E27FC236}">
-                  <a16:creationId xmlns:a16="http://schemas.microsoft.com/office/drawing/2014/main" id="{65DE5C29-8FE2-4315-82D6-47FE5363908E}"/>
+                  <a16:creationId xmlns:a16="http://schemas.microsoft.com/office/drawing/2014/main" id="{D9548301-1D87-4E10-A2CD-A50F49AD9323}"/>
                 </a:ext>
               </a:extLst>
             </p:cNvPr>
@@ -25147,10 +24821,10 @@
         </p:sp>
         <p:pic>
           <p:nvPicPr>
-            <p:cNvPr id="76" name="Picture 75">
+            <p:cNvPr id="78" name="Picture 77">
               <a:extLst>
                 <a:ext uri="{FF2B5EF4-FFF2-40B4-BE49-F238E27FC236}">
-                  <a16:creationId xmlns:a16="http://schemas.microsoft.com/office/drawing/2014/main" id="{82C1BB5E-BA28-430C-B7C0-EF33A56FD60B}"/>
+                  <a16:creationId xmlns:a16="http://schemas.microsoft.com/office/drawing/2014/main" id="{5F2F7DA0-28C4-4077-8A0F-C10FC53FB3CC}"/>
                 </a:ext>
               </a:extLst>
             </p:cNvPr>
@@ -25160,7 +24834,7 @@
             <p:nvPr/>
           </p:nvPicPr>
           <p:blipFill rotWithShape="1">
-            <a:blip r:embed="rId11" cstate="hqprint">
+            <a:blip r:embed="rId10" cstate="hqprint">
               <a:lum bright="70000" contrast="-70000"/>
               <a:extLst>
                 <a:ext uri="{28A0092B-C50C-407E-A947-70E740481C1C}">
@@ -25182,66 +24856,92 @@
           </p:spPr>
         </p:pic>
       </p:grpSp>
+      <p:pic>
+        <p:nvPicPr>
+          <p:cNvPr id="79" name="Picture 2" descr="Image result for update targets icon">
+            <a:extLst>
+              <a:ext uri="{FF2B5EF4-FFF2-40B4-BE49-F238E27FC236}">
+                <a16:creationId xmlns:a16="http://schemas.microsoft.com/office/drawing/2014/main" id="{DE50EE27-ACC6-4220-B5D2-66D364CD1221}"/>
+              </a:ext>
+            </a:extLst>
+          </p:cNvPr>
+          <p:cNvPicPr>
+            <a:picLocks noChangeAspect="1" noChangeArrowheads="1"/>
+          </p:cNvPicPr>
+          <p:nvPr/>
+        </p:nvPicPr>
+        <p:blipFill>
+          <a:blip r:embed="rId11">
+            <a:lum bright="70000" contrast="-70000"/>
+            <a:extLst>
+              <a:ext uri="{28A0092B-C50C-407E-A947-70E740481C1C}">
+                <a14:useLocalDpi xmlns:a14="http://schemas.microsoft.com/office/drawing/2010/main" val="0"/>
+              </a:ext>
+            </a:extLst>
+          </a:blip>
+          <a:srcRect/>
+          <a:stretch>
+            <a:fillRect/>
+          </a:stretch>
+        </p:blipFill>
+        <p:spPr bwMode="auto">
+          <a:xfrm>
+            <a:off x="212730" y="2825416"/>
+            <a:ext cx="384432" cy="384432"/>
+          </a:xfrm>
+          <a:prstGeom prst="rect">
+            <a:avLst/>
+          </a:prstGeom>
+          <a:noFill/>
+          <a:ln>
+            <a:noFill/>
+          </a:ln>
+          <a:extLst>
+            <a:ext uri="{909E8E84-426E-40DD-AFC4-6F175D3DCCD1}">
+              <a14:hiddenFill xmlns:a14="http://schemas.microsoft.com/office/drawing/2010/main">
+                <a:solidFill>
+                  <a:srgbClr val="FFFFFF"/>
+                </a:solidFill>
+              </a14:hiddenFill>
+            </a:ext>
+          </a:extLst>
+        </p:spPr>
+      </p:pic>
       <p:sp>
         <p:nvSpPr>
-          <p:cNvPr id="42" name="Rectangle: Rounded Corners 41">
-            <a:extLst>
-              <a:ext uri="{FF2B5EF4-FFF2-40B4-BE49-F238E27FC236}">
-                <a16:creationId xmlns:a16="http://schemas.microsoft.com/office/drawing/2014/main" id="{1F724B1A-9D58-4A67-8485-D21E8C2B2F59}"/>
-              </a:ext>
-            </a:extLst>
-          </p:cNvPr>
-          <p:cNvSpPr/>
+          <p:cNvPr id="80" name="TextBox 79">
+            <a:extLst>
+              <a:ext uri="{FF2B5EF4-FFF2-40B4-BE49-F238E27FC236}">
+                <a16:creationId xmlns:a16="http://schemas.microsoft.com/office/drawing/2014/main" id="{B24F843D-FEC9-4FDC-B5ED-078476742DC4}"/>
+              </a:ext>
+            </a:extLst>
+          </p:cNvPr>
+          <p:cNvSpPr txBox="1"/>
           <p:nvPr/>
         </p:nvSpPr>
         <p:spPr>
           <a:xfrm>
-            <a:off x="8761357" y="2748176"/>
-            <a:ext cx="2426903" cy="422168"/>
-          </a:xfrm>
-          <a:prstGeom prst="roundRect">
-            <a:avLst/>
-          </a:prstGeom>
-          <a:solidFill>
-            <a:schemeClr val="bg1"/>
-          </a:solidFill>
-          <a:ln>
-            <a:solidFill>
-              <a:schemeClr val="bg2">
-                <a:lumMod val="50000"/>
-              </a:schemeClr>
-            </a:solidFill>
-          </a:ln>
-        </p:spPr>
-        <p:style>
-          <a:lnRef idx="2">
-            <a:schemeClr val="accent1">
-              <a:shade val="50000"/>
-            </a:schemeClr>
-          </a:lnRef>
-          <a:fillRef idx="1">
-            <a:schemeClr val="accent1"/>
-          </a:fillRef>
-          <a:effectRef idx="0">
-            <a:schemeClr val="accent1"/>
-          </a:effectRef>
-          <a:fontRef idx="minor">
-            <a:schemeClr val="lt1"/>
-          </a:fontRef>
-        </p:style>
+            <a:off x="688189" y="2845987"/>
+            <a:ext cx="1760563" cy="289310"/>
+          </a:xfrm>
+          <a:prstGeom prst="rect">
+            <a:avLst/>
+          </a:prstGeom>
+          <a:noFill/>
+        </p:spPr>
         <p:txBody>
-          <a:bodyPr rtlCol="0" anchor="ctr"/>
+          <a:bodyPr wrap="square" rtlCol="0">
+            <a:spAutoFit/>
+          </a:bodyPr>
           <a:lstStyle/>
           <a:p>
             <a:r>
-              <a:rPr lang="en-IN" sz="1400" dirty="0">
+              <a:rPr lang="en-IN" sz="1280" dirty="0">
                 <a:solidFill>
-                  <a:schemeClr val="bg2">
-                    <a:lumMod val="50000"/>
-                  </a:schemeClr>
+                  <a:schemeClr val="bg1"/>
                 </a:solidFill>
               </a:rPr>
-              <a:t>Target to be Allocated</a:t>
+              <a:t>Update Target</a:t>
             </a:r>
           </a:p>
         </p:txBody>
@@ -25750,7 +25450,7 @@
           <a:p>
             <a:r>
               <a:rPr lang="en-IN" sz="1097" dirty="0"/>
-              <a:t>&lt;SCGJ Admin&gt;</a:t>
+              <a:t>kamal@sscgj.in</a:t>
             </a:r>
           </a:p>
         </p:txBody>

</xml_diff>

<commit_message>
Author         : Priyanka Chaudhary Description    : Changed Designs of Generate Batch Report Files updated  : Updated Designs.pptx
</commit_message>
<xml_diff>
--- a/Requirements/Product Backlog/Screen Designs/Screen Design Deck/Updated Designs.pptx
+++ b/Requirements/Product Backlog/Screen Designs/Screen Design Deck/Updated Designs.pptx
@@ -6590,10 +6590,9 @@
           <a:p>
             <a:pPr algn="ctr"/>
             <a:r>
-              <a:rPr lang="en-IN" sz="1400"/>
+              <a:rPr lang="en-IN" sz="1400" dirty="0"/>
               <a:t>Generate Batch Id</a:t>
             </a:r>
-            <a:endParaRPr lang="en-IN" sz="1400" dirty="0"/>
           </a:p>
         </p:txBody>
       </p:sp>
@@ -10511,7 +10510,7 @@
         <p:spPr>
           <a:xfrm>
             <a:off x="2641733" y="1051006"/>
-            <a:ext cx="9833410" cy="5825124"/>
+            <a:ext cx="9833410" cy="5947706"/>
           </a:xfrm>
           <a:prstGeom prst="rect">
             <a:avLst/>
@@ -10606,7 +10605,7 @@
         <p:spPr>
           <a:xfrm>
             <a:off x="2890700" y="1950964"/>
-            <a:ext cx="9270711" cy="4034883"/>
+            <a:ext cx="9270711" cy="4955511"/>
           </a:xfrm>
           <a:prstGeom prst="rect">
             <a:avLst/>
@@ -10657,8 +10656,8 @@
         </p:nvSpPr>
         <p:spPr>
           <a:xfrm>
-            <a:off x="6749071" y="5378235"/>
-            <a:ext cx="1794565" cy="416781"/>
+            <a:off x="5103611" y="6515249"/>
+            <a:ext cx="1794565" cy="222443"/>
           </a:xfrm>
           <a:prstGeom prst="roundRect">
             <a:avLst/>
@@ -10755,44 +10754,6 @@
                 </a:solidFill>
               </a:rPr>
               <a:t> Batch ID</a:t>
-            </a:r>
-          </a:p>
-        </p:txBody>
-      </p:sp>
-      <p:sp>
-        <p:nvSpPr>
-          <p:cNvPr id="6" name="Rectangle 5">
-            <a:extLst>
-              <a:ext uri="{FF2B5EF4-FFF2-40B4-BE49-F238E27FC236}">
-                <a16:creationId xmlns:a16="http://schemas.microsoft.com/office/drawing/2014/main" id="{413E255E-C2A1-41ED-9591-20A028D53B8A}"/>
-              </a:ext>
-            </a:extLst>
-          </p:cNvPr>
-          <p:cNvSpPr/>
-          <p:nvPr/>
-        </p:nvSpPr>
-        <p:spPr>
-          <a:xfrm>
-            <a:off x="11145933" y="1081351"/>
-            <a:ext cx="1329210" cy="276999"/>
-          </a:xfrm>
-          <a:prstGeom prst="rect">
-            <a:avLst/>
-          </a:prstGeom>
-        </p:spPr>
-        <p:txBody>
-          <a:bodyPr wrap="none">
-            <a:spAutoFit/>
-          </a:bodyPr>
-          <a:lstStyle/>
-          <a:p>
-            <a:r>
-              <a:rPr lang="en-IN" sz="1200" u="sng" dirty="0">
-                <a:solidFill>
-                  <a:srgbClr val="4472C4"/>
-                </a:solidFill>
-              </a:rPr>
-              <a:t>Upload Guidelines</a:t>
             </a:r>
           </a:p>
         </p:txBody>
@@ -11582,12 +11543,48 @@
           </a:prstGeom>
         </p:spPr>
       </p:pic>
+      <p:pic>
+        <p:nvPicPr>
+          <p:cNvPr id="5" name="Picture 4">
+            <a:extLst>
+              <a:ext uri="{FF2B5EF4-FFF2-40B4-BE49-F238E27FC236}">
+                <a16:creationId xmlns:a16="http://schemas.microsoft.com/office/drawing/2014/main" id="{CC6E02CD-7BBB-4163-88DD-2F7AAE49E171}"/>
+              </a:ext>
+            </a:extLst>
+          </p:cNvPr>
+          <p:cNvPicPr>
+            <a:picLocks noChangeAspect="1"/>
+          </p:cNvPicPr>
+          <p:nvPr/>
+        </p:nvPicPr>
+        <p:blipFill>
+          <a:blip r:embed="rId9">
+            <a:extLst>
+              <a:ext uri="{28A0092B-C50C-407E-A947-70E740481C1C}">
+                <a14:useLocalDpi xmlns:a14="http://schemas.microsoft.com/office/drawing/2010/main" val="0"/>
+              </a:ext>
+            </a:extLst>
+          </a:blip>
+          <a:stretch>
+            <a:fillRect/>
+          </a:stretch>
+        </p:blipFill>
+        <p:spPr>
+          <a:xfrm>
+            <a:off x="215248" y="2476285"/>
+            <a:ext cx="325148" cy="325148"/>
+          </a:xfrm>
+          <a:prstGeom prst="rect">
+            <a:avLst/>
+          </a:prstGeom>
+        </p:spPr>
+      </p:pic>
       <p:sp>
         <p:nvSpPr>
-          <p:cNvPr id="58" name="Rectangle: Rounded Corners 57">
-            <a:extLst>
-              <a:ext uri="{FF2B5EF4-FFF2-40B4-BE49-F238E27FC236}">
-                <a16:creationId xmlns:a16="http://schemas.microsoft.com/office/drawing/2014/main" id="{41E35AD9-CB0B-46AB-B49D-C289B57C90A1}"/>
+          <p:cNvPr id="48" name="Rectangle: Rounded Corners 47">
+            <a:extLst>
+              <a:ext uri="{FF2B5EF4-FFF2-40B4-BE49-F238E27FC236}">
+                <a16:creationId xmlns:a16="http://schemas.microsoft.com/office/drawing/2014/main" id="{940EC5C2-0578-44BA-AFDF-8C7503FB5E88}"/>
               </a:ext>
             </a:extLst>
           </p:cNvPr>
@@ -11596,14 +11593,16 @@
         </p:nvSpPr>
         <p:spPr>
           <a:xfrm>
-            <a:off x="3072955" y="2087250"/>
-            <a:ext cx="2283709" cy="339154"/>
+            <a:off x="8008565" y="1402064"/>
+            <a:ext cx="1960936" cy="422168"/>
           </a:xfrm>
           <a:prstGeom prst="roundRect">
             <a:avLst/>
           </a:prstGeom>
           <a:solidFill>
-            <a:schemeClr val="bg1"/>
+            <a:schemeClr val="bg1">
+              <a:lumMod val="85000"/>
+            </a:schemeClr>
           </a:solidFill>
           <a:ln>
             <a:solidFill>
@@ -11641,548 +11640,17 @@
                   </a:schemeClr>
                 </a:solidFill>
               </a:rPr>
-              <a:t>Enter Images of day 1</a:t>
-            </a:r>
-          </a:p>
-        </p:txBody>
-      </p:sp>
-      <p:sp>
-        <p:nvSpPr>
-          <p:cNvPr id="67" name="Rectangle: Rounded Corners 66">
-            <a:extLst>
-              <a:ext uri="{FF2B5EF4-FFF2-40B4-BE49-F238E27FC236}">
-                <a16:creationId xmlns:a16="http://schemas.microsoft.com/office/drawing/2014/main" id="{F77981F8-5680-44A0-B171-C830B005E2B1}"/>
-              </a:ext>
-            </a:extLst>
-          </p:cNvPr>
-          <p:cNvSpPr/>
-          <p:nvPr/>
-        </p:nvSpPr>
-        <p:spPr>
-          <a:xfrm>
-            <a:off x="5617720" y="2125823"/>
-            <a:ext cx="973247" cy="307450"/>
-          </a:xfrm>
-          <a:prstGeom prst="roundRect">
-            <a:avLst/>
-          </a:prstGeom>
-          <a:solidFill>
-            <a:srgbClr val="00B0F0"/>
-          </a:solidFill>
-          <a:ln>
-            <a:noFill/>
-          </a:ln>
-        </p:spPr>
-        <p:style>
-          <a:lnRef idx="2">
-            <a:schemeClr val="accent1">
-              <a:shade val="50000"/>
-            </a:schemeClr>
-          </a:lnRef>
-          <a:fillRef idx="1">
-            <a:schemeClr val="accent1"/>
-          </a:fillRef>
-          <a:effectRef idx="0">
-            <a:schemeClr val="accent1"/>
-          </a:effectRef>
-          <a:fontRef idx="minor">
-            <a:schemeClr val="lt1"/>
-          </a:fontRef>
-        </p:style>
-        <p:txBody>
-          <a:bodyPr rtlCol="0" anchor="ctr"/>
-          <a:lstStyle/>
-          <a:p>
-            <a:pPr algn="ctr"/>
-            <a:r>
-              <a:rPr lang="en-IN" sz="1646" dirty="0"/>
-              <a:t>Browse</a:t>
-            </a:r>
-          </a:p>
-        </p:txBody>
-      </p:sp>
-      <p:sp>
-        <p:nvSpPr>
-          <p:cNvPr id="80" name="Rectangle: Rounded Corners 79">
-            <a:extLst>
-              <a:ext uri="{FF2B5EF4-FFF2-40B4-BE49-F238E27FC236}">
-                <a16:creationId xmlns:a16="http://schemas.microsoft.com/office/drawing/2014/main" id="{9DC8391F-50E5-4784-AB3B-067CB4EBDEE8}"/>
-              </a:ext>
-            </a:extLst>
-          </p:cNvPr>
-          <p:cNvSpPr/>
-          <p:nvPr/>
-        </p:nvSpPr>
-        <p:spPr>
-          <a:xfrm>
-            <a:off x="3072955" y="2542196"/>
-            <a:ext cx="2283709" cy="339154"/>
-          </a:xfrm>
-          <a:prstGeom prst="roundRect">
-            <a:avLst/>
-          </a:prstGeom>
-          <a:solidFill>
-            <a:schemeClr val="bg1"/>
-          </a:solidFill>
-          <a:ln>
-            <a:solidFill>
-              <a:schemeClr val="bg2">
-                <a:lumMod val="50000"/>
-              </a:schemeClr>
-            </a:solidFill>
-          </a:ln>
-        </p:spPr>
-        <p:style>
-          <a:lnRef idx="2">
-            <a:schemeClr val="accent1">
-              <a:shade val="50000"/>
-            </a:schemeClr>
-          </a:lnRef>
-          <a:fillRef idx="1">
-            <a:schemeClr val="accent1"/>
-          </a:fillRef>
-          <a:effectRef idx="0">
-            <a:schemeClr val="accent1"/>
-          </a:effectRef>
-          <a:fontRef idx="minor">
-            <a:schemeClr val="lt1"/>
-          </a:fontRef>
-        </p:style>
-        <p:txBody>
-          <a:bodyPr rtlCol="0" anchor="ctr"/>
-          <a:lstStyle/>
-          <a:p>
-            <a:r>
-              <a:rPr lang="en-IN" sz="1646" dirty="0">
-                <a:solidFill>
-                  <a:schemeClr val="bg2">
-                    <a:lumMod val="50000"/>
-                  </a:schemeClr>
-                </a:solidFill>
-              </a:rPr>
-              <a:t>Enter Images of day 2</a:t>
-            </a:r>
-          </a:p>
-        </p:txBody>
-      </p:sp>
-      <p:sp>
-        <p:nvSpPr>
-          <p:cNvPr id="81" name="Rectangle: Rounded Corners 80">
-            <a:extLst>
-              <a:ext uri="{FF2B5EF4-FFF2-40B4-BE49-F238E27FC236}">
-                <a16:creationId xmlns:a16="http://schemas.microsoft.com/office/drawing/2014/main" id="{7334E05E-7DA2-4A69-A407-00CE435E8541}"/>
-              </a:ext>
-            </a:extLst>
-          </p:cNvPr>
-          <p:cNvSpPr/>
-          <p:nvPr/>
-        </p:nvSpPr>
-        <p:spPr>
-          <a:xfrm>
-            <a:off x="3072955" y="3013399"/>
-            <a:ext cx="2283709" cy="339154"/>
-          </a:xfrm>
-          <a:prstGeom prst="roundRect">
-            <a:avLst/>
-          </a:prstGeom>
-          <a:solidFill>
-            <a:schemeClr val="bg1"/>
-          </a:solidFill>
-          <a:ln>
-            <a:solidFill>
-              <a:schemeClr val="bg2">
-                <a:lumMod val="50000"/>
-              </a:schemeClr>
-            </a:solidFill>
-          </a:ln>
-        </p:spPr>
-        <p:style>
-          <a:lnRef idx="2">
-            <a:schemeClr val="accent1">
-              <a:shade val="50000"/>
-            </a:schemeClr>
-          </a:lnRef>
-          <a:fillRef idx="1">
-            <a:schemeClr val="accent1"/>
-          </a:fillRef>
-          <a:effectRef idx="0">
-            <a:schemeClr val="accent1"/>
-          </a:effectRef>
-          <a:fontRef idx="minor">
-            <a:schemeClr val="lt1"/>
-          </a:fontRef>
-        </p:style>
-        <p:txBody>
-          <a:bodyPr rtlCol="0" anchor="ctr"/>
-          <a:lstStyle/>
-          <a:p>
-            <a:r>
-              <a:rPr lang="en-IN" sz="1646" dirty="0">
-                <a:solidFill>
-                  <a:schemeClr val="bg2">
-                    <a:lumMod val="50000"/>
-                  </a:schemeClr>
-                </a:solidFill>
-              </a:rPr>
-              <a:t>Enter Images of day 3</a:t>
-            </a:r>
-          </a:p>
-        </p:txBody>
-      </p:sp>
-      <p:sp>
-        <p:nvSpPr>
-          <p:cNvPr id="82" name="Rectangle: Rounded Corners 81">
-            <a:extLst>
-              <a:ext uri="{FF2B5EF4-FFF2-40B4-BE49-F238E27FC236}">
-                <a16:creationId xmlns:a16="http://schemas.microsoft.com/office/drawing/2014/main" id="{2793318A-D168-404F-86A5-135DCAC71BCC}"/>
-              </a:ext>
-            </a:extLst>
-          </p:cNvPr>
-          <p:cNvSpPr/>
-          <p:nvPr/>
-        </p:nvSpPr>
-        <p:spPr>
-          <a:xfrm>
-            <a:off x="3072952" y="3510692"/>
-            <a:ext cx="2283709" cy="339155"/>
-          </a:xfrm>
-          <a:prstGeom prst="roundRect">
-            <a:avLst/>
-          </a:prstGeom>
-          <a:solidFill>
-            <a:schemeClr val="bg1"/>
-          </a:solidFill>
-          <a:ln>
-            <a:solidFill>
-              <a:schemeClr val="bg2">
-                <a:lumMod val="50000"/>
-              </a:schemeClr>
-            </a:solidFill>
-          </a:ln>
-        </p:spPr>
-        <p:style>
-          <a:lnRef idx="2">
-            <a:schemeClr val="accent1">
-              <a:shade val="50000"/>
-            </a:schemeClr>
-          </a:lnRef>
-          <a:fillRef idx="1">
-            <a:schemeClr val="accent1"/>
-          </a:fillRef>
-          <a:effectRef idx="0">
-            <a:schemeClr val="accent1"/>
-          </a:effectRef>
-          <a:fontRef idx="minor">
-            <a:schemeClr val="lt1"/>
-          </a:fontRef>
-        </p:style>
-        <p:txBody>
-          <a:bodyPr rtlCol="0" anchor="ctr"/>
-          <a:lstStyle/>
-          <a:p>
-            <a:r>
-              <a:rPr lang="en-IN" sz="1646" dirty="0">
-                <a:solidFill>
-                  <a:schemeClr val="bg2">
-                    <a:lumMod val="50000"/>
-                  </a:schemeClr>
-                </a:solidFill>
-              </a:rPr>
-              <a:t>Enter Images of day 4</a:t>
-            </a:r>
-          </a:p>
-        </p:txBody>
-      </p:sp>
-      <p:sp>
-        <p:nvSpPr>
-          <p:cNvPr id="83" name="Rectangle: Rounded Corners 82">
-            <a:extLst>
-              <a:ext uri="{FF2B5EF4-FFF2-40B4-BE49-F238E27FC236}">
-                <a16:creationId xmlns:a16="http://schemas.microsoft.com/office/drawing/2014/main" id="{F31FA58A-4A56-4E71-8EE2-2716D4CE1B9A}"/>
-              </a:ext>
-            </a:extLst>
-          </p:cNvPr>
-          <p:cNvSpPr/>
-          <p:nvPr/>
-        </p:nvSpPr>
-        <p:spPr>
-          <a:xfrm>
-            <a:off x="3072953" y="4025133"/>
-            <a:ext cx="2283709" cy="339156"/>
-          </a:xfrm>
-          <a:prstGeom prst="roundRect">
-            <a:avLst/>
-          </a:prstGeom>
-          <a:solidFill>
-            <a:schemeClr val="bg1"/>
-          </a:solidFill>
-          <a:ln>
-            <a:solidFill>
-              <a:schemeClr val="bg2">
-                <a:lumMod val="50000"/>
-              </a:schemeClr>
-            </a:solidFill>
-          </a:ln>
-        </p:spPr>
-        <p:style>
-          <a:lnRef idx="2">
-            <a:schemeClr val="accent1">
-              <a:shade val="50000"/>
-            </a:schemeClr>
-          </a:lnRef>
-          <a:fillRef idx="1">
-            <a:schemeClr val="accent1"/>
-          </a:fillRef>
-          <a:effectRef idx="0">
-            <a:schemeClr val="accent1"/>
-          </a:effectRef>
-          <a:fontRef idx="minor">
-            <a:schemeClr val="lt1"/>
-          </a:fontRef>
-        </p:style>
-        <p:txBody>
-          <a:bodyPr rtlCol="0" anchor="ctr"/>
-          <a:lstStyle/>
-          <a:p>
-            <a:r>
-              <a:rPr lang="en-IN" sz="1646" dirty="0">
-                <a:solidFill>
-                  <a:schemeClr val="bg2">
-                    <a:lumMod val="50000"/>
-                  </a:schemeClr>
-                </a:solidFill>
-              </a:rPr>
-              <a:t>Enter Images of day 5</a:t>
-            </a:r>
-          </a:p>
-        </p:txBody>
-      </p:sp>
-      <p:sp>
-        <p:nvSpPr>
-          <p:cNvPr id="84" name="Rectangle: Rounded Corners 83">
-            <a:extLst>
-              <a:ext uri="{FF2B5EF4-FFF2-40B4-BE49-F238E27FC236}">
-                <a16:creationId xmlns:a16="http://schemas.microsoft.com/office/drawing/2014/main" id="{42E6000F-CB55-484D-8BEE-ABC3E5FC45F0}"/>
-              </a:ext>
-            </a:extLst>
-          </p:cNvPr>
-          <p:cNvSpPr/>
-          <p:nvPr/>
-        </p:nvSpPr>
-        <p:spPr>
-          <a:xfrm>
-            <a:off x="5610462" y="2597533"/>
-            <a:ext cx="973247" cy="307450"/>
-          </a:xfrm>
-          <a:prstGeom prst="roundRect">
-            <a:avLst/>
-          </a:prstGeom>
-          <a:solidFill>
-            <a:srgbClr val="00B0F0"/>
-          </a:solidFill>
-          <a:ln>
-            <a:noFill/>
-          </a:ln>
-        </p:spPr>
-        <p:style>
-          <a:lnRef idx="2">
-            <a:schemeClr val="accent1">
-              <a:shade val="50000"/>
-            </a:schemeClr>
-          </a:lnRef>
-          <a:fillRef idx="1">
-            <a:schemeClr val="accent1"/>
-          </a:fillRef>
-          <a:effectRef idx="0">
-            <a:schemeClr val="accent1"/>
-          </a:effectRef>
-          <a:fontRef idx="minor">
-            <a:schemeClr val="lt1"/>
-          </a:fontRef>
-        </p:style>
-        <p:txBody>
-          <a:bodyPr rtlCol="0" anchor="ctr"/>
-          <a:lstStyle/>
-          <a:p>
-            <a:pPr algn="ctr"/>
-            <a:r>
-              <a:rPr lang="en-IN" sz="1646" dirty="0"/>
-              <a:t>Browse</a:t>
-            </a:r>
-          </a:p>
-        </p:txBody>
-      </p:sp>
-      <p:sp>
-        <p:nvSpPr>
-          <p:cNvPr id="85" name="Rectangle: Rounded Corners 84">
-            <a:extLst>
-              <a:ext uri="{FF2B5EF4-FFF2-40B4-BE49-F238E27FC236}">
-                <a16:creationId xmlns:a16="http://schemas.microsoft.com/office/drawing/2014/main" id="{A6024CE8-6CE1-47A7-B3EC-30502FD09CDE}"/>
-              </a:ext>
-            </a:extLst>
-          </p:cNvPr>
-          <p:cNvSpPr/>
-          <p:nvPr/>
-        </p:nvSpPr>
-        <p:spPr>
-          <a:xfrm>
-            <a:off x="5617719" y="3053184"/>
-            <a:ext cx="973247" cy="307450"/>
-          </a:xfrm>
-          <a:prstGeom prst="roundRect">
-            <a:avLst/>
-          </a:prstGeom>
-          <a:solidFill>
-            <a:srgbClr val="00B0F0"/>
-          </a:solidFill>
-          <a:ln>
-            <a:noFill/>
-          </a:ln>
-        </p:spPr>
-        <p:style>
-          <a:lnRef idx="2">
-            <a:schemeClr val="accent1">
-              <a:shade val="50000"/>
-            </a:schemeClr>
-          </a:lnRef>
-          <a:fillRef idx="1">
-            <a:schemeClr val="accent1"/>
-          </a:fillRef>
-          <a:effectRef idx="0">
-            <a:schemeClr val="accent1"/>
-          </a:effectRef>
-          <a:fontRef idx="minor">
-            <a:schemeClr val="lt1"/>
-          </a:fontRef>
-        </p:style>
-        <p:txBody>
-          <a:bodyPr rtlCol="0" anchor="ctr"/>
-          <a:lstStyle/>
-          <a:p>
-            <a:pPr algn="ctr"/>
-            <a:r>
-              <a:rPr lang="en-IN" sz="1646" dirty="0"/>
-              <a:t>Browse</a:t>
-            </a:r>
-          </a:p>
-        </p:txBody>
-      </p:sp>
-      <p:sp>
-        <p:nvSpPr>
-          <p:cNvPr id="86" name="Rectangle: Rounded Corners 85">
-            <a:extLst>
-              <a:ext uri="{FF2B5EF4-FFF2-40B4-BE49-F238E27FC236}">
-                <a16:creationId xmlns:a16="http://schemas.microsoft.com/office/drawing/2014/main" id="{2AAB141F-3359-46E5-B4F9-4120B7144186}"/>
-              </a:ext>
-            </a:extLst>
-          </p:cNvPr>
-          <p:cNvSpPr/>
-          <p:nvPr/>
-        </p:nvSpPr>
-        <p:spPr>
-          <a:xfrm>
-            <a:off x="5610462" y="3508835"/>
-            <a:ext cx="973247" cy="307450"/>
-          </a:xfrm>
-          <a:prstGeom prst="roundRect">
-            <a:avLst/>
-          </a:prstGeom>
-          <a:solidFill>
-            <a:srgbClr val="00B0F0"/>
-          </a:solidFill>
-          <a:ln>
-            <a:noFill/>
-          </a:ln>
-        </p:spPr>
-        <p:style>
-          <a:lnRef idx="2">
-            <a:schemeClr val="accent1">
-              <a:shade val="50000"/>
-            </a:schemeClr>
-          </a:lnRef>
-          <a:fillRef idx="1">
-            <a:schemeClr val="accent1"/>
-          </a:fillRef>
-          <a:effectRef idx="0">
-            <a:schemeClr val="accent1"/>
-          </a:effectRef>
-          <a:fontRef idx="minor">
-            <a:schemeClr val="lt1"/>
-          </a:fontRef>
-        </p:style>
-        <p:txBody>
-          <a:bodyPr rtlCol="0" anchor="ctr"/>
-          <a:lstStyle/>
-          <a:p>
-            <a:pPr algn="ctr"/>
-            <a:r>
-              <a:rPr lang="en-IN" sz="1646" dirty="0"/>
-              <a:t>Browse</a:t>
-            </a:r>
-          </a:p>
-        </p:txBody>
-      </p:sp>
-      <p:sp>
-        <p:nvSpPr>
-          <p:cNvPr id="87" name="Rectangle: Rounded Corners 86">
-            <a:extLst>
-              <a:ext uri="{FF2B5EF4-FFF2-40B4-BE49-F238E27FC236}">
-                <a16:creationId xmlns:a16="http://schemas.microsoft.com/office/drawing/2014/main" id="{CD4103CC-ED65-4A4A-A04D-2E61DCF8885B}"/>
-              </a:ext>
-            </a:extLst>
-          </p:cNvPr>
-          <p:cNvSpPr/>
-          <p:nvPr/>
-        </p:nvSpPr>
-        <p:spPr>
-          <a:xfrm>
-            <a:off x="5605629" y="4004226"/>
-            <a:ext cx="973247" cy="307450"/>
-          </a:xfrm>
-          <a:prstGeom prst="roundRect">
-            <a:avLst/>
-          </a:prstGeom>
-          <a:solidFill>
-            <a:srgbClr val="00B0F0"/>
-          </a:solidFill>
-          <a:ln>
-            <a:noFill/>
-          </a:ln>
-        </p:spPr>
-        <p:style>
-          <a:lnRef idx="2">
-            <a:schemeClr val="accent1">
-              <a:shade val="50000"/>
-            </a:schemeClr>
-          </a:lnRef>
-          <a:fillRef idx="1">
-            <a:schemeClr val="accent1"/>
-          </a:fillRef>
-          <a:effectRef idx="0">
-            <a:schemeClr val="accent1"/>
-          </a:effectRef>
-          <a:fontRef idx="minor">
-            <a:schemeClr val="lt1"/>
-          </a:fontRef>
-        </p:style>
-        <p:txBody>
-          <a:bodyPr rtlCol="0" anchor="ctr"/>
-          <a:lstStyle/>
-          <a:p>
-            <a:pPr algn="ctr"/>
-            <a:r>
-              <a:rPr lang="en-IN" sz="1646" dirty="0"/>
-              <a:t>Browse</a:t>
+              <a:t>SCGJ Batch Number</a:t>
             </a:r>
           </a:p>
         </p:txBody>
       </p:sp>
       <p:pic>
         <p:nvPicPr>
-          <p:cNvPr id="5" name="Picture 4">
-            <a:extLst>
-              <a:ext uri="{FF2B5EF4-FFF2-40B4-BE49-F238E27FC236}">
-                <a16:creationId xmlns:a16="http://schemas.microsoft.com/office/drawing/2014/main" id="{CC6E02CD-7BBB-4163-88DD-2F7AAE49E171}"/>
+          <p:cNvPr id="3" name="Picture 2">
+            <a:extLst>
+              <a:ext uri="{FF2B5EF4-FFF2-40B4-BE49-F238E27FC236}">
+                <a16:creationId xmlns:a16="http://schemas.microsoft.com/office/drawing/2014/main" id="{460EBFE1-1958-418E-B284-0DEAC78C59D0}"/>
               </a:ext>
             </a:extLst>
           </p:cNvPr>
@@ -12192,329 +11660,51 @@
           <p:nvPr/>
         </p:nvPicPr>
         <p:blipFill>
-          <a:blip r:embed="rId9">
-            <a:extLst>
-              <a:ext uri="{28A0092B-C50C-407E-A947-70E740481C1C}">
-                <a14:useLocalDpi xmlns:a14="http://schemas.microsoft.com/office/drawing/2010/main" val="0"/>
-              </a:ext>
-            </a:extLst>
-          </a:blip>
+          <a:blip r:embed="rId10"/>
           <a:stretch>
             <a:fillRect/>
           </a:stretch>
         </p:blipFill>
         <p:spPr>
           <a:xfrm>
-            <a:off x="215248" y="2476285"/>
-            <a:ext cx="325148" cy="325148"/>
+            <a:off x="2993847" y="1938684"/>
+            <a:ext cx="6327028" cy="3233775"/>
           </a:xfrm>
           <a:prstGeom prst="rect">
             <a:avLst/>
           </a:prstGeom>
         </p:spPr>
       </p:pic>
-      <p:sp>
-        <p:nvSpPr>
-          <p:cNvPr id="48" name="Rectangle: Rounded Corners 47">
-            <a:extLst>
-              <a:ext uri="{FF2B5EF4-FFF2-40B4-BE49-F238E27FC236}">
-                <a16:creationId xmlns:a16="http://schemas.microsoft.com/office/drawing/2014/main" id="{940EC5C2-0578-44BA-AFDF-8C7503FB5E88}"/>
-              </a:ext>
-            </a:extLst>
-          </p:cNvPr>
-          <p:cNvSpPr/>
-          <p:nvPr/>
-        </p:nvSpPr>
-        <p:spPr>
-          <a:xfrm>
-            <a:off x="8008565" y="1402064"/>
-            <a:ext cx="1960936" cy="422168"/>
-          </a:xfrm>
-          <a:prstGeom prst="roundRect">
-            <a:avLst/>
-          </a:prstGeom>
-          <a:solidFill>
-            <a:schemeClr val="bg1"/>
-          </a:solidFill>
-          <a:ln>
-            <a:solidFill>
-              <a:schemeClr val="bg2">
-                <a:lumMod val="50000"/>
-              </a:schemeClr>
-            </a:solidFill>
-          </a:ln>
-        </p:spPr>
-        <p:style>
-          <a:lnRef idx="2">
-            <a:schemeClr val="accent1">
-              <a:shade val="50000"/>
-            </a:schemeClr>
-          </a:lnRef>
-          <a:fillRef idx="1">
-            <a:schemeClr val="accent1"/>
-          </a:fillRef>
-          <a:effectRef idx="0">
-            <a:schemeClr val="accent1"/>
-          </a:effectRef>
-          <a:fontRef idx="minor">
-            <a:schemeClr val="lt1"/>
-          </a:fontRef>
-        </p:style>
-        <p:txBody>
-          <a:bodyPr rtlCol="0" anchor="ctr"/>
-          <a:lstStyle/>
-          <a:p>
-            <a:r>
-              <a:rPr lang="en-IN" sz="1646" dirty="0">
-                <a:solidFill>
-                  <a:schemeClr val="bg2">
-                    <a:lumMod val="50000"/>
-                  </a:schemeClr>
-                </a:solidFill>
-              </a:rPr>
-              <a:t>SCGJ Batch Number</a:t>
-            </a:r>
-          </a:p>
-        </p:txBody>
-      </p:sp>
-      <p:sp>
-        <p:nvSpPr>
-          <p:cNvPr id="50" name="Rectangle: Rounded Corners 49">
-            <a:extLst>
-              <a:ext uri="{FF2B5EF4-FFF2-40B4-BE49-F238E27FC236}">
-                <a16:creationId xmlns:a16="http://schemas.microsoft.com/office/drawing/2014/main" id="{14985049-3562-4DC7-9396-9BB7300B9232}"/>
-              </a:ext>
-            </a:extLst>
-          </p:cNvPr>
-          <p:cNvSpPr/>
-          <p:nvPr/>
-        </p:nvSpPr>
-        <p:spPr>
-          <a:xfrm>
-            <a:off x="3053898" y="4534728"/>
-            <a:ext cx="2283709" cy="339156"/>
-          </a:xfrm>
-          <a:prstGeom prst="roundRect">
-            <a:avLst/>
-          </a:prstGeom>
-          <a:solidFill>
-            <a:schemeClr val="bg1"/>
-          </a:solidFill>
-          <a:ln>
-            <a:solidFill>
-              <a:schemeClr val="bg2">
-                <a:lumMod val="50000"/>
-              </a:schemeClr>
-            </a:solidFill>
-          </a:ln>
-        </p:spPr>
-        <p:style>
-          <a:lnRef idx="2">
-            <a:schemeClr val="accent1">
-              <a:shade val="50000"/>
-            </a:schemeClr>
-          </a:lnRef>
-          <a:fillRef idx="1">
-            <a:schemeClr val="accent1"/>
-          </a:fillRef>
-          <a:effectRef idx="0">
-            <a:schemeClr val="accent1"/>
-          </a:effectRef>
-          <a:fontRef idx="minor">
-            <a:schemeClr val="lt1"/>
-          </a:fontRef>
-        </p:style>
-        <p:txBody>
-          <a:bodyPr rtlCol="0" anchor="ctr"/>
-          <a:lstStyle/>
-          <a:p>
-            <a:r>
-              <a:rPr lang="en-IN" sz="1646" dirty="0">
-                <a:solidFill>
-                  <a:schemeClr val="bg2">
-                    <a:lumMod val="50000"/>
-                  </a:schemeClr>
-                </a:solidFill>
-              </a:rPr>
-              <a:t>Images of Assessment</a:t>
-            </a:r>
-          </a:p>
-        </p:txBody>
-      </p:sp>
-      <p:sp>
-        <p:nvSpPr>
-          <p:cNvPr id="53" name="Rectangle: Rounded Corners 52">
-            <a:extLst>
-              <a:ext uri="{FF2B5EF4-FFF2-40B4-BE49-F238E27FC236}">
-                <a16:creationId xmlns:a16="http://schemas.microsoft.com/office/drawing/2014/main" id="{9385C71C-EF6D-4F13-85A7-D3E7F66E99AE}"/>
-              </a:ext>
-            </a:extLst>
-          </p:cNvPr>
-          <p:cNvSpPr/>
-          <p:nvPr/>
-        </p:nvSpPr>
-        <p:spPr>
-          <a:xfrm>
-            <a:off x="5586574" y="4513821"/>
-            <a:ext cx="973247" cy="307450"/>
-          </a:xfrm>
-          <a:prstGeom prst="roundRect">
-            <a:avLst/>
-          </a:prstGeom>
-          <a:solidFill>
-            <a:srgbClr val="00B0F0"/>
-          </a:solidFill>
-          <a:ln>
-            <a:noFill/>
-          </a:ln>
-        </p:spPr>
-        <p:style>
-          <a:lnRef idx="2">
-            <a:schemeClr val="accent1">
-              <a:shade val="50000"/>
-            </a:schemeClr>
-          </a:lnRef>
-          <a:fillRef idx="1">
-            <a:schemeClr val="accent1"/>
-          </a:fillRef>
-          <a:effectRef idx="0">
-            <a:schemeClr val="accent1"/>
-          </a:effectRef>
-          <a:fontRef idx="minor">
-            <a:schemeClr val="lt1"/>
-          </a:fontRef>
-        </p:style>
-        <p:txBody>
-          <a:bodyPr rtlCol="0" anchor="ctr"/>
-          <a:lstStyle/>
-          <a:p>
-            <a:pPr algn="ctr"/>
-            <a:r>
-              <a:rPr lang="en-IN" sz="1646" dirty="0"/>
-              <a:t>Browse</a:t>
-            </a:r>
-          </a:p>
-        </p:txBody>
-      </p:sp>
-      <p:sp>
-        <p:nvSpPr>
-          <p:cNvPr id="56" name="Rectangle: Rounded Corners 55">
-            <a:extLst>
-              <a:ext uri="{FF2B5EF4-FFF2-40B4-BE49-F238E27FC236}">
-                <a16:creationId xmlns:a16="http://schemas.microsoft.com/office/drawing/2014/main" id="{23DE093B-1978-43B8-9651-034D587A08D6}"/>
-              </a:ext>
-            </a:extLst>
-          </p:cNvPr>
-          <p:cNvSpPr/>
-          <p:nvPr/>
-        </p:nvSpPr>
-        <p:spPr>
-          <a:xfrm>
-            <a:off x="3063421" y="5015743"/>
-            <a:ext cx="2283709" cy="339156"/>
-          </a:xfrm>
-          <a:prstGeom prst="roundRect">
-            <a:avLst/>
-          </a:prstGeom>
-          <a:solidFill>
-            <a:schemeClr val="bg1"/>
-          </a:solidFill>
-          <a:ln>
-            <a:solidFill>
-              <a:schemeClr val="bg2">
-                <a:lumMod val="50000"/>
-              </a:schemeClr>
-            </a:solidFill>
-          </a:ln>
-        </p:spPr>
-        <p:style>
-          <a:lnRef idx="2">
-            <a:schemeClr val="accent1">
-              <a:shade val="50000"/>
-            </a:schemeClr>
-          </a:lnRef>
-          <a:fillRef idx="1">
-            <a:schemeClr val="accent1"/>
-          </a:fillRef>
-          <a:effectRef idx="0">
-            <a:schemeClr val="accent1"/>
-          </a:effectRef>
-          <a:fontRef idx="minor">
-            <a:schemeClr val="lt1"/>
-          </a:fontRef>
-        </p:style>
-        <p:txBody>
-          <a:bodyPr rtlCol="0" anchor="ctr"/>
-          <a:lstStyle/>
-          <a:p>
-            <a:r>
-              <a:rPr lang="en-IN" sz="1646" dirty="0">
-                <a:solidFill>
-                  <a:schemeClr val="bg2">
-                    <a:lumMod val="50000"/>
-                  </a:schemeClr>
-                </a:solidFill>
-              </a:rPr>
-              <a:t>Images of Medical Exam</a:t>
-            </a:r>
-          </a:p>
-        </p:txBody>
-      </p:sp>
-      <p:sp>
-        <p:nvSpPr>
-          <p:cNvPr id="60" name="Rectangle: Rounded Corners 59">
-            <a:extLst>
-              <a:ext uri="{FF2B5EF4-FFF2-40B4-BE49-F238E27FC236}">
-                <a16:creationId xmlns:a16="http://schemas.microsoft.com/office/drawing/2014/main" id="{3A6254C5-3656-4E76-ACF5-9B57AE79742B}"/>
-              </a:ext>
-            </a:extLst>
-          </p:cNvPr>
-          <p:cNvSpPr/>
-          <p:nvPr/>
-        </p:nvSpPr>
-        <p:spPr>
-          <a:xfrm>
-            <a:off x="5596097" y="4994836"/>
-            <a:ext cx="973247" cy="307450"/>
-          </a:xfrm>
-          <a:prstGeom prst="roundRect">
-            <a:avLst/>
-          </a:prstGeom>
-          <a:solidFill>
-            <a:srgbClr val="00B0F0"/>
-          </a:solidFill>
-          <a:ln>
-            <a:noFill/>
-          </a:ln>
-        </p:spPr>
-        <p:style>
-          <a:lnRef idx="2">
-            <a:schemeClr val="accent1">
-              <a:shade val="50000"/>
-            </a:schemeClr>
-          </a:lnRef>
-          <a:fillRef idx="1">
-            <a:schemeClr val="accent1"/>
-          </a:fillRef>
-          <a:effectRef idx="0">
-            <a:schemeClr val="accent1"/>
-          </a:effectRef>
-          <a:fontRef idx="minor">
-            <a:schemeClr val="lt1"/>
-          </a:fontRef>
-        </p:style>
-        <p:txBody>
-          <a:bodyPr rtlCol="0" anchor="ctr"/>
-          <a:lstStyle/>
-          <a:p>
-            <a:pPr algn="ctr"/>
-            <a:r>
-              <a:rPr lang="en-IN" sz="1646" dirty="0"/>
-              <a:t>Browse</a:t>
-            </a:r>
-          </a:p>
-        </p:txBody>
-      </p:sp>
+      <p:pic>
+        <p:nvPicPr>
+          <p:cNvPr id="4" name="Picture 3">
+            <a:extLst>
+              <a:ext uri="{FF2B5EF4-FFF2-40B4-BE49-F238E27FC236}">
+                <a16:creationId xmlns:a16="http://schemas.microsoft.com/office/drawing/2014/main" id="{8E055C2B-CDC9-4475-ADCD-7E53DEE7E36F}"/>
+              </a:ext>
+            </a:extLst>
+          </p:cNvPr>
+          <p:cNvPicPr>
+            <a:picLocks noChangeAspect="1"/>
+          </p:cNvPicPr>
+          <p:nvPr/>
+        </p:nvPicPr>
+        <p:blipFill>
+          <a:blip r:embed="rId11"/>
+          <a:stretch>
+            <a:fillRect/>
+          </a:stretch>
+        </p:blipFill>
+        <p:spPr>
+          <a:xfrm>
+            <a:off x="2993847" y="5156741"/>
+            <a:ext cx="6327028" cy="1249759"/>
+          </a:xfrm>
+          <a:prstGeom prst="rect">
+            <a:avLst/>
+          </a:prstGeom>
+        </p:spPr>
+      </p:pic>
     </p:spTree>
     <p:extLst>
       <p:ext uri="{BB962C8B-B14F-4D97-AF65-F5344CB8AC3E}">

</xml_diff>